<commit_message>
added RequestQueue for offline functionality Problems with LocalStorage and duplicate Items
</commit_message>
<xml_diff>
--- a/0_Dokumentation/Client.pptx
+++ b/0_Dokumentation/Client.pptx
@@ -210,7 +210,7 @@
           <a:p>
             <a:fld id="{3A4F2231-F5AC-4576-9D4B-6D01FD753ACC}" type="datetimeFigureOut">
               <a:rPr lang="de-AT" smtClean="0"/>
-              <a:t>20.04.2020</a:t>
+              <a:t>30.04.2020</a:t>
             </a:fld>
             <a:endParaRPr lang="de-AT"/>
           </a:p>
@@ -711,7 +711,7 @@
           <a:p>
             <a:fld id="{42E74EA4-BFEA-4642-B036-0B1B0D08FEB8}" type="datetimeFigureOut">
               <a:rPr lang="en-US" smtClean="0"/>
-              <a:t>4/20/2020</a:t>
+              <a:t>4/30/2020</a:t>
             </a:fld>
             <a:endParaRPr lang="en-US"/>
           </a:p>
@@ -911,7 +911,7 @@
           <a:p>
             <a:fld id="{42E74EA4-BFEA-4642-B036-0B1B0D08FEB8}" type="datetimeFigureOut">
               <a:rPr lang="en-US" smtClean="0"/>
-              <a:t>4/20/2020</a:t>
+              <a:t>4/30/2020</a:t>
             </a:fld>
             <a:endParaRPr lang="en-US"/>
           </a:p>
@@ -1121,7 +1121,7 @@
           <a:p>
             <a:fld id="{42E74EA4-BFEA-4642-B036-0B1B0D08FEB8}" type="datetimeFigureOut">
               <a:rPr lang="en-US" smtClean="0"/>
-              <a:t>4/20/2020</a:t>
+              <a:t>4/30/2020</a:t>
             </a:fld>
             <a:endParaRPr lang="en-US"/>
           </a:p>
@@ -1321,7 +1321,7 @@
           <a:p>
             <a:fld id="{42E74EA4-BFEA-4642-B036-0B1B0D08FEB8}" type="datetimeFigureOut">
               <a:rPr lang="en-US" smtClean="0"/>
-              <a:t>4/20/2020</a:t>
+              <a:t>4/30/2020</a:t>
             </a:fld>
             <a:endParaRPr lang="en-US"/>
           </a:p>
@@ -1597,7 +1597,7 @@
           <a:p>
             <a:fld id="{42E74EA4-BFEA-4642-B036-0B1B0D08FEB8}" type="datetimeFigureOut">
               <a:rPr lang="en-US" smtClean="0"/>
-              <a:t>4/20/2020</a:t>
+              <a:t>4/30/2020</a:t>
             </a:fld>
             <a:endParaRPr lang="en-US"/>
           </a:p>
@@ -1865,7 +1865,7 @@
           <a:p>
             <a:fld id="{42E74EA4-BFEA-4642-B036-0B1B0D08FEB8}" type="datetimeFigureOut">
               <a:rPr lang="en-US" smtClean="0"/>
-              <a:t>4/20/2020</a:t>
+              <a:t>4/30/2020</a:t>
             </a:fld>
             <a:endParaRPr lang="en-US"/>
           </a:p>
@@ -2280,7 +2280,7 @@
           <a:p>
             <a:fld id="{42E74EA4-BFEA-4642-B036-0B1B0D08FEB8}" type="datetimeFigureOut">
               <a:rPr lang="en-US" smtClean="0"/>
-              <a:t>4/20/2020</a:t>
+              <a:t>4/30/2020</a:t>
             </a:fld>
             <a:endParaRPr lang="en-US"/>
           </a:p>
@@ -2422,7 +2422,7 @@
           <a:p>
             <a:fld id="{42E74EA4-BFEA-4642-B036-0B1B0D08FEB8}" type="datetimeFigureOut">
               <a:rPr lang="en-US" smtClean="0"/>
-              <a:t>4/20/2020</a:t>
+              <a:t>4/30/2020</a:t>
             </a:fld>
             <a:endParaRPr lang="en-US"/>
           </a:p>
@@ -2535,7 +2535,7 @@
           <a:p>
             <a:fld id="{42E74EA4-BFEA-4642-B036-0B1B0D08FEB8}" type="datetimeFigureOut">
               <a:rPr lang="en-US" smtClean="0"/>
-              <a:t>4/20/2020</a:t>
+              <a:t>4/30/2020</a:t>
             </a:fld>
             <a:endParaRPr lang="en-US"/>
           </a:p>
@@ -2848,7 +2848,7 @@
           <a:p>
             <a:fld id="{42E74EA4-BFEA-4642-B036-0B1B0D08FEB8}" type="datetimeFigureOut">
               <a:rPr lang="en-US" smtClean="0"/>
-              <a:t>4/20/2020</a:t>
+              <a:t>4/30/2020</a:t>
             </a:fld>
             <a:endParaRPr lang="en-US"/>
           </a:p>
@@ -3137,7 +3137,7 @@
           <a:p>
             <a:fld id="{42E74EA4-BFEA-4642-B036-0B1B0D08FEB8}" type="datetimeFigureOut">
               <a:rPr lang="en-US" smtClean="0"/>
-              <a:t>4/20/2020</a:t>
+              <a:t>4/30/2020</a:t>
             </a:fld>
             <a:endParaRPr lang="en-US"/>
           </a:p>
@@ -3380,7 +3380,7 @@
           <a:p>
             <a:fld id="{42E74EA4-BFEA-4642-B036-0B1B0D08FEB8}" type="datetimeFigureOut">
               <a:rPr lang="en-US" smtClean="0"/>
-              <a:t>4/20/2020</a:t>
+              <a:t>4/30/2020</a:t>
             </a:fld>
             <a:endParaRPr lang="en-US"/>
           </a:p>
@@ -6899,7 +6899,7 @@
           <p:nvPr>
             <p:extLst>
               <p:ext uri="{D42A27DB-BD31-4B8C-83A1-F6EECF244321}">
-                <p14:modId xmlns:p14="http://schemas.microsoft.com/office/powerpoint/2010/main" val="3745038329"/>
+                <p14:modId xmlns:p14="http://schemas.microsoft.com/office/powerpoint/2010/main" val="3924304140"/>
               </p:ext>
             </p:extLst>
           </p:nvPr>
@@ -6929,14 +6929,14 @@
                     </a:ext>
                   </a:extLst>
                 </a:gridCol>
-                <a:gridCol w="2514600">
+                <a:gridCol w="2505075">
                   <a:extLst>
                     <a:ext uri="{9D8B030D-6E8A-4147-A177-3AD203B41FA5}">
                       <a16:colId xmlns:a16="http://schemas.microsoft.com/office/drawing/2014/main" val="4192313351"/>
                     </a:ext>
                   </a:extLst>
                 </a:gridCol>
-                <a:gridCol w="2558100">
+                <a:gridCol w="2567625">
                   <a:extLst>
                     <a:ext uri="{9D8B030D-6E8A-4147-A177-3AD203B41FA5}">
                       <a16:colId xmlns:a16="http://schemas.microsoft.com/office/drawing/2014/main" val="459354667"/>
@@ -7097,7 +7097,7 @@
                             <a:srgbClr val="FF0000"/>
                           </a:solidFill>
                         </a:rPr>
-                        <a:t>Bei Erstellen prüfen ob schon vorhanden</a:t>
+                        <a:t>Beim Erstellen prüfen ob schon vorhanden</a:t>
                       </a:r>
                     </a:p>
                     <a:p>
@@ -7111,7 +7111,11 @@
                       </a:r>
                     </a:p>
                   </a:txBody>
-                  <a:tcPr anchor="ctr"/>
+                  <a:tcPr anchor="ctr">
+                    <a:solidFill>
+                      <a:srgbClr val="00FF00"/>
+                    </a:solidFill>
+                  </a:tcPr>
                 </a:tc>
                 <a:tc>
                   <a:txBody>
@@ -8441,21 +8445,6 @@
 </file>
 
 <file path=customXml/item1.xml><?xml version="1.0" encoding="utf-8"?>
-<p:properties xmlns:p="http://schemas.microsoft.com/office/2006/metadata/properties" xmlns:xsi="http://www.w3.org/2001/XMLSchema-instance" xmlns:pc="http://schemas.microsoft.com/office/infopath/2007/PartnerControls">
-  <documentManagement/>
-</p:properties>
-</file>
-
-<file path=customXml/item2.xml><?xml version="1.0" encoding="utf-8"?>
-<?mso-contentType ?>
-<FormTemplates xmlns="http://schemas.microsoft.com/sharepoint/v3/contenttype/forms">
-  <Display>DocumentLibraryForm</Display>
-  <Edit>DocumentLibraryForm</Edit>
-  <New>DocumentLibraryForm</New>
-</FormTemplates>
-</file>
-
-<file path=customXml/item3.xml><?xml version="1.0" encoding="utf-8"?>
 <ct:contentTypeSchema xmlns:ct="http://schemas.microsoft.com/office/2006/metadata/contentType" xmlns:ma="http://schemas.microsoft.com/office/2006/metadata/properties/metaAttributes" ct:_="" ma:_="" ma:contentTypeName="Dokument" ma:contentTypeID="0x010100D233769BFF2BD24EA4C619E0CCB82881" ma:contentTypeVersion="0" ma:contentTypeDescription="Ein neues Dokument erstellen." ma:contentTypeScope="" ma:versionID="230ca389d1a9e48fed4e5cad00463a98">
   <xsd:schema xmlns:xsd="http://www.w3.org/2001/XMLSchema" xmlns:xs="http://www.w3.org/2001/XMLSchema" xmlns:p="http://schemas.microsoft.com/office/2006/metadata/properties" targetNamespace="http://schemas.microsoft.com/office/2006/metadata/properties" ma:root="true" ma:fieldsID="8c96a1500b55a331f0d0926ba64a978c">
     <xsd:element name="properties">
@@ -8569,10 +8558,32 @@
 </ct:contentTypeSchema>
 </file>
 
+<file path=customXml/item2.xml><?xml version="1.0" encoding="utf-8"?>
+<?mso-contentType ?>
+<FormTemplates xmlns="http://schemas.microsoft.com/sharepoint/v3/contenttype/forms">
+  <Display>DocumentLibraryForm</Display>
+  <Edit>DocumentLibraryForm</Edit>
+  <New>DocumentLibraryForm</New>
+</FormTemplates>
+</file>
+
+<file path=customXml/item3.xml><?xml version="1.0" encoding="utf-8"?>
+<p:properties xmlns:p="http://schemas.microsoft.com/office/2006/metadata/properties" xmlns:xsi="http://www.w3.org/2001/XMLSchema-instance" xmlns:pc="http://schemas.microsoft.com/office/infopath/2007/PartnerControls">
+  <documentManagement/>
+</p:properties>
+</file>
+
 <file path=customXml/itemProps1.xml><?xml version="1.0" encoding="utf-8"?>
-<ds:datastoreItem xmlns:ds="http://schemas.openxmlformats.org/officeDocument/2006/customXml" ds:itemID="{7EA4CB87-C672-4204-A1A2-DE4EEA6A2C9E}">
+<ds:datastoreItem xmlns:ds="http://schemas.openxmlformats.org/officeDocument/2006/customXml" ds:itemID="{5DC538A5-F84D-4379-B65C-D168E2066EDF}">
   <ds:schemaRefs>
+    <ds:schemaRef ds:uri="http://schemas.microsoft.com/office/2006/metadata/contentType"/>
+    <ds:schemaRef ds:uri="http://schemas.microsoft.com/office/2006/metadata/properties/metaAttributes"/>
+    <ds:schemaRef ds:uri="http://www.w3.org/2001/XMLSchema"/>
     <ds:schemaRef ds:uri="http://schemas.microsoft.com/office/2006/metadata/properties"/>
+    <ds:schemaRef ds:uri="http://schemas.openxmlformats.org/package/2006/metadata/core-properties"/>
+    <ds:schemaRef ds:uri="http://purl.org/dc/elements/1.1/"/>
+    <ds:schemaRef ds:uri="http://purl.org/dc/terms/"/>
+    <ds:schemaRef ds:uri="http://schemas.microsoft.com/internal/obd"/>
     <ds:schemaRef ds:uri="http://schemas.microsoft.com/office/infopath/2007/PartnerControls"/>
   </ds:schemaRefs>
 </ds:datastoreItem>
@@ -8587,16 +8598,9 @@
 </file>
 
 <file path=customXml/itemProps3.xml><?xml version="1.0" encoding="utf-8"?>
-<ds:datastoreItem xmlns:ds="http://schemas.openxmlformats.org/officeDocument/2006/customXml" ds:itemID="{5DC538A5-F84D-4379-B65C-D168E2066EDF}">
+<ds:datastoreItem xmlns:ds="http://schemas.openxmlformats.org/officeDocument/2006/customXml" ds:itemID="{7EA4CB87-C672-4204-A1A2-DE4EEA6A2C9E}">
   <ds:schemaRefs>
-    <ds:schemaRef ds:uri="http://schemas.microsoft.com/office/2006/metadata/contentType"/>
-    <ds:schemaRef ds:uri="http://schemas.microsoft.com/office/2006/metadata/properties/metaAttributes"/>
-    <ds:schemaRef ds:uri="http://www.w3.org/2001/XMLSchema"/>
     <ds:schemaRef ds:uri="http://schemas.microsoft.com/office/2006/metadata/properties"/>
-    <ds:schemaRef ds:uri="http://schemas.openxmlformats.org/package/2006/metadata/core-properties"/>
-    <ds:schemaRef ds:uri="http://purl.org/dc/elements/1.1/"/>
-    <ds:schemaRef ds:uri="http://purl.org/dc/terms/"/>
-    <ds:schemaRef ds:uri="http://schemas.microsoft.com/internal/obd"/>
     <ds:schemaRef ds:uri="http://schemas.microsoft.com/office/infopath/2007/PartnerControls"/>
   </ds:schemaRefs>
 </ds:datastoreItem>

</xml_diff>

<commit_message>
changed Logo edited PPT
</commit_message>
<xml_diff>
--- a/0_Dokumentation/Client.pptx
+++ b/0_Dokumentation/Client.pptx
@@ -8,7 +8,7 @@
     <p:notesMasterId r:id="rId8"/>
   </p:notesMasterIdLst>
   <p:sldIdLst>
-    <p:sldId id="256" r:id="rId5"/>
+    <p:sldId id="259" r:id="rId5"/>
     <p:sldId id="257" r:id="rId6"/>
     <p:sldId id="258" r:id="rId7"/>
   </p:sldIdLst>
@@ -211,7 +211,7 @@
           <a:p>
             <a:fld id="{3A4F2231-F5AC-4576-9D4B-6D01FD753ACC}" type="datetimeFigureOut">
               <a:rPr lang="de-AT" smtClean="0"/>
-              <a:t>03.05.2020</a:t>
+              <a:t>05.06.2020</a:t>
             </a:fld>
             <a:endParaRPr lang="de-AT"/>
           </a:p>
@@ -712,7 +712,7 @@
           <a:p>
             <a:fld id="{42E74EA4-BFEA-4642-B036-0B1B0D08FEB8}" type="datetimeFigureOut">
               <a:rPr lang="en-US" smtClean="0"/>
-              <a:t>5/3/2020</a:t>
+              <a:t>6/5/2020</a:t>
             </a:fld>
             <a:endParaRPr lang="en-US"/>
           </a:p>
@@ -912,7 +912,7 @@
           <a:p>
             <a:fld id="{42E74EA4-BFEA-4642-B036-0B1B0D08FEB8}" type="datetimeFigureOut">
               <a:rPr lang="en-US" smtClean="0"/>
-              <a:t>5/3/2020</a:t>
+              <a:t>6/5/2020</a:t>
             </a:fld>
             <a:endParaRPr lang="en-US"/>
           </a:p>
@@ -1122,7 +1122,7 @@
           <a:p>
             <a:fld id="{42E74EA4-BFEA-4642-B036-0B1B0D08FEB8}" type="datetimeFigureOut">
               <a:rPr lang="en-US" smtClean="0"/>
-              <a:t>5/3/2020</a:t>
+              <a:t>6/5/2020</a:t>
             </a:fld>
             <a:endParaRPr lang="en-US"/>
           </a:p>
@@ -1322,7 +1322,7 @@
           <a:p>
             <a:fld id="{42E74EA4-BFEA-4642-B036-0B1B0D08FEB8}" type="datetimeFigureOut">
               <a:rPr lang="en-US" smtClean="0"/>
-              <a:t>5/3/2020</a:t>
+              <a:t>6/5/2020</a:t>
             </a:fld>
             <a:endParaRPr lang="en-US"/>
           </a:p>
@@ -1598,7 +1598,7 @@
           <a:p>
             <a:fld id="{42E74EA4-BFEA-4642-B036-0B1B0D08FEB8}" type="datetimeFigureOut">
               <a:rPr lang="en-US" smtClean="0"/>
-              <a:t>5/3/2020</a:t>
+              <a:t>6/5/2020</a:t>
             </a:fld>
             <a:endParaRPr lang="en-US"/>
           </a:p>
@@ -1866,7 +1866,7 @@
           <a:p>
             <a:fld id="{42E74EA4-BFEA-4642-B036-0B1B0D08FEB8}" type="datetimeFigureOut">
               <a:rPr lang="en-US" smtClean="0"/>
-              <a:t>5/3/2020</a:t>
+              <a:t>6/5/2020</a:t>
             </a:fld>
             <a:endParaRPr lang="en-US"/>
           </a:p>
@@ -2281,7 +2281,7 @@
           <a:p>
             <a:fld id="{42E74EA4-BFEA-4642-B036-0B1B0D08FEB8}" type="datetimeFigureOut">
               <a:rPr lang="en-US" smtClean="0"/>
-              <a:t>5/3/2020</a:t>
+              <a:t>6/5/2020</a:t>
             </a:fld>
             <a:endParaRPr lang="en-US"/>
           </a:p>
@@ -2423,7 +2423,7 @@
           <a:p>
             <a:fld id="{42E74EA4-BFEA-4642-B036-0B1B0D08FEB8}" type="datetimeFigureOut">
               <a:rPr lang="en-US" smtClean="0"/>
-              <a:t>5/3/2020</a:t>
+              <a:t>6/5/2020</a:t>
             </a:fld>
             <a:endParaRPr lang="en-US"/>
           </a:p>
@@ -2536,7 +2536,7 @@
           <a:p>
             <a:fld id="{42E74EA4-BFEA-4642-B036-0B1B0D08FEB8}" type="datetimeFigureOut">
               <a:rPr lang="en-US" smtClean="0"/>
-              <a:t>5/3/2020</a:t>
+              <a:t>6/5/2020</a:t>
             </a:fld>
             <a:endParaRPr lang="en-US"/>
           </a:p>
@@ -2849,7 +2849,7 @@
           <a:p>
             <a:fld id="{42E74EA4-BFEA-4642-B036-0B1B0D08FEB8}" type="datetimeFigureOut">
               <a:rPr lang="en-US" smtClean="0"/>
-              <a:t>5/3/2020</a:t>
+              <a:t>6/5/2020</a:t>
             </a:fld>
             <a:endParaRPr lang="en-US"/>
           </a:p>
@@ -3138,7 +3138,7 @@
           <a:p>
             <a:fld id="{42E74EA4-BFEA-4642-B036-0B1B0D08FEB8}" type="datetimeFigureOut">
               <a:rPr lang="en-US" smtClean="0"/>
-              <a:t>5/3/2020</a:t>
+              <a:t>6/5/2020</a:t>
             </a:fld>
             <a:endParaRPr lang="en-US"/>
           </a:p>
@@ -3381,7 +3381,7 @@
           <a:p>
             <a:fld id="{42E74EA4-BFEA-4642-B036-0B1B0D08FEB8}" type="datetimeFigureOut">
               <a:rPr lang="en-US" smtClean="0"/>
-              <a:t>5/3/2020</a:t>
+              <a:t>6/5/2020</a:t>
             </a:fld>
             <a:endParaRPr lang="en-US"/>
           </a:p>
@@ -3800,10 +3800,10 @@
       </p:grpSpPr>
       <p:sp>
         <p:nvSpPr>
-          <p:cNvPr id="4" name="Rechteck 3">
-            <a:extLst>
-              <a:ext uri="{FF2B5EF4-FFF2-40B4-BE49-F238E27FC236}">
-                <a16:creationId xmlns:a16="http://schemas.microsoft.com/office/drawing/2014/main" id="{098C3B14-2C72-4984-B362-598BCF5B863F}"/>
+          <p:cNvPr id="12" name="Rechteck 11">
+            <a:extLst>
+              <a:ext uri="{FF2B5EF4-FFF2-40B4-BE49-F238E27FC236}">
+                <a16:creationId xmlns:a16="http://schemas.microsoft.com/office/drawing/2014/main" id="{1E5C3D5E-B24F-4C81-9CD9-94738D3CA706}"/>
               </a:ext>
             </a:extLst>
           </p:cNvPr>
@@ -3812,8 +3812,67 @@
         </p:nvSpPr>
         <p:spPr>
           <a:xfrm>
-            <a:off x="1533244" y="5666509"/>
-            <a:ext cx="1736436" cy="701964"/>
+            <a:off x="2867540" y="788841"/>
+            <a:ext cx="6293406" cy="446061"/>
+          </a:xfrm>
+          <a:prstGeom prst="rect">
+            <a:avLst/>
+          </a:prstGeom>
+          <a:solidFill>
+            <a:schemeClr val="bg1"/>
+          </a:solidFill>
+        </p:spPr>
+        <p:style>
+          <a:lnRef idx="2">
+            <a:schemeClr val="accent3">
+              <a:shade val="50000"/>
+            </a:schemeClr>
+          </a:lnRef>
+          <a:fillRef idx="1">
+            <a:schemeClr val="accent3"/>
+          </a:fillRef>
+          <a:effectRef idx="0">
+            <a:schemeClr val="accent3"/>
+          </a:effectRef>
+          <a:fontRef idx="minor">
+            <a:schemeClr val="lt1"/>
+          </a:fontRef>
+        </p:style>
+        <p:txBody>
+          <a:bodyPr rtlCol="0" anchor="ctr"/>
+          <a:lstStyle/>
+          <a:p>
+            <a:pPr algn="ctr"/>
+            <a:r>
+              <a:rPr lang="de-AT" dirty="0">
+                <a:solidFill>
+                  <a:schemeClr val="tx1">
+                    <a:lumMod val="75000"/>
+                    <a:lumOff val="25000"/>
+                  </a:schemeClr>
+                </a:solidFill>
+              </a:rPr>
+              <a:t>Frontend</a:t>
+            </a:r>
+          </a:p>
+        </p:txBody>
+      </p:sp>
+      <p:sp>
+        <p:nvSpPr>
+          <p:cNvPr id="5" name="Rechteck 4">
+            <a:extLst>
+              <a:ext uri="{FF2B5EF4-FFF2-40B4-BE49-F238E27FC236}">
+                <a16:creationId xmlns:a16="http://schemas.microsoft.com/office/drawing/2014/main" id="{5C5AFFC3-0B51-493B-8BBF-6798C6426CBD}"/>
+              </a:ext>
+            </a:extLst>
+          </p:cNvPr>
+          <p:cNvSpPr/>
+          <p:nvPr/>
+        </p:nvSpPr>
+        <p:spPr>
+          <a:xfrm>
+            <a:off x="2871882" y="1225060"/>
+            <a:ext cx="1260000" cy="432000"/>
           </a:xfrm>
           <a:prstGeom prst="rect">
             <a:avLst/>
@@ -3854,698 +3913,17 @@
                   </a:schemeClr>
                 </a:solidFill>
               </a:rPr>
-              <a:t>LocalStorage</a:t>
-            </a:r>
-          </a:p>
-        </p:txBody>
-      </p:sp>
-      <p:sp>
-        <p:nvSpPr>
-          <p:cNvPr id="5" name="Rechteck 4">
-            <a:extLst>
-              <a:ext uri="{FF2B5EF4-FFF2-40B4-BE49-F238E27FC236}">
-                <a16:creationId xmlns:a16="http://schemas.microsoft.com/office/drawing/2014/main" id="{B2E31DC0-CD5A-467C-9EBA-89FEE7E690B5}"/>
-              </a:ext>
-            </a:extLst>
-          </p:cNvPr>
-          <p:cNvSpPr/>
-          <p:nvPr/>
-        </p:nvSpPr>
-        <p:spPr>
-          <a:xfrm>
-            <a:off x="1533244" y="1345045"/>
-            <a:ext cx="1736436" cy="701964"/>
-          </a:xfrm>
-          <a:prstGeom prst="rect">
-            <a:avLst/>
-          </a:prstGeom>
-          <a:solidFill>
-            <a:schemeClr val="bg1">
-              <a:lumMod val="95000"/>
-            </a:schemeClr>
-          </a:solidFill>
-        </p:spPr>
-        <p:style>
-          <a:lnRef idx="2">
-            <a:schemeClr val="accent3">
-              <a:shade val="50000"/>
-            </a:schemeClr>
-          </a:lnRef>
-          <a:fillRef idx="1">
-            <a:schemeClr val="accent3"/>
-          </a:fillRef>
-          <a:effectRef idx="0">
-            <a:schemeClr val="accent3"/>
-          </a:effectRef>
-          <a:fontRef idx="minor">
-            <a:schemeClr val="lt1"/>
-          </a:fontRef>
-        </p:style>
-        <p:txBody>
-          <a:bodyPr rtlCol="0" anchor="ctr"/>
-          <a:lstStyle/>
-          <a:p>
-            <a:pPr algn="ctr"/>
-            <a:r>
-              <a:rPr lang="de-AT" dirty="0">
-                <a:solidFill>
-                  <a:schemeClr val="tx1">
-                    <a:lumMod val="75000"/>
-                    <a:lumOff val="25000"/>
-                  </a:schemeClr>
-                </a:solidFill>
-              </a:rPr>
               <a:t>Create</a:t>
             </a:r>
           </a:p>
         </p:txBody>
       </p:sp>
-      <p:sp>
-        <p:nvSpPr>
-          <p:cNvPr id="6" name="Rechteck 5">
-            <a:extLst>
-              <a:ext uri="{FF2B5EF4-FFF2-40B4-BE49-F238E27FC236}">
-                <a16:creationId xmlns:a16="http://schemas.microsoft.com/office/drawing/2014/main" id="{13A31AD6-2E40-4EFA-8BC2-730FFE4FB1F3}"/>
-              </a:ext>
-            </a:extLst>
-          </p:cNvPr>
-          <p:cNvSpPr/>
-          <p:nvPr/>
-        </p:nvSpPr>
-        <p:spPr>
-          <a:xfrm>
-            <a:off x="1533244" y="4015509"/>
-            <a:ext cx="1736436" cy="701964"/>
-          </a:xfrm>
-          <a:prstGeom prst="rect">
-            <a:avLst/>
-          </a:prstGeom>
-          <a:solidFill>
-            <a:schemeClr val="bg1">
-              <a:lumMod val="95000"/>
-            </a:schemeClr>
-          </a:solidFill>
-        </p:spPr>
-        <p:style>
-          <a:lnRef idx="2">
-            <a:schemeClr val="accent3">
-              <a:shade val="50000"/>
-            </a:schemeClr>
-          </a:lnRef>
-          <a:fillRef idx="1">
-            <a:schemeClr val="accent3"/>
-          </a:fillRef>
-          <a:effectRef idx="0">
-            <a:schemeClr val="accent3"/>
-          </a:effectRef>
-          <a:fontRef idx="minor">
-            <a:schemeClr val="lt1"/>
-          </a:fontRef>
-        </p:style>
-        <p:txBody>
-          <a:bodyPr rtlCol="0" anchor="ctr"/>
-          <a:lstStyle/>
-          <a:p>
-            <a:pPr algn="ctr"/>
-            <a:r>
-              <a:rPr lang="de-AT" dirty="0">
-                <a:solidFill>
-                  <a:schemeClr val="tx1">
-                    <a:lumMod val="75000"/>
-                    <a:lumOff val="25000"/>
-                  </a:schemeClr>
-                </a:solidFill>
-              </a:rPr>
-              <a:t>Array</a:t>
-            </a:r>
-          </a:p>
-        </p:txBody>
-      </p:sp>
-      <p:cxnSp>
-        <p:nvCxnSpPr>
-          <p:cNvPr id="8" name="Gerade Verbindung mit Pfeil 7">
-            <a:extLst>
-              <a:ext uri="{FF2B5EF4-FFF2-40B4-BE49-F238E27FC236}">
-                <a16:creationId xmlns:a16="http://schemas.microsoft.com/office/drawing/2014/main" id="{8E6D6DC4-6D3D-47DC-A559-C4E3C8734175}"/>
-              </a:ext>
-            </a:extLst>
-          </p:cNvPr>
-          <p:cNvCxnSpPr>
-            <a:stCxn id="5" idx="2"/>
-            <a:endCxn id="6" idx="0"/>
-          </p:cNvCxnSpPr>
-          <p:nvPr/>
-        </p:nvCxnSpPr>
-        <p:spPr>
-          <a:xfrm>
-            <a:off x="2401462" y="2047009"/>
-            <a:ext cx="0" cy="1968500"/>
-          </a:xfrm>
-          <a:prstGeom prst="straightConnector1">
-            <a:avLst/>
-          </a:prstGeom>
-          <a:ln w="12700">
-            <a:solidFill>
-              <a:schemeClr val="tx1">
-                <a:lumMod val="75000"/>
-                <a:lumOff val="25000"/>
-              </a:schemeClr>
-            </a:solidFill>
-            <a:tailEnd type="triangle"/>
-          </a:ln>
-        </p:spPr>
-        <p:style>
-          <a:lnRef idx="1">
-            <a:schemeClr val="dk1"/>
-          </a:lnRef>
-          <a:fillRef idx="0">
-            <a:schemeClr val="dk1"/>
-          </a:fillRef>
-          <a:effectRef idx="0">
-            <a:schemeClr val="dk1"/>
-          </a:effectRef>
-          <a:fontRef idx="minor">
-            <a:schemeClr val="tx1"/>
-          </a:fontRef>
-        </p:style>
-      </p:cxnSp>
-      <p:cxnSp>
-        <p:nvCxnSpPr>
-          <p:cNvPr id="9" name="Gerade Verbindung mit Pfeil 8">
-            <a:extLst>
-              <a:ext uri="{FF2B5EF4-FFF2-40B4-BE49-F238E27FC236}">
-                <a16:creationId xmlns:a16="http://schemas.microsoft.com/office/drawing/2014/main" id="{2967EC37-9B0B-48F4-9DE9-0FCB88C75346}"/>
-              </a:ext>
-            </a:extLst>
-          </p:cNvPr>
-          <p:cNvCxnSpPr>
-            <a:cxnSpLocks/>
-          </p:cNvCxnSpPr>
-          <p:nvPr/>
-        </p:nvCxnSpPr>
-        <p:spPr>
-          <a:xfrm>
-            <a:off x="2872517" y="4717473"/>
-            <a:ext cx="0" cy="949036"/>
-          </a:xfrm>
-          <a:prstGeom prst="straightConnector1">
-            <a:avLst/>
-          </a:prstGeom>
-          <a:ln w="12700">
-            <a:solidFill>
-              <a:schemeClr val="tx1">
-                <a:lumMod val="75000"/>
-                <a:lumOff val="25000"/>
-              </a:schemeClr>
-            </a:solidFill>
-            <a:tailEnd type="triangle"/>
-          </a:ln>
-        </p:spPr>
-        <p:style>
-          <a:lnRef idx="1">
-            <a:schemeClr val="dk1"/>
-          </a:lnRef>
-          <a:fillRef idx="0">
-            <a:schemeClr val="dk1"/>
-          </a:fillRef>
-          <a:effectRef idx="0">
-            <a:schemeClr val="dk1"/>
-          </a:effectRef>
-          <a:fontRef idx="minor">
-            <a:schemeClr val="tx1"/>
-          </a:fontRef>
-        </p:style>
-      </p:cxnSp>
-      <p:cxnSp>
-        <p:nvCxnSpPr>
-          <p:cNvPr id="12" name="Gerade Verbindung mit Pfeil 11">
-            <a:extLst>
-              <a:ext uri="{FF2B5EF4-FFF2-40B4-BE49-F238E27FC236}">
-                <a16:creationId xmlns:a16="http://schemas.microsoft.com/office/drawing/2014/main" id="{75291CF3-9F4C-4FC8-B5D9-EB65D9DAA9DA}"/>
-              </a:ext>
-            </a:extLst>
-          </p:cNvPr>
-          <p:cNvCxnSpPr>
-            <a:cxnSpLocks/>
-          </p:cNvCxnSpPr>
-          <p:nvPr/>
-        </p:nvCxnSpPr>
-        <p:spPr>
-          <a:xfrm>
-            <a:off x="1898080" y="4717473"/>
-            <a:ext cx="0" cy="949036"/>
-          </a:xfrm>
-          <a:prstGeom prst="straightConnector1">
-            <a:avLst/>
-          </a:prstGeom>
-          <a:ln w="12700">
-            <a:solidFill>
-              <a:schemeClr val="tx1">
-                <a:lumMod val="75000"/>
-                <a:lumOff val="25000"/>
-              </a:schemeClr>
-            </a:solidFill>
-            <a:headEnd type="triangle" w="med" len="med"/>
-            <a:tailEnd type="none" w="med" len="med"/>
-          </a:ln>
-        </p:spPr>
-        <p:style>
-          <a:lnRef idx="1">
-            <a:schemeClr val="dk1"/>
-          </a:lnRef>
-          <a:fillRef idx="0">
-            <a:schemeClr val="dk1"/>
-          </a:fillRef>
-          <a:effectRef idx="0">
-            <a:schemeClr val="dk1"/>
-          </a:effectRef>
-          <a:fontRef idx="minor">
-            <a:schemeClr val="tx1"/>
-          </a:fontRef>
-        </p:style>
-      </p:cxnSp>
-      <p:sp>
-        <p:nvSpPr>
-          <p:cNvPr id="13" name="Textfeld 12">
-            <a:extLst>
-              <a:ext uri="{FF2B5EF4-FFF2-40B4-BE49-F238E27FC236}">
-                <a16:creationId xmlns:a16="http://schemas.microsoft.com/office/drawing/2014/main" id="{9D1B6EF5-1C97-47C2-9B2D-ACC9BAE4E84D}"/>
-              </a:ext>
-            </a:extLst>
-          </p:cNvPr>
-          <p:cNvSpPr txBox="1"/>
-          <p:nvPr/>
-        </p:nvSpPr>
-        <p:spPr>
-          <a:xfrm rot="16200000">
-            <a:off x="2272711" y="5048230"/>
-            <a:ext cx="974947" cy="261610"/>
-          </a:xfrm>
-          <a:prstGeom prst="rect">
-            <a:avLst/>
-          </a:prstGeom>
-          <a:noFill/>
-        </p:spPr>
-        <p:txBody>
-          <a:bodyPr wrap="none" rtlCol="0">
-            <a:spAutoFit/>
-          </a:bodyPr>
-          <a:lstStyle/>
-          <a:p>
-            <a:r>
-              <a:rPr lang="de-AT" sz="1100" dirty="0"/>
-              <a:t>JSON.stringify</a:t>
-            </a:r>
-          </a:p>
-        </p:txBody>
-      </p:sp>
-      <p:sp>
-        <p:nvSpPr>
-          <p:cNvPr id="14" name="Textfeld 13">
-            <a:extLst>
-              <a:ext uri="{FF2B5EF4-FFF2-40B4-BE49-F238E27FC236}">
-                <a16:creationId xmlns:a16="http://schemas.microsoft.com/office/drawing/2014/main" id="{2D80BA29-A2A9-42C1-9761-6806BA475310}"/>
-              </a:ext>
-            </a:extLst>
-          </p:cNvPr>
-          <p:cNvSpPr txBox="1"/>
-          <p:nvPr/>
-        </p:nvSpPr>
-        <p:spPr>
-          <a:xfrm rot="16200000">
-            <a:off x="1371211" y="5074141"/>
-            <a:ext cx="829073" cy="261610"/>
-          </a:xfrm>
-          <a:prstGeom prst="rect">
-            <a:avLst/>
-          </a:prstGeom>
-          <a:noFill/>
-        </p:spPr>
-        <p:txBody>
-          <a:bodyPr wrap="none" rtlCol="0">
-            <a:spAutoFit/>
-          </a:bodyPr>
-          <a:lstStyle/>
-          <a:p>
-            <a:r>
-              <a:rPr lang="de-AT" sz="1100" dirty="0"/>
-              <a:t>JSON.parse</a:t>
-            </a:r>
-          </a:p>
-        </p:txBody>
-      </p:sp>
-      <p:sp>
-        <p:nvSpPr>
-          <p:cNvPr id="15" name="Rechteck 14">
-            <a:extLst>
-              <a:ext uri="{FF2B5EF4-FFF2-40B4-BE49-F238E27FC236}">
-                <a16:creationId xmlns:a16="http://schemas.microsoft.com/office/drawing/2014/main" id="{437FF8DD-1A8F-463B-945E-304CE330487D}"/>
-              </a:ext>
-            </a:extLst>
-          </p:cNvPr>
-          <p:cNvSpPr/>
-          <p:nvPr/>
-        </p:nvSpPr>
-        <p:spPr>
-          <a:xfrm>
-            <a:off x="87748" y="286327"/>
-            <a:ext cx="1736436" cy="701964"/>
-          </a:xfrm>
-          <a:prstGeom prst="rect">
-            <a:avLst/>
-          </a:prstGeom>
-          <a:solidFill>
-            <a:schemeClr val="bg1">
-              <a:lumMod val="95000"/>
-            </a:schemeClr>
-          </a:solidFill>
-        </p:spPr>
-        <p:style>
-          <a:lnRef idx="2">
-            <a:schemeClr val="accent3">
-              <a:shade val="50000"/>
-            </a:schemeClr>
-          </a:lnRef>
-          <a:fillRef idx="1">
-            <a:schemeClr val="accent3"/>
-          </a:fillRef>
-          <a:effectRef idx="0">
-            <a:schemeClr val="accent3"/>
-          </a:effectRef>
-          <a:fontRef idx="minor">
-            <a:schemeClr val="lt1"/>
-          </a:fontRef>
-        </p:style>
-        <p:txBody>
-          <a:bodyPr rtlCol="0" anchor="ctr"/>
-          <a:lstStyle/>
-          <a:p>
-            <a:pPr algn="ctr"/>
-            <a:r>
-              <a:rPr lang="de-AT" dirty="0">
-                <a:solidFill>
-                  <a:schemeClr val="tx1">
-                    <a:lumMod val="75000"/>
-                    <a:lumOff val="25000"/>
-                  </a:schemeClr>
-                </a:solidFill>
-              </a:rPr>
-              <a:t>Frontend</a:t>
-            </a:r>
-          </a:p>
-        </p:txBody>
-      </p:sp>
-      <p:cxnSp>
-        <p:nvCxnSpPr>
-          <p:cNvPr id="17" name="Verbinder: gewinkelt 16">
-            <a:extLst>
-              <a:ext uri="{FF2B5EF4-FFF2-40B4-BE49-F238E27FC236}">
-                <a16:creationId xmlns:a16="http://schemas.microsoft.com/office/drawing/2014/main" id="{8832E17B-4A76-4CE8-8219-9168F8F3A994}"/>
-              </a:ext>
-            </a:extLst>
-          </p:cNvPr>
-          <p:cNvCxnSpPr>
-            <a:stCxn id="6" idx="1"/>
-            <a:endCxn id="15" idx="2"/>
-          </p:cNvCxnSpPr>
-          <p:nvPr/>
-        </p:nvCxnSpPr>
-        <p:spPr>
-          <a:xfrm rot="10800000">
-            <a:off x="955966" y="988291"/>
-            <a:ext cx="577278" cy="3378200"/>
-          </a:xfrm>
-          <a:prstGeom prst="bentConnector2">
-            <a:avLst/>
-          </a:prstGeom>
-          <a:ln>
-            <a:solidFill>
-              <a:schemeClr val="tx1">
-                <a:lumMod val="75000"/>
-                <a:lumOff val="25000"/>
-              </a:schemeClr>
-            </a:solidFill>
-            <a:tailEnd type="triangle"/>
-          </a:ln>
-        </p:spPr>
-        <p:style>
-          <a:lnRef idx="1">
-            <a:schemeClr val="dk1"/>
-          </a:lnRef>
-          <a:fillRef idx="0">
-            <a:schemeClr val="dk1"/>
-          </a:fillRef>
-          <a:effectRef idx="0">
-            <a:schemeClr val="dk1"/>
-          </a:effectRef>
-          <a:fontRef idx="minor">
-            <a:schemeClr val="tx1"/>
-          </a:fontRef>
-        </p:style>
-      </p:cxnSp>
-      <p:cxnSp>
-        <p:nvCxnSpPr>
-          <p:cNvPr id="18" name="Verbinder: gewinkelt 17">
-            <a:extLst>
-              <a:ext uri="{FF2B5EF4-FFF2-40B4-BE49-F238E27FC236}">
-                <a16:creationId xmlns:a16="http://schemas.microsoft.com/office/drawing/2014/main" id="{DB318750-1374-4445-A3C0-8C5AFD5C157A}"/>
-              </a:ext>
-            </a:extLst>
-          </p:cNvPr>
-          <p:cNvCxnSpPr>
-            <a:cxnSpLocks/>
-            <a:stCxn id="15" idx="3"/>
-            <a:endCxn id="5" idx="0"/>
-          </p:cNvCxnSpPr>
-          <p:nvPr/>
-        </p:nvCxnSpPr>
-        <p:spPr>
-          <a:xfrm>
-            <a:off x="1824184" y="637309"/>
-            <a:ext cx="577278" cy="707736"/>
-          </a:xfrm>
-          <a:prstGeom prst="bentConnector2">
-            <a:avLst/>
-          </a:prstGeom>
-          <a:ln>
-            <a:solidFill>
-              <a:schemeClr val="tx1">
-                <a:lumMod val="75000"/>
-                <a:lumOff val="25000"/>
-              </a:schemeClr>
-            </a:solidFill>
-            <a:tailEnd type="triangle"/>
-          </a:ln>
-        </p:spPr>
-        <p:style>
-          <a:lnRef idx="1">
-            <a:schemeClr val="dk1"/>
-          </a:lnRef>
-          <a:fillRef idx="0">
-            <a:schemeClr val="dk1"/>
-          </a:fillRef>
-          <a:effectRef idx="0">
-            <a:schemeClr val="dk1"/>
-          </a:effectRef>
-          <a:fontRef idx="minor">
-            <a:schemeClr val="tx1"/>
-          </a:fontRef>
-        </p:style>
-      </p:cxnSp>
-      <p:sp>
-        <p:nvSpPr>
-          <p:cNvPr id="21" name="Rechteck 20">
-            <a:extLst>
-              <a:ext uri="{FF2B5EF4-FFF2-40B4-BE49-F238E27FC236}">
-                <a16:creationId xmlns:a16="http://schemas.microsoft.com/office/drawing/2014/main" id="{844F296A-ADC5-411C-9F1D-D18BFB08F1E5}"/>
-              </a:ext>
-            </a:extLst>
-          </p:cNvPr>
-          <p:cNvSpPr/>
-          <p:nvPr/>
-        </p:nvSpPr>
-        <p:spPr>
-          <a:xfrm>
-            <a:off x="5782520" y="3458710"/>
-            <a:ext cx="1736436" cy="504000"/>
-          </a:xfrm>
-          <a:prstGeom prst="rect">
-            <a:avLst/>
-          </a:prstGeom>
-          <a:solidFill>
-            <a:schemeClr val="bg1">
-              <a:lumMod val="95000"/>
-            </a:schemeClr>
-          </a:solidFill>
-          <a:ln>
-            <a:noFill/>
-          </a:ln>
-        </p:spPr>
-        <p:style>
-          <a:lnRef idx="2">
-            <a:schemeClr val="accent3">
-              <a:shade val="50000"/>
-            </a:schemeClr>
-          </a:lnRef>
-          <a:fillRef idx="1">
-            <a:schemeClr val="accent3"/>
-          </a:fillRef>
-          <a:effectRef idx="0">
-            <a:schemeClr val="accent3"/>
-          </a:effectRef>
-          <a:fontRef idx="minor">
-            <a:schemeClr val="lt1"/>
-          </a:fontRef>
-        </p:style>
-        <p:txBody>
-          <a:bodyPr rtlCol="0" anchor="ctr"/>
-          <a:lstStyle/>
-          <a:p>
-            <a:pPr algn="ctr"/>
-            <a:r>
-              <a:rPr lang="de-AT" dirty="0">
-                <a:solidFill>
-                  <a:schemeClr val="tx1">
-                    <a:lumMod val="75000"/>
-                    <a:lumOff val="25000"/>
-                  </a:schemeClr>
-                </a:solidFill>
-              </a:rPr>
-              <a:t>IndexedDB</a:t>
-            </a:r>
-          </a:p>
-        </p:txBody>
-      </p:sp>
-      <p:sp>
-        <p:nvSpPr>
-          <p:cNvPr id="22" name="Rechteck 21">
-            <a:extLst>
-              <a:ext uri="{FF2B5EF4-FFF2-40B4-BE49-F238E27FC236}">
-                <a16:creationId xmlns:a16="http://schemas.microsoft.com/office/drawing/2014/main" id="{D8973800-399C-4C35-AE77-8242497272C1}"/>
-              </a:ext>
-            </a:extLst>
-          </p:cNvPr>
-          <p:cNvSpPr/>
-          <p:nvPr/>
-        </p:nvSpPr>
-        <p:spPr>
-          <a:xfrm>
-            <a:off x="5782520" y="2954710"/>
-            <a:ext cx="1736436" cy="504000"/>
-          </a:xfrm>
-          <a:prstGeom prst="rect">
-            <a:avLst/>
-          </a:prstGeom>
-          <a:solidFill>
-            <a:schemeClr val="tx1">
-              <a:lumMod val="75000"/>
-              <a:lumOff val="25000"/>
-            </a:schemeClr>
-          </a:solidFill>
-          <a:ln>
-            <a:noFill/>
-          </a:ln>
-        </p:spPr>
-        <p:style>
-          <a:lnRef idx="2">
-            <a:schemeClr val="accent3">
-              <a:shade val="50000"/>
-            </a:schemeClr>
-          </a:lnRef>
-          <a:fillRef idx="1">
-            <a:schemeClr val="accent3"/>
-          </a:fillRef>
-          <a:effectRef idx="0">
-            <a:schemeClr val="accent3"/>
-          </a:effectRef>
-          <a:fontRef idx="minor">
-            <a:schemeClr val="lt1"/>
-          </a:fontRef>
-        </p:style>
-        <p:txBody>
-          <a:bodyPr rtlCol="0" anchor="ctr"/>
-          <a:lstStyle/>
-          <a:p>
-            <a:pPr algn="ctr"/>
-            <a:r>
-              <a:rPr lang="de-AT" sz="1600" dirty="0">
-                <a:solidFill>
-                  <a:schemeClr val="bg1"/>
-                </a:solidFill>
-              </a:rPr>
-              <a:t>Dexie.js</a:t>
-            </a:r>
-          </a:p>
-          <a:p>
-            <a:pPr algn="ctr"/>
-            <a:r>
-              <a:rPr lang="de-AT" sz="1600" dirty="0">
-                <a:solidFill>
-                  <a:schemeClr val="bg1"/>
-                </a:solidFill>
-              </a:rPr>
-              <a:t>Wrapper</a:t>
-            </a:r>
-          </a:p>
-        </p:txBody>
-      </p:sp>
-      <p:cxnSp>
-        <p:nvCxnSpPr>
-          <p:cNvPr id="23" name="Verbinder: gewinkelt 22">
-            <a:extLst>
-              <a:ext uri="{FF2B5EF4-FFF2-40B4-BE49-F238E27FC236}">
-                <a16:creationId xmlns:a16="http://schemas.microsoft.com/office/drawing/2014/main" id="{7AE38C61-0919-4F70-990E-4E5CCDFDAE0A}"/>
-              </a:ext>
-            </a:extLst>
-          </p:cNvPr>
-          <p:cNvCxnSpPr>
-            <a:cxnSpLocks/>
-            <a:stCxn id="5" idx="2"/>
-            <a:endCxn id="65" idx="0"/>
-          </p:cNvCxnSpPr>
-          <p:nvPr/>
-        </p:nvCxnSpPr>
-        <p:spPr>
-          <a:xfrm rot="16200000" flipH="1">
-            <a:off x="4020627" y="427843"/>
-            <a:ext cx="903231" cy="4141561"/>
-          </a:xfrm>
-          <a:prstGeom prst="bentConnector3">
-            <a:avLst>
-              <a:gd name="adj1" fmla="val 50000"/>
-            </a:avLst>
-          </a:prstGeom>
-          <a:ln w="12700">
-            <a:solidFill>
-              <a:schemeClr val="tx1">
-                <a:lumMod val="75000"/>
-                <a:lumOff val="25000"/>
-              </a:schemeClr>
-            </a:solidFill>
-            <a:tailEnd type="triangle"/>
-          </a:ln>
-        </p:spPr>
-        <p:style>
-          <a:lnRef idx="1">
-            <a:schemeClr val="dk1"/>
-          </a:lnRef>
-          <a:fillRef idx="0">
-            <a:schemeClr val="dk1"/>
-          </a:fillRef>
-          <a:effectRef idx="0">
-            <a:schemeClr val="dk1"/>
-          </a:effectRef>
-          <a:fontRef idx="minor">
-            <a:schemeClr val="tx1"/>
-          </a:fontRef>
-        </p:style>
-      </p:cxnSp>
       <p:grpSp>
         <p:nvGrpSpPr>
-          <p:cNvPr id="29" name="Gruppieren 28">
-            <a:extLst>
-              <a:ext uri="{FF2B5EF4-FFF2-40B4-BE49-F238E27FC236}">
-                <a16:creationId xmlns:a16="http://schemas.microsoft.com/office/drawing/2014/main" id="{BED22499-B957-4594-9FF8-3F5F5E7B742E}"/>
+          <p:cNvPr id="18" name="Gruppieren 17">
+            <a:extLst>
+              <a:ext uri="{FF2B5EF4-FFF2-40B4-BE49-F238E27FC236}">
+                <a16:creationId xmlns:a16="http://schemas.microsoft.com/office/drawing/2014/main" id="{3AD901BC-B885-4FA1-A1C0-073AF87AD148}"/>
               </a:ext>
             </a:extLst>
           </p:cNvPr>
@@ -4554,7 +3932,7 @@
         </p:nvGrpSpPr>
         <p:grpSpPr>
           <a:xfrm>
-            <a:off x="5742688" y="4291056"/>
+            <a:off x="5042537" y="3341236"/>
             <a:ext cx="1828800" cy="701964"/>
             <a:chOff x="5394036" y="4659746"/>
             <a:chExt cx="1828800" cy="701964"/>
@@ -4562,10 +3940,10 @@
         </p:grpSpPr>
         <p:sp>
           <p:nvSpPr>
-            <p:cNvPr id="27" name="Raute 26">
+            <p:cNvPr id="19" name="Raute 18">
               <a:extLst>
                 <a:ext uri="{FF2B5EF4-FFF2-40B4-BE49-F238E27FC236}">
-                  <a16:creationId xmlns:a16="http://schemas.microsoft.com/office/drawing/2014/main" id="{DABEB0DE-D50C-4B56-B556-C0458F849508}"/>
+                  <a16:creationId xmlns:a16="http://schemas.microsoft.com/office/drawing/2014/main" id="{26DF6FE8-5B58-4256-854B-1E9480360930}"/>
                 </a:ext>
               </a:extLst>
             </p:cNvPr>
@@ -4613,10 +3991,10 @@
         </p:sp>
         <p:sp>
           <p:nvSpPr>
-            <p:cNvPr id="28" name="Textfeld 27">
+            <p:cNvPr id="20" name="Textfeld 19">
               <a:extLst>
                 <a:ext uri="{FF2B5EF4-FFF2-40B4-BE49-F238E27FC236}">
-                  <a16:creationId xmlns:a16="http://schemas.microsoft.com/office/drawing/2014/main" id="{1D8DAE36-085E-4427-A820-8731C0650EED}"/>
+                  <a16:creationId xmlns:a16="http://schemas.microsoft.com/office/drawing/2014/main" id="{5F503284-4822-4C7D-BD41-3A5EB816EA8C}"/>
                 </a:ext>
               </a:extLst>
             </p:cNvPr>
@@ -4625,8 +4003,8 @@
           </p:nvSpPr>
           <p:spPr>
             <a:xfrm>
-              <a:off x="5394036" y="4856839"/>
-              <a:ext cx="1828800" cy="307777"/>
+              <a:off x="5394036" y="4830473"/>
+              <a:ext cx="1828800" cy="338554"/>
             </a:xfrm>
             <a:prstGeom prst="rect">
               <a:avLst/>
@@ -4641,7 +4019,7 @@
             <a:p>
               <a:pPr algn="ctr"/>
               <a:r>
-                <a:rPr lang="de-AT" sz="1400" dirty="0" err="1">
+                <a:rPr lang="de-DE" sz="1600" dirty="0">
                   <a:solidFill>
                     <a:schemeClr val="tx1">
                       <a:lumMod val="85000"/>
@@ -4649,10 +4027,10 @@
                     </a:schemeClr>
                   </a:solidFill>
                 </a:rPr>
-                <a:t>navigator.online</a:t>
+                <a:t>O</a:t>
               </a:r>
               <a:r>
-                <a:rPr lang="de-AT" sz="1400" dirty="0">
+                <a:rPr lang="de-AT" sz="1600" dirty="0">
                   <a:solidFill>
                     <a:schemeClr val="tx1">
                       <a:lumMod val="85000"/>
@@ -4660,7 +4038,7 @@
                     </a:schemeClr>
                   </a:solidFill>
                 </a:rPr>
-                <a:t>?</a:t>
+                <a:t>nline?</a:t>
               </a:r>
             </a:p>
           </p:txBody>
@@ -4668,24 +4046,23 @@
       </p:grpSp>
       <p:cxnSp>
         <p:nvCxnSpPr>
-          <p:cNvPr id="30" name="Gerade Verbindung mit Pfeil 29">
-            <a:extLst>
-              <a:ext uri="{FF2B5EF4-FFF2-40B4-BE49-F238E27FC236}">
-                <a16:creationId xmlns:a16="http://schemas.microsoft.com/office/drawing/2014/main" id="{B2B9579C-E48E-47E6-BC9B-16747D1C90DE}"/>
+          <p:cNvPr id="21" name="Gerade Verbindung mit Pfeil 20">
+            <a:extLst>
+              <a:ext uri="{FF2B5EF4-FFF2-40B4-BE49-F238E27FC236}">
+                <a16:creationId xmlns:a16="http://schemas.microsoft.com/office/drawing/2014/main" id="{2010015C-A79C-43C9-8084-8F9A9604A73F}"/>
               </a:ext>
             </a:extLst>
           </p:cNvPr>
           <p:cNvCxnSpPr>
             <a:cxnSpLocks/>
-            <a:stCxn id="21" idx="2"/>
-            <a:endCxn id="27" idx="0"/>
+            <a:endCxn id="19" idx="0"/>
           </p:cNvCxnSpPr>
           <p:nvPr/>
         </p:nvCxnSpPr>
         <p:spPr>
           <a:xfrm>
-            <a:off x="6650738" y="3962710"/>
-            <a:ext cx="6350" cy="328346"/>
+            <a:off x="5956936" y="3005745"/>
+            <a:ext cx="1" cy="335491"/>
           </a:xfrm>
           <a:prstGeom prst="straightConnector1">
             <a:avLst/>
@@ -4717,10 +4094,10 @@
       </p:cxnSp>
       <p:sp>
         <p:nvSpPr>
-          <p:cNvPr id="33" name="Rechteck 32">
-            <a:extLst>
-              <a:ext uri="{FF2B5EF4-FFF2-40B4-BE49-F238E27FC236}">
-                <a16:creationId xmlns:a16="http://schemas.microsoft.com/office/drawing/2014/main" id="{50F4D10D-6240-4512-B189-A2349631C7FB}"/>
+          <p:cNvPr id="22" name="Rechteck 21">
+            <a:extLst>
+              <a:ext uri="{FF2B5EF4-FFF2-40B4-BE49-F238E27FC236}">
+                <a16:creationId xmlns:a16="http://schemas.microsoft.com/office/drawing/2014/main" id="{1D372571-FD93-42BE-900E-4ACDBE5560CD}"/>
               </a:ext>
             </a:extLst>
           </p:cNvPr>
@@ -4729,8 +4106,8 @@
         </p:nvSpPr>
         <p:spPr>
           <a:xfrm>
-            <a:off x="8234776" y="4592475"/>
-            <a:ext cx="1736436" cy="350982"/>
+            <a:off x="2778809" y="4737304"/>
+            <a:ext cx="1828800" cy="561429"/>
           </a:xfrm>
           <a:prstGeom prst="rect">
             <a:avLst/>
@@ -4763,7 +4140,21 @@
           <a:p>
             <a:pPr algn="ctr"/>
             <a:r>
-              <a:rPr lang="de-AT" dirty="0">
+              <a:rPr lang="de-DE" sz="1600" dirty="0">
+                <a:solidFill>
+                  <a:schemeClr val="tx1">
+                    <a:lumMod val="75000"/>
+                    <a:lumOff val="25000"/>
+                  </a:schemeClr>
+                </a:solidFill>
+              </a:rPr>
+              <a:t>Rest API</a:t>
+            </a:r>
+          </a:p>
+          <a:p>
+            <a:pPr algn="ctr"/>
+            <a:r>
+              <a:rPr lang="de-DE" sz="1600" dirty="0">
                 <a:solidFill>
                   <a:schemeClr val="tx1">
                     <a:lumMod val="75000"/>
@@ -4773,15 +4164,23 @@
               </a:rPr>
               <a:t>Socket.io</a:t>
             </a:r>
-          </a:p>
-        </p:txBody>
-      </p:sp>
-      <p:sp>
-        <p:nvSpPr>
-          <p:cNvPr id="34" name="Rechteck 33">
-            <a:extLst>
-              <a:ext uri="{FF2B5EF4-FFF2-40B4-BE49-F238E27FC236}">
-                <a16:creationId xmlns:a16="http://schemas.microsoft.com/office/drawing/2014/main" id="{FD5F2F79-C07F-4CC7-A0AD-240919BA4280}"/>
+            <a:endParaRPr lang="de-AT" sz="1600" dirty="0">
+              <a:solidFill>
+                <a:schemeClr val="tx1">
+                  <a:lumMod val="75000"/>
+                  <a:lumOff val="25000"/>
+                </a:schemeClr>
+              </a:solidFill>
+            </a:endParaRPr>
+          </a:p>
+        </p:txBody>
+      </p:sp>
+      <p:sp>
+        <p:nvSpPr>
+          <p:cNvPr id="23" name="Rechteck 22">
+            <a:extLst>
+              <a:ext uri="{FF2B5EF4-FFF2-40B4-BE49-F238E27FC236}">
+                <a16:creationId xmlns:a16="http://schemas.microsoft.com/office/drawing/2014/main" id="{319AE857-7FCF-4C4C-A592-0F8918EBCE67}"/>
               </a:ext>
             </a:extLst>
           </p:cNvPr>
@@ -4790,8 +4189,8 @@
         </p:nvSpPr>
         <p:spPr>
           <a:xfrm>
-            <a:off x="8234776" y="4254727"/>
-            <a:ext cx="1736436" cy="350983"/>
+            <a:off x="2778809" y="4399557"/>
+            <a:ext cx="1828800" cy="350983"/>
           </a:xfrm>
           <a:prstGeom prst="rect">
             <a:avLst/>
@@ -4835,69 +4234,21 @@
           </a:p>
         </p:txBody>
       </p:sp>
-      <p:cxnSp>
-        <p:nvCxnSpPr>
-          <p:cNvPr id="35" name="Gerade Verbindung mit Pfeil 34">
-            <a:extLst>
-              <a:ext uri="{FF2B5EF4-FFF2-40B4-BE49-F238E27FC236}">
-                <a16:creationId xmlns:a16="http://schemas.microsoft.com/office/drawing/2014/main" id="{FD95C6A1-D63D-49F0-87A0-4A3D854682EE}"/>
-              </a:ext>
-            </a:extLst>
-          </p:cNvPr>
-          <p:cNvCxnSpPr>
-            <a:cxnSpLocks/>
-            <a:stCxn id="27" idx="3"/>
-          </p:cNvCxnSpPr>
+      <p:sp>
+        <p:nvSpPr>
+          <p:cNvPr id="25" name="Textfeld 24">
+            <a:extLst>
+              <a:ext uri="{FF2B5EF4-FFF2-40B4-BE49-F238E27FC236}">
+                <a16:creationId xmlns:a16="http://schemas.microsoft.com/office/drawing/2014/main" id="{2836DE28-1E33-43AA-A922-76005CB9CB7B}"/>
+              </a:ext>
+            </a:extLst>
+          </p:cNvPr>
+          <p:cNvSpPr txBox="1"/>
           <p:nvPr/>
-        </p:nvCxnSpPr>
+        </p:nvSpPr>
         <p:spPr>
           <a:xfrm>
-            <a:off x="7571488" y="4642038"/>
-            <a:ext cx="669638" cy="0"/>
-          </a:xfrm>
-          <a:prstGeom prst="straightConnector1">
-            <a:avLst/>
-          </a:prstGeom>
-          <a:ln w="12700">
-            <a:solidFill>
-              <a:schemeClr val="tx1">
-                <a:lumMod val="75000"/>
-                <a:lumOff val="25000"/>
-              </a:schemeClr>
-            </a:solidFill>
-            <a:tailEnd type="triangle"/>
-          </a:ln>
-        </p:spPr>
-        <p:style>
-          <a:lnRef idx="1">
-            <a:schemeClr val="dk1"/>
-          </a:lnRef>
-          <a:fillRef idx="0">
-            <a:schemeClr val="dk1"/>
-          </a:fillRef>
-          <a:effectRef idx="0">
-            <a:schemeClr val="dk1"/>
-          </a:effectRef>
-          <a:fontRef idx="minor">
-            <a:schemeClr val="tx1"/>
-          </a:fontRef>
-        </p:style>
-      </p:cxnSp>
-      <p:sp>
-        <p:nvSpPr>
-          <p:cNvPr id="38" name="Textfeld 37">
-            <a:extLst>
-              <a:ext uri="{FF2B5EF4-FFF2-40B4-BE49-F238E27FC236}">
-                <a16:creationId xmlns:a16="http://schemas.microsoft.com/office/drawing/2014/main" id="{4E9EDF43-E66B-4813-92BB-2B70E19C3CCC}"/>
-              </a:ext>
-            </a:extLst>
-          </p:cNvPr>
-          <p:cNvSpPr txBox="1"/>
-          <p:nvPr/>
-        </p:nvSpPr>
-        <p:spPr>
-          <a:xfrm>
-            <a:off x="7744305" y="4413603"/>
+            <a:off x="4714354" y="3446692"/>
             <a:ext cx="311304" cy="261610"/>
           </a:xfrm>
           <a:prstGeom prst="rect">
@@ -4918,65 +4269,12 @@
           </a:p>
         </p:txBody>
       </p:sp>
-      <p:cxnSp>
-        <p:nvCxnSpPr>
-          <p:cNvPr id="39" name="Verbinder: gewinkelt 38">
-            <a:extLst>
-              <a:ext uri="{FF2B5EF4-FFF2-40B4-BE49-F238E27FC236}">
-                <a16:creationId xmlns:a16="http://schemas.microsoft.com/office/drawing/2014/main" id="{7519ED80-2C8B-4C2E-AA61-DE4E4B9F07D9}"/>
-              </a:ext>
-            </a:extLst>
-          </p:cNvPr>
-          <p:cNvCxnSpPr>
-            <a:cxnSpLocks/>
-            <a:stCxn id="27" idx="2"/>
-            <a:endCxn id="27" idx="0"/>
-          </p:cNvCxnSpPr>
-          <p:nvPr/>
-        </p:nvCxnSpPr>
-        <p:spPr>
-          <a:xfrm rot="5400000" flipH="1">
-            <a:off x="6306106" y="4642038"/>
-            <a:ext cx="701964" cy="12700"/>
-          </a:xfrm>
-          <a:prstGeom prst="bentConnector5">
-            <a:avLst>
-              <a:gd name="adj1" fmla="val -32566"/>
-              <a:gd name="adj2" fmla="val 7909087"/>
-              <a:gd name="adj3" fmla="val 127138"/>
-            </a:avLst>
-          </a:prstGeom>
-          <a:ln w="12700">
-            <a:solidFill>
-              <a:schemeClr val="tx1">
-                <a:lumMod val="75000"/>
-                <a:lumOff val="25000"/>
-              </a:schemeClr>
-            </a:solidFill>
-            <a:tailEnd type="triangle"/>
-          </a:ln>
-        </p:spPr>
-        <p:style>
-          <a:lnRef idx="1">
-            <a:schemeClr val="dk1"/>
-          </a:lnRef>
-          <a:fillRef idx="0">
-            <a:schemeClr val="dk1"/>
-          </a:fillRef>
-          <a:effectRef idx="0">
-            <a:schemeClr val="dk1"/>
-          </a:effectRef>
-          <a:fontRef idx="minor">
-            <a:schemeClr val="tx1"/>
-          </a:fontRef>
-        </p:style>
-      </p:cxnSp>
-      <p:sp>
-        <p:nvSpPr>
-          <p:cNvPr id="46" name="Textfeld 45">
-            <a:extLst>
-              <a:ext uri="{FF2B5EF4-FFF2-40B4-BE49-F238E27FC236}">
-                <a16:creationId xmlns:a16="http://schemas.microsoft.com/office/drawing/2014/main" id="{C8C57355-70D3-401C-8A6F-02897F16029D}"/>
+      <p:sp>
+        <p:nvSpPr>
+          <p:cNvPr id="27" name="Textfeld 26">
+            <a:extLst>
+              <a:ext uri="{FF2B5EF4-FFF2-40B4-BE49-F238E27FC236}">
+                <a16:creationId xmlns:a16="http://schemas.microsoft.com/office/drawing/2014/main" id="{ACDDF74F-2537-4C8A-96EA-B9751323957B}"/>
               </a:ext>
             </a:extLst>
           </p:cNvPr>
@@ -4985,7 +4283,7 @@
         </p:nvSpPr>
         <p:spPr>
           <a:xfrm>
-            <a:off x="6599938" y="4971003"/>
+            <a:off x="6864408" y="3450020"/>
             <a:ext cx="452368" cy="261610"/>
           </a:xfrm>
           <a:prstGeom prst="rect">
@@ -5008,156 +4306,59 @@
       </p:sp>
       <p:sp>
         <p:nvSpPr>
-          <p:cNvPr id="47" name="Rechteck 46">
-            <a:extLst>
-              <a:ext uri="{FF2B5EF4-FFF2-40B4-BE49-F238E27FC236}">
-                <a16:creationId xmlns:a16="http://schemas.microsoft.com/office/drawing/2014/main" id="{8F81889B-5C7C-46C0-9FCC-8886D6F924EB}"/>
-              </a:ext>
-            </a:extLst>
-          </p:cNvPr>
-          <p:cNvSpPr/>
+          <p:cNvPr id="38" name="Textfeld 37">
+            <a:extLst>
+              <a:ext uri="{FF2B5EF4-FFF2-40B4-BE49-F238E27FC236}">
+                <a16:creationId xmlns:a16="http://schemas.microsoft.com/office/drawing/2014/main" id="{CCEA6D75-4E13-4FA3-868D-D4E6673C18E4}"/>
+              </a:ext>
+            </a:extLst>
+          </p:cNvPr>
+          <p:cNvSpPr txBox="1"/>
           <p:nvPr/>
         </p:nvSpPr>
         <p:spPr>
           <a:xfrm>
-            <a:off x="10927418" y="3015096"/>
-            <a:ext cx="1071404" cy="2000764"/>
+            <a:off x="7039077" y="5630249"/>
+            <a:ext cx="311304" cy="261610"/>
           </a:xfrm>
           <a:prstGeom prst="rect">
             <a:avLst/>
           </a:prstGeom>
-          <a:solidFill>
-            <a:schemeClr val="bg1">
-              <a:lumMod val="95000"/>
-            </a:schemeClr>
-          </a:solidFill>
+          <a:noFill/>
         </p:spPr>
-        <p:style>
-          <a:lnRef idx="2">
-            <a:schemeClr val="accent3">
-              <a:shade val="50000"/>
-            </a:schemeClr>
-          </a:lnRef>
-          <a:fillRef idx="1">
-            <a:schemeClr val="accent3"/>
-          </a:fillRef>
-          <a:effectRef idx="0">
-            <a:schemeClr val="accent3"/>
-          </a:effectRef>
-          <a:fontRef idx="minor">
-            <a:schemeClr val="lt1"/>
-          </a:fontRef>
-        </p:style>
-        <p:txBody>
-          <a:bodyPr rtlCol="0" anchor="ctr"/>
+        <p:txBody>
+          <a:bodyPr wrap="none" rtlCol="0">
+            <a:spAutoFit/>
+          </a:bodyPr>
           <a:lstStyle/>
           <a:p>
-            <a:pPr algn="ctr"/>
-            <a:r>
-              <a:rPr lang="de-AT" dirty="0">
-                <a:solidFill>
-                  <a:schemeClr val="tx1">
-                    <a:lumMod val="75000"/>
-                    <a:lumOff val="25000"/>
-                  </a:schemeClr>
-                </a:solidFill>
-              </a:rPr>
-              <a:t>Rest API</a:t>
-            </a:r>
-          </a:p>
-          <a:p>
-            <a:pPr algn="ctr"/>
-            <a:r>
-              <a:rPr lang="de-AT" dirty="0">
-                <a:solidFill>
-                  <a:schemeClr val="tx1">
-                    <a:lumMod val="75000"/>
-                    <a:lumOff val="25000"/>
-                  </a:schemeClr>
-                </a:solidFill>
-              </a:rPr>
-              <a:t>Socket.IO</a:t>
-            </a:r>
-          </a:p>
-        </p:txBody>
-      </p:sp>
-      <p:sp>
-        <p:nvSpPr>
-          <p:cNvPr id="48" name="Rechteck 47">
-            <a:extLst>
-              <a:ext uri="{FF2B5EF4-FFF2-40B4-BE49-F238E27FC236}">
-                <a16:creationId xmlns:a16="http://schemas.microsoft.com/office/drawing/2014/main" id="{3A9030A0-4D04-473A-B64D-E27E060D398C}"/>
-              </a:ext>
-            </a:extLst>
-          </p:cNvPr>
-          <p:cNvSpPr/>
-          <p:nvPr/>
-        </p:nvSpPr>
-        <p:spPr>
-          <a:xfrm>
-            <a:off x="10927418" y="2515956"/>
-            <a:ext cx="1071404" cy="504000"/>
-          </a:xfrm>
-          <a:prstGeom prst="rect">
-            <a:avLst/>
-          </a:prstGeom>
-          <a:solidFill>
-            <a:schemeClr val="tx1">
-              <a:lumMod val="75000"/>
-              <a:lumOff val="25000"/>
-            </a:schemeClr>
-          </a:solidFill>
-        </p:spPr>
-        <p:style>
-          <a:lnRef idx="2">
-            <a:schemeClr val="accent3">
-              <a:shade val="50000"/>
-            </a:schemeClr>
-          </a:lnRef>
-          <a:fillRef idx="1">
-            <a:schemeClr val="accent3"/>
-          </a:fillRef>
-          <a:effectRef idx="0">
-            <a:schemeClr val="accent3"/>
-          </a:effectRef>
-          <a:fontRef idx="minor">
-            <a:schemeClr val="lt1"/>
-          </a:fontRef>
-        </p:style>
-        <p:txBody>
-          <a:bodyPr rtlCol="0" anchor="ctr"/>
-          <a:lstStyle/>
-          <a:p>
-            <a:pPr algn="ctr"/>
-            <a:r>
-              <a:rPr lang="de-AT" sz="1600" dirty="0">
-                <a:solidFill>
-                  <a:schemeClr val="bg1"/>
-                </a:solidFill>
-              </a:rPr>
-              <a:t>FeathersJS Backend</a:t>
+            <a:r>
+              <a:rPr lang="de-AT" sz="1100" dirty="0"/>
+              <a:t>JA</a:t>
             </a:r>
           </a:p>
         </p:txBody>
       </p:sp>
       <p:cxnSp>
         <p:nvCxnSpPr>
-          <p:cNvPr id="49" name="Gerade Verbindung mit Pfeil 48">
-            <a:extLst>
-              <a:ext uri="{FF2B5EF4-FFF2-40B4-BE49-F238E27FC236}">
-                <a16:creationId xmlns:a16="http://schemas.microsoft.com/office/drawing/2014/main" id="{EF1E137D-3D0C-4D01-B036-6C69933917EA}"/>
+          <p:cNvPr id="39" name="Gerade Verbindung mit Pfeil 38">
+            <a:extLst>
+              <a:ext uri="{FF2B5EF4-FFF2-40B4-BE49-F238E27FC236}">
+                <a16:creationId xmlns:a16="http://schemas.microsoft.com/office/drawing/2014/main" id="{0E67FAB0-1108-4E4E-98DB-B9CB1D2137D0}"/>
               </a:ext>
             </a:extLst>
           </p:cNvPr>
           <p:cNvCxnSpPr>
             <a:cxnSpLocks/>
+            <a:stCxn id="160" idx="2"/>
+            <a:endCxn id="23" idx="0"/>
           </p:cNvCxnSpPr>
           <p:nvPr/>
         </p:nvCxnSpPr>
         <p:spPr>
-          <a:xfrm flipV="1">
-            <a:off x="9971212" y="4767715"/>
-            <a:ext cx="956206" cy="251"/>
+          <a:xfrm flipH="1">
+            <a:off x="3693209" y="3848961"/>
+            <a:ext cx="6847" cy="550596"/>
           </a:xfrm>
           <a:prstGeom prst="straightConnector1">
             <a:avLst/>
@@ -5189,23 +4390,24 @@
       </p:cxnSp>
       <p:cxnSp>
         <p:nvCxnSpPr>
-          <p:cNvPr id="52" name="Gerade Verbindung mit Pfeil 51">
-            <a:extLst>
-              <a:ext uri="{FF2B5EF4-FFF2-40B4-BE49-F238E27FC236}">
-                <a16:creationId xmlns:a16="http://schemas.microsoft.com/office/drawing/2014/main" id="{820CBCD5-9E50-478D-B1FF-52088F25E69A}"/>
+          <p:cNvPr id="40" name="Gerade Verbindung mit Pfeil 39">
+            <a:extLst>
+              <a:ext uri="{FF2B5EF4-FFF2-40B4-BE49-F238E27FC236}">
+                <a16:creationId xmlns:a16="http://schemas.microsoft.com/office/drawing/2014/main" id="{B0B63E49-0190-445A-A29F-70C65FF8C2B8}"/>
               </a:ext>
             </a:extLst>
           </p:cNvPr>
           <p:cNvCxnSpPr>
             <a:cxnSpLocks/>
-            <a:endCxn id="34" idx="3"/>
+            <a:stCxn id="167" idx="3"/>
+            <a:endCxn id="183" idx="1"/>
           </p:cNvCxnSpPr>
           <p:nvPr/>
         </p:nvCxnSpPr>
         <p:spPr>
-          <a:xfrm flipH="1" flipV="1">
-            <a:off x="9971212" y="4430219"/>
-            <a:ext cx="956206" cy="0"/>
+          <a:xfrm>
+            <a:off x="6871337" y="4575050"/>
+            <a:ext cx="510710" cy="1134"/>
           </a:xfrm>
           <a:prstGeom prst="straightConnector1">
             <a:avLst/>
@@ -5235,67 +4437,80 @@
           </a:fontRef>
         </p:style>
       </p:cxnSp>
-      <p:sp>
-        <p:nvSpPr>
-          <p:cNvPr id="59" name="Textfeld 58">
-            <a:extLst>
-              <a:ext uri="{FF2B5EF4-FFF2-40B4-BE49-F238E27FC236}">
-                <a16:creationId xmlns:a16="http://schemas.microsoft.com/office/drawing/2014/main" id="{BCCF1C2D-E255-4E71-9447-BD6ECF42A8B1}"/>
-              </a:ext>
-            </a:extLst>
-          </p:cNvPr>
-          <p:cNvSpPr txBox="1"/>
+      <p:cxnSp>
+        <p:nvCxnSpPr>
+          <p:cNvPr id="42" name="Gerade Verbindung mit Pfeil 41">
+            <a:extLst>
+              <a:ext uri="{FF2B5EF4-FFF2-40B4-BE49-F238E27FC236}">
+                <a16:creationId xmlns:a16="http://schemas.microsoft.com/office/drawing/2014/main" id="{045E538B-E710-4E32-955F-4425A95E4D12}"/>
+              </a:ext>
+            </a:extLst>
+          </p:cNvPr>
+          <p:cNvCxnSpPr>
+            <a:cxnSpLocks/>
+            <a:stCxn id="183" idx="0"/>
+            <a:endCxn id="202" idx="2"/>
+          </p:cNvCxnSpPr>
+          <p:nvPr/>
+        </p:nvCxnSpPr>
+        <p:spPr>
+          <a:xfrm flipV="1">
+            <a:off x="8296447" y="3917780"/>
+            <a:ext cx="0" cy="307422"/>
+          </a:xfrm>
+          <a:prstGeom prst="straightConnector1">
+            <a:avLst/>
+          </a:prstGeom>
+          <a:ln w="12700">
+            <a:solidFill>
+              <a:schemeClr val="tx1">
+                <a:lumMod val="75000"/>
+                <a:lumOff val="25000"/>
+              </a:schemeClr>
+            </a:solidFill>
+            <a:tailEnd type="triangle"/>
+          </a:ln>
+        </p:spPr>
+        <p:style>
+          <a:lnRef idx="1">
+            <a:schemeClr val="dk1"/>
+          </a:lnRef>
+          <a:fillRef idx="0">
+            <a:schemeClr val="dk1"/>
+          </a:fillRef>
+          <a:effectRef idx="0">
+            <a:schemeClr val="dk1"/>
+          </a:effectRef>
+          <a:fontRef idx="minor">
+            <a:schemeClr val="tx1"/>
+          </a:fontRef>
+        </p:style>
+      </p:cxnSp>
+      <p:sp>
+        <p:nvSpPr>
+          <p:cNvPr id="50" name="Rechteck 49">
+            <a:extLst>
+              <a:ext uri="{FF2B5EF4-FFF2-40B4-BE49-F238E27FC236}">
+                <a16:creationId xmlns:a16="http://schemas.microsoft.com/office/drawing/2014/main" id="{F08DD561-BD3B-4AA1-A40B-CA0F3625FD69}"/>
+              </a:ext>
+            </a:extLst>
+          </p:cNvPr>
+          <p:cNvSpPr/>
           <p:nvPr/>
         </p:nvSpPr>
         <p:spPr>
           <a:xfrm>
-            <a:off x="10065769" y="4182922"/>
-            <a:ext cx="732893" cy="261610"/>
-          </a:xfrm>
-          <a:prstGeom prst="rect">
-            <a:avLst/>
-          </a:prstGeom>
-          <a:noFill/>
-        </p:spPr>
-        <p:txBody>
-          <a:bodyPr wrap="none" rtlCol="0">
-            <a:spAutoFit/>
-          </a:bodyPr>
-          <a:lstStyle/>
-          <a:p>
-            <a:r>
-              <a:rPr lang="de-AT" sz="1100" dirty="0"/>
-              <a:t>Response</a:t>
-            </a:r>
-          </a:p>
-        </p:txBody>
-      </p:sp>
-      <p:sp>
-        <p:nvSpPr>
-          <p:cNvPr id="64" name="Rechteck 63">
-            <a:extLst>
-              <a:ext uri="{FF2B5EF4-FFF2-40B4-BE49-F238E27FC236}">
-                <a16:creationId xmlns:a16="http://schemas.microsoft.com/office/drawing/2014/main" id="{B8EA48FF-68F6-4CCF-92CB-728A5661B52C}"/>
-              </a:ext>
-            </a:extLst>
-          </p:cNvPr>
-          <p:cNvSpPr/>
-          <p:nvPr/>
-        </p:nvSpPr>
-        <p:spPr>
-          <a:xfrm rot="16200000">
-            <a:off x="5176719" y="3352839"/>
-            <a:ext cx="1006119" cy="213622"/>
+            <a:off x="2778810" y="5607328"/>
+            <a:ext cx="1828799" cy="497552"/>
           </a:xfrm>
           <a:prstGeom prst="rect">
             <a:avLst/>
           </a:prstGeom>
           <a:solidFill>
-            <a:schemeClr val="bg1"/>
+            <a:schemeClr val="bg1">
+              <a:lumMod val="95000"/>
+            </a:schemeClr>
           </a:solidFill>
-          <a:ln>
-            <a:noFill/>
-          </a:ln>
         </p:spPr>
         <p:style>
           <a:lnRef idx="2">
@@ -5317,31 +4532,41 @@
           <a:bodyPr rtlCol="0" anchor="ctr"/>
           <a:lstStyle/>
           <a:p>
-            <a:pPr algn="ctr">
-              <a:lnSpc>
-                <a:spcPct val="80000"/>
-              </a:lnSpc>
-            </a:pPr>
-            <a:r>
-              <a:rPr lang="de-AT" sz="1600" dirty="0">
+            <a:pPr algn="ctr"/>
+            <a:r>
+              <a:rPr lang="de-AT" sz="1400" dirty="0">
                 <a:solidFill>
                   <a:schemeClr val="tx1">
-                    <a:lumMod val="85000"/>
-                    <a:lumOff val="15000"/>
+                    <a:lumMod val="75000"/>
+                    <a:lumOff val="25000"/>
                   </a:schemeClr>
                 </a:solidFill>
               </a:rPr>
-              <a:t>Queue</a:t>
-            </a:r>
-          </a:p>
-        </p:txBody>
-      </p:sp>
-      <p:sp>
-        <p:nvSpPr>
-          <p:cNvPr id="65" name="Rechteck 64">
-            <a:extLst>
-              <a:ext uri="{FF2B5EF4-FFF2-40B4-BE49-F238E27FC236}">
-                <a16:creationId xmlns:a16="http://schemas.microsoft.com/office/drawing/2014/main" id="{BEDF90AE-69BB-4CE0-B611-F02B1B06C9C0}"/>
+              <a:t>Daten vom Server</a:t>
+            </a:r>
+          </a:p>
+          <a:p>
+            <a:pPr algn="ctr"/>
+            <a:r>
+              <a:rPr lang="de-AT" sz="1400" dirty="0">
+                <a:solidFill>
+                  <a:schemeClr val="tx1">
+                    <a:lumMod val="75000"/>
+                    <a:lumOff val="25000"/>
+                  </a:schemeClr>
+                </a:solidFill>
+              </a:rPr>
+              <a:t>neu laden</a:t>
+            </a:r>
+          </a:p>
+        </p:txBody>
+      </p:sp>
+      <p:sp>
+        <p:nvSpPr>
+          <p:cNvPr id="55" name="Rechteck 54">
+            <a:extLst>
+              <a:ext uri="{FF2B5EF4-FFF2-40B4-BE49-F238E27FC236}">
+                <a16:creationId xmlns:a16="http://schemas.microsoft.com/office/drawing/2014/main" id="{F2D57D89-97D3-4320-A122-2901D99B7081}"/>
               </a:ext>
             </a:extLst>
           </p:cNvPr>
@@ -5350,13 +4575,17 @@
         </p:nvSpPr>
         <p:spPr>
           <a:xfrm>
-            <a:off x="5567090" y="2950240"/>
-            <a:ext cx="1951866" cy="1006120"/>
+            <a:off x="4129148" y="1225060"/>
+            <a:ext cx="1260000" cy="432000"/>
           </a:xfrm>
           <a:prstGeom prst="rect">
             <a:avLst/>
           </a:prstGeom>
-          <a:noFill/>
+          <a:solidFill>
+            <a:schemeClr val="bg1">
+              <a:lumMod val="95000"/>
+            </a:schemeClr>
+          </a:solidFill>
         </p:spPr>
         <p:style>
           <a:lnRef idx="2">
@@ -5379,7 +4608,1427 @@
           <a:lstStyle/>
           <a:p>
             <a:pPr algn="ctr"/>
-            <a:endParaRPr lang="de-AT" dirty="0">
+            <a:r>
+              <a:rPr lang="de-AT" dirty="0">
+                <a:solidFill>
+                  <a:schemeClr val="tx1">
+                    <a:lumMod val="75000"/>
+                    <a:lumOff val="25000"/>
+                  </a:schemeClr>
+                </a:solidFill>
+              </a:rPr>
+              <a:t>Delete</a:t>
+            </a:r>
+          </a:p>
+        </p:txBody>
+      </p:sp>
+      <p:sp>
+        <p:nvSpPr>
+          <p:cNvPr id="56" name="Rechteck 55">
+            <a:extLst>
+              <a:ext uri="{FF2B5EF4-FFF2-40B4-BE49-F238E27FC236}">
+                <a16:creationId xmlns:a16="http://schemas.microsoft.com/office/drawing/2014/main" id="{11D5EC87-8641-4C14-B0FC-4C4550FB2F5E}"/>
+              </a:ext>
+            </a:extLst>
+          </p:cNvPr>
+          <p:cNvSpPr/>
+          <p:nvPr/>
+        </p:nvSpPr>
+        <p:spPr>
+          <a:xfrm>
+            <a:off x="5386414" y="1225060"/>
+            <a:ext cx="1260000" cy="432000"/>
+          </a:xfrm>
+          <a:prstGeom prst="rect">
+            <a:avLst/>
+          </a:prstGeom>
+          <a:solidFill>
+            <a:schemeClr val="bg1">
+              <a:lumMod val="95000"/>
+            </a:schemeClr>
+          </a:solidFill>
+        </p:spPr>
+        <p:style>
+          <a:lnRef idx="2">
+            <a:schemeClr val="accent3">
+              <a:shade val="50000"/>
+            </a:schemeClr>
+          </a:lnRef>
+          <a:fillRef idx="1">
+            <a:schemeClr val="accent3"/>
+          </a:fillRef>
+          <a:effectRef idx="0">
+            <a:schemeClr val="accent3"/>
+          </a:effectRef>
+          <a:fontRef idx="minor">
+            <a:schemeClr val="lt1"/>
+          </a:fontRef>
+        </p:style>
+        <p:txBody>
+          <a:bodyPr rtlCol="0" anchor="ctr"/>
+          <a:lstStyle/>
+          <a:p>
+            <a:pPr algn="ctr"/>
+            <a:r>
+              <a:rPr lang="de-AT" dirty="0">
+                <a:solidFill>
+                  <a:schemeClr val="tx1">
+                    <a:lumMod val="75000"/>
+                    <a:lumOff val="25000"/>
+                  </a:schemeClr>
+                </a:solidFill>
+              </a:rPr>
+              <a:t>Patch</a:t>
+            </a:r>
+          </a:p>
+        </p:txBody>
+      </p:sp>
+      <p:sp>
+        <p:nvSpPr>
+          <p:cNvPr id="57" name="Rechteck 56">
+            <a:extLst>
+              <a:ext uri="{FF2B5EF4-FFF2-40B4-BE49-F238E27FC236}">
+                <a16:creationId xmlns:a16="http://schemas.microsoft.com/office/drawing/2014/main" id="{5896420C-7AAC-495A-A91D-2EC69BCE6CEC}"/>
+              </a:ext>
+            </a:extLst>
+          </p:cNvPr>
+          <p:cNvSpPr/>
+          <p:nvPr/>
+        </p:nvSpPr>
+        <p:spPr>
+          <a:xfrm>
+            <a:off x="6643680" y="1225060"/>
+            <a:ext cx="1260000" cy="432000"/>
+          </a:xfrm>
+          <a:prstGeom prst="rect">
+            <a:avLst/>
+          </a:prstGeom>
+          <a:solidFill>
+            <a:schemeClr val="bg1">
+              <a:lumMod val="95000"/>
+            </a:schemeClr>
+          </a:solidFill>
+        </p:spPr>
+        <p:style>
+          <a:lnRef idx="2">
+            <a:schemeClr val="accent3">
+              <a:shade val="50000"/>
+            </a:schemeClr>
+          </a:lnRef>
+          <a:fillRef idx="1">
+            <a:schemeClr val="accent3"/>
+          </a:fillRef>
+          <a:effectRef idx="0">
+            <a:schemeClr val="accent3"/>
+          </a:effectRef>
+          <a:fontRef idx="minor">
+            <a:schemeClr val="lt1"/>
+          </a:fontRef>
+        </p:style>
+        <p:txBody>
+          <a:bodyPr rtlCol="0" anchor="ctr"/>
+          <a:lstStyle/>
+          <a:p>
+            <a:pPr algn="ctr"/>
+            <a:r>
+              <a:rPr lang="de-AT" dirty="0">
+                <a:solidFill>
+                  <a:schemeClr val="tx1">
+                    <a:lumMod val="75000"/>
+                    <a:lumOff val="25000"/>
+                  </a:schemeClr>
+                </a:solidFill>
+              </a:rPr>
+              <a:t>Put</a:t>
+            </a:r>
+          </a:p>
+        </p:txBody>
+      </p:sp>
+      <p:cxnSp>
+        <p:nvCxnSpPr>
+          <p:cNvPr id="75" name="Verbinder: gewinkelt 74">
+            <a:extLst>
+              <a:ext uri="{FF2B5EF4-FFF2-40B4-BE49-F238E27FC236}">
+                <a16:creationId xmlns:a16="http://schemas.microsoft.com/office/drawing/2014/main" id="{8188D784-6BAC-424C-B02B-87AEC4A3C5A8}"/>
+              </a:ext>
+            </a:extLst>
+          </p:cNvPr>
+          <p:cNvCxnSpPr>
+            <a:cxnSpLocks/>
+            <a:stCxn id="111" idx="3"/>
+            <a:endCxn id="12" idx="3"/>
+          </p:cNvCxnSpPr>
+          <p:nvPr/>
+        </p:nvCxnSpPr>
+        <p:spPr>
+          <a:xfrm flipH="1" flipV="1">
+            <a:off x="9160946" y="1011872"/>
+            <a:ext cx="8337" cy="1215253"/>
+          </a:xfrm>
+          <a:prstGeom prst="bentConnector3">
+            <a:avLst>
+              <a:gd name="adj1" fmla="val -2741994"/>
+            </a:avLst>
+          </a:prstGeom>
+          <a:ln w="12700">
+            <a:solidFill>
+              <a:schemeClr val="tx1">
+                <a:lumMod val="75000"/>
+                <a:lumOff val="25000"/>
+              </a:schemeClr>
+            </a:solidFill>
+            <a:tailEnd type="triangle"/>
+          </a:ln>
+        </p:spPr>
+        <p:style>
+          <a:lnRef idx="1">
+            <a:schemeClr val="dk1"/>
+          </a:lnRef>
+          <a:fillRef idx="0">
+            <a:schemeClr val="dk1"/>
+          </a:fillRef>
+          <a:effectRef idx="0">
+            <a:schemeClr val="dk1"/>
+          </a:effectRef>
+          <a:fontRef idx="minor">
+            <a:schemeClr val="tx1"/>
+          </a:fontRef>
+        </p:style>
+      </p:cxnSp>
+      <p:grpSp>
+        <p:nvGrpSpPr>
+          <p:cNvPr id="150" name="Gruppieren 149">
+            <a:extLst>
+              <a:ext uri="{FF2B5EF4-FFF2-40B4-BE49-F238E27FC236}">
+                <a16:creationId xmlns:a16="http://schemas.microsoft.com/office/drawing/2014/main" id="{77F7123F-D279-4259-9C0B-312D0997E19A}"/>
+              </a:ext>
+            </a:extLst>
+          </p:cNvPr>
+          <p:cNvGrpSpPr/>
+          <p:nvPr/>
+        </p:nvGrpSpPr>
+        <p:grpSpPr>
+          <a:xfrm>
+            <a:off x="2862777" y="2028725"/>
+            <a:ext cx="1736439" cy="1006120"/>
+            <a:chOff x="1539011" y="2479532"/>
+            <a:chExt cx="1736439" cy="1006120"/>
+          </a:xfrm>
+        </p:grpSpPr>
+        <p:sp>
+          <p:nvSpPr>
+            <p:cNvPr id="65" name="Rechteck 64">
+              <a:extLst>
+                <a:ext uri="{FF2B5EF4-FFF2-40B4-BE49-F238E27FC236}">
+                  <a16:creationId xmlns:a16="http://schemas.microsoft.com/office/drawing/2014/main" id="{472ED79F-C869-48EC-9391-C60D00AEEACF}"/>
+                </a:ext>
+              </a:extLst>
+            </p:cNvPr>
+            <p:cNvSpPr/>
+            <p:nvPr/>
+          </p:nvSpPr>
+          <p:spPr>
+            <a:xfrm>
+              <a:off x="1539012" y="3197196"/>
+              <a:ext cx="1736436" cy="288000"/>
+            </a:xfrm>
+            <a:prstGeom prst="rect">
+              <a:avLst/>
+            </a:prstGeom>
+            <a:solidFill>
+              <a:schemeClr val="bg1">
+                <a:lumMod val="95000"/>
+              </a:schemeClr>
+            </a:solidFill>
+            <a:ln>
+              <a:noFill/>
+            </a:ln>
+          </p:spPr>
+          <p:style>
+            <a:lnRef idx="2">
+              <a:schemeClr val="accent3">
+                <a:shade val="50000"/>
+              </a:schemeClr>
+            </a:lnRef>
+            <a:fillRef idx="1">
+              <a:schemeClr val="accent3"/>
+            </a:fillRef>
+            <a:effectRef idx="0">
+              <a:schemeClr val="accent3"/>
+            </a:effectRef>
+            <a:fontRef idx="minor">
+              <a:schemeClr val="lt1"/>
+            </a:fontRef>
+          </p:style>
+          <p:txBody>
+            <a:bodyPr rtlCol="0" anchor="ctr"/>
+            <a:lstStyle/>
+            <a:p>
+              <a:pPr algn="ctr"/>
+              <a:r>
+                <a:rPr lang="de-AT" dirty="0">
+                  <a:solidFill>
+                    <a:schemeClr val="tx1">
+                      <a:lumMod val="75000"/>
+                      <a:lumOff val="25000"/>
+                    </a:schemeClr>
+                  </a:solidFill>
+                </a:rPr>
+                <a:t>IndexedDB</a:t>
+              </a:r>
+            </a:p>
+          </p:txBody>
+        </p:sp>
+        <p:sp>
+          <p:nvSpPr>
+            <p:cNvPr id="66" name="Rechteck 65">
+              <a:extLst>
+                <a:ext uri="{FF2B5EF4-FFF2-40B4-BE49-F238E27FC236}">
+                  <a16:creationId xmlns:a16="http://schemas.microsoft.com/office/drawing/2014/main" id="{DD32F5C2-DFC1-4D2B-890A-532C35A6373D}"/>
+                </a:ext>
+              </a:extLst>
+            </p:cNvPr>
+            <p:cNvSpPr/>
+            <p:nvPr/>
+          </p:nvSpPr>
+          <p:spPr>
+            <a:xfrm>
+              <a:off x="1539014" y="2905731"/>
+              <a:ext cx="1736436" cy="288000"/>
+            </a:xfrm>
+            <a:prstGeom prst="rect">
+              <a:avLst/>
+            </a:prstGeom>
+            <a:solidFill>
+              <a:schemeClr val="tx1">
+                <a:lumMod val="75000"/>
+                <a:lumOff val="25000"/>
+              </a:schemeClr>
+            </a:solidFill>
+            <a:ln>
+              <a:noFill/>
+            </a:ln>
+          </p:spPr>
+          <p:style>
+            <a:lnRef idx="2">
+              <a:schemeClr val="accent3">
+                <a:shade val="50000"/>
+              </a:schemeClr>
+            </a:lnRef>
+            <a:fillRef idx="1">
+              <a:schemeClr val="accent3"/>
+            </a:fillRef>
+            <a:effectRef idx="0">
+              <a:schemeClr val="accent3"/>
+            </a:effectRef>
+            <a:fontRef idx="minor">
+              <a:schemeClr val="lt1"/>
+            </a:fontRef>
+          </p:style>
+          <p:txBody>
+            <a:bodyPr rtlCol="0" anchor="ctr"/>
+            <a:lstStyle/>
+            <a:p>
+              <a:pPr algn="ctr"/>
+              <a:r>
+                <a:rPr lang="de-AT" sz="1600" dirty="0">
+                  <a:solidFill>
+                    <a:schemeClr val="bg1"/>
+                  </a:solidFill>
+                </a:rPr>
+                <a:t>Dexie.js Wrapper</a:t>
+              </a:r>
+            </a:p>
+          </p:txBody>
+        </p:sp>
+        <p:sp>
+          <p:nvSpPr>
+            <p:cNvPr id="68" name="Rechteck 67">
+              <a:extLst>
+                <a:ext uri="{FF2B5EF4-FFF2-40B4-BE49-F238E27FC236}">
+                  <a16:creationId xmlns:a16="http://schemas.microsoft.com/office/drawing/2014/main" id="{9E9E27B5-F460-479E-945B-74EE9EDABDE4}"/>
+                </a:ext>
+              </a:extLst>
+            </p:cNvPr>
+            <p:cNvSpPr/>
+            <p:nvPr/>
+          </p:nvSpPr>
+          <p:spPr>
+            <a:xfrm>
+              <a:off x="1539012" y="2479532"/>
+              <a:ext cx="1736438" cy="1006120"/>
+            </a:xfrm>
+            <a:prstGeom prst="rect">
+              <a:avLst/>
+            </a:prstGeom>
+            <a:noFill/>
+          </p:spPr>
+          <p:style>
+            <a:lnRef idx="2">
+              <a:schemeClr val="accent3">
+                <a:shade val="50000"/>
+              </a:schemeClr>
+            </a:lnRef>
+            <a:fillRef idx="1">
+              <a:schemeClr val="accent3"/>
+            </a:fillRef>
+            <a:effectRef idx="0">
+              <a:schemeClr val="accent3"/>
+            </a:effectRef>
+            <a:fontRef idx="minor">
+              <a:schemeClr val="lt1"/>
+            </a:fontRef>
+          </p:style>
+          <p:txBody>
+            <a:bodyPr rtlCol="0" anchor="ctr"/>
+            <a:lstStyle/>
+            <a:p>
+              <a:pPr algn="ctr"/>
+              <a:endParaRPr lang="de-AT" dirty="0">
+                <a:solidFill>
+                  <a:schemeClr val="tx1">
+                    <a:lumMod val="75000"/>
+                    <a:lumOff val="25000"/>
+                  </a:schemeClr>
+                </a:solidFill>
+              </a:endParaRPr>
+            </a:p>
+          </p:txBody>
+        </p:sp>
+        <p:sp>
+          <p:nvSpPr>
+            <p:cNvPr id="79" name="Textfeld 78">
+              <a:extLst>
+                <a:ext uri="{FF2B5EF4-FFF2-40B4-BE49-F238E27FC236}">
+                  <a16:creationId xmlns:a16="http://schemas.microsoft.com/office/drawing/2014/main" id="{ACF23900-81B4-42B7-8297-7CEA11FF3A65}"/>
+                </a:ext>
+              </a:extLst>
+            </p:cNvPr>
+            <p:cNvSpPr txBox="1"/>
+            <p:nvPr/>
+          </p:nvSpPr>
+          <p:spPr>
+            <a:xfrm>
+              <a:off x="1539011" y="2533236"/>
+              <a:ext cx="1736437" cy="323165"/>
+            </a:xfrm>
+            <a:prstGeom prst="rect">
+              <a:avLst/>
+            </a:prstGeom>
+            <a:noFill/>
+          </p:spPr>
+          <p:txBody>
+            <a:bodyPr wrap="square" rtlCol="0">
+              <a:spAutoFit/>
+            </a:bodyPr>
+            <a:lstStyle/>
+            <a:p>
+              <a:pPr algn="ctr"/>
+              <a:r>
+                <a:rPr lang="de-DE" sz="1500" dirty="0"/>
+                <a:t>Artikel</a:t>
+              </a:r>
+              <a:endParaRPr lang="de-AT" sz="1500" dirty="0"/>
+            </a:p>
+          </p:txBody>
+        </p:sp>
+      </p:grpSp>
+      <p:grpSp>
+        <p:nvGrpSpPr>
+          <p:cNvPr id="151" name="Gruppieren 150">
+            <a:extLst>
+              <a:ext uri="{FF2B5EF4-FFF2-40B4-BE49-F238E27FC236}">
+                <a16:creationId xmlns:a16="http://schemas.microsoft.com/office/drawing/2014/main" id="{04480D68-47CF-42A5-94F5-0A821ECDBA1B}"/>
+              </a:ext>
+            </a:extLst>
+          </p:cNvPr>
+          <p:cNvGrpSpPr/>
+          <p:nvPr/>
+        </p:nvGrpSpPr>
+        <p:grpSpPr>
+          <a:xfrm>
+            <a:off x="4844860" y="2021674"/>
+            <a:ext cx="2027400" cy="1022696"/>
+            <a:chOff x="3450751" y="2480733"/>
+            <a:chExt cx="2027400" cy="1022696"/>
+          </a:xfrm>
+        </p:grpSpPr>
+        <p:sp>
+          <p:nvSpPr>
+            <p:cNvPr id="15" name="Rechteck 14">
+              <a:extLst>
+                <a:ext uri="{FF2B5EF4-FFF2-40B4-BE49-F238E27FC236}">
+                  <a16:creationId xmlns:a16="http://schemas.microsoft.com/office/drawing/2014/main" id="{265CF3EF-49DF-44B1-AECF-C2D0B6FEDEA3}"/>
+                </a:ext>
+              </a:extLst>
+            </p:cNvPr>
+            <p:cNvSpPr/>
+            <p:nvPr/>
+          </p:nvSpPr>
+          <p:spPr>
+            <a:xfrm>
+              <a:off x="3723975" y="3200274"/>
+              <a:ext cx="1736436" cy="288000"/>
+            </a:xfrm>
+            <a:prstGeom prst="rect">
+              <a:avLst/>
+            </a:prstGeom>
+            <a:solidFill>
+              <a:schemeClr val="bg1">
+                <a:lumMod val="95000"/>
+              </a:schemeClr>
+            </a:solidFill>
+            <a:ln>
+              <a:noFill/>
+            </a:ln>
+          </p:spPr>
+          <p:style>
+            <a:lnRef idx="2">
+              <a:schemeClr val="accent3">
+                <a:shade val="50000"/>
+              </a:schemeClr>
+            </a:lnRef>
+            <a:fillRef idx="1">
+              <a:schemeClr val="accent3"/>
+            </a:fillRef>
+            <a:effectRef idx="0">
+              <a:schemeClr val="accent3"/>
+            </a:effectRef>
+            <a:fontRef idx="minor">
+              <a:schemeClr val="lt1"/>
+            </a:fontRef>
+          </p:style>
+          <p:txBody>
+            <a:bodyPr rtlCol="0" anchor="ctr"/>
+            <a:lstStyle/>
+            <a:p>
+              <a:pPr algn="ctr"/>
+              <a:r>
+                <a:rPr lang="de-AT" dirty="0">
+                  <a:solidFill>
+                    <a:schemeClr val="tx1">
+                      <a:lumMod val="75000"/>
+                      <a:lumOff val="25000"/>
+                    </a:schemeClr>
+                  </a:solidFill>
+                </a:rPr>
+                <a:t>IndexedDB</a:t>
+              </a:r>
+            </a:p>
+          </p:txBody>
+        </p:sp>
+        <p:sp>
+          <p:nvSpPr>
+            <p:cNvPr id="16" name="Rechteck 15">
+              <a:extLst>
+                <a:ext uri="{FF2B5EF4-FFF2-40B4-BE49-F238E27FC236}">
+                  <a16:creationId xmlns:a16="http://schemas.microsoft.com/office/drawing/2014/main" id="{2236C9AA-5793-4128-8702-703625ED91E7}"/>
+                </a:ext>
+              </a:extLst>
+            </p:cNvPr>
+            <p:cNvSpPr/>
+            <p:nvPr/>
+          </p:nvSpPr>
+          <p:spPr>
+            <a:xfrm>
+              <a:off x="3741715" y="2896546"/>
+              <a:ext cx="1736436" cy="288000"/>
+            </a:xfrm>
+            <a:prstGeom prst="rect">
+              <a:avLst/>
+            </a:prstGeom>
+            <a:solidFill>
+              <a:schemeClr val="tx1">
+                <a:lumMod val="75000"/>
+                <a:lumOff val="25000"/>
+              </a:schemeClr>
+            </a:solidFill>
+            <a:ln>
+              <a:noFill/>
+            </a:ln>
+          </p:spPr>
+          <p:style>
+            <a:lnRef idx="2">
+              <a:schemeClr val="accent3">
+                <a:shade val="50000"/>
+              </a:schemeClr>
+            </a:lnRef>
+            <a:fillRef idx="1">
+              <a:schemeClr val="accent3"/>
+            </a:fillRef>
+            <a:effectRef idx="0">
+              <a:schemeClr val="accent3"/>
+            </a:effectRef>
+            <a:fontRef idx="minor">
+              <a:schemeClr val="lt1"/>
+            </a:fontRef>
+          </p:style>
+          <p:txBody>
+            <a:bodyPr rtlCol="0" anchor="ctr"/>
+            <a:lstStyle/>
+            <a:p>
+              <a:pPr algn="ctr"/>
+              <a:r>
+                <a:rPr lang="de-AT" sz="1600" dirty="0">
+                  <a:solidFill>
+                    <a:schemeClr val="bg1"/>
+                  </a:solidFill>
+                </a:rPr>
+                <a:t>Dexie.js Wrapper</a:t>
+              </a:r>
+            </a:p>
+          </p:txBody>
+        </p:sp>
+        <p:sp>
+          <p:nvSpPr>
+            <p:cNvPr id="33" name="Rechteck 32">
+              <a:extLst>
+                <a:ext uri="{FF2B5EF4-FFF2-40B4-BE49-F238E27FC236}">
+                  <a16:creationId xmlns:a16="http://schemas.microsoft.com/office/drawing/2014/main" id="{E49A1FE2-7313-49CC-BBE2-6ABDAB4A32A2}"/>
+                </a:ext>
+              </a:extLst>
+            </p:cNvPr>
+            <p:cNvSpPr/>
+            <p:nvPr/>
+          </p:nvSpPr>
+          <p:spPr>
+            <a:xfrm rot="16200000">
+              <a:off x="3107348" y="2893559"/>
+              <a:ext cx="1006119" cy="213622"/>
+            </a:xfrm>
+            <a:prstGeom prst="rect">
+              <a:avLst/>
+            </a:prstGeom>
+            <a:solidFill>
+              <a:schemeClr val="bg1"/>
+            </a:solidFill>
+            <a:ln>
+              <a:noFill/>
+            </a:ln>
+          </p:spPr>
+          <p:style>
+            <a:lnRef idx="2">
+              <a:schemeClr val="accent3">
+                <a:shade val="50000"/>
+              </a:schemeClr>
+            </a:lnRef>
+            <a:fillRef idx="1">
+              <a:schemeClr val="accent3"/>
+            </a:fillRef>
+            <a:effectRef idx="0">
+              <a:schemeClr val="accent3"/>
+            </a:effectRef>
+            <a:fontRef idx="minor">
+              <a:schemeClr val="lt1"/>
+            </a:fontRef>
+          </p:style>
+          <p:txBody>
+            <a:bodyPr rtlCol="0" anchor="ctr"/>
+            <a:lstStyle/>
+            <a:p>
+              <a:pPr algn="ctr">
+                <a:lnSpc>
+                  <a:spcPct val="80000"/>
+                </a:lnSpc>
+              </a:pPr>
+              <a:r>
+                <a:rPr lang="de-AT" sz="1600" dirty="0">
+                  <a:solidFill>
+                    <a:schemeClr val="tx1">
+                      <a:lumMod val="85000"/>
+                      <a:lumOff val="15000"/>
+                    </a:schemeClr>
+                  </a:solidFill>
+                </a:rPr>
+                <a:t>Queue</a:t>
+              </a:r>
+            </a:p>
+          </p:txBody>
+        </p:sp>
+        <p:sp>
+          <p:nvSpPr>
+            <p:cNvPr id="34" name="Rechteck 33">
+              <a:extLst>
+                <a:ext uri="{FF2B5EF4-FFF2-40B4-BE49-F238E27FC236}">
+                  <a16:creationId xmlns:a16="http://schemas.microsoft.com/office/drawing/2014/main" id="{DA1B7682-310D-46F0-8DD2-68FFBFF164A9}"/>
+                </a:ext>
+              </a:extLst>
+            </p:cNvPr>
+            <p:cNvSpPr/>
+            <p:nvPr/>
+          </p:nvSpPr>
+          <p:spPr>
+            <a:xfrm>
+              <a:off x="3450751" y="2480733"/>
+              <a:ext cx="2025365" cy="1006120"/>
+            </a:xfrm>
+            <a:prstGeom prst="rect">
+              <a:avLst/>
+            </a:prstGeom>
+            <a:noFill/>
+          </p:spPr>
+          <p:style>
+            <a:lnRef idx="2">
+              <a:schemeClr val="accent3">
+                <a:shade val="50000"/>
+              </a:schemeClr>
+            </a:lnRef>
+            <a:fillRef idx="1">
+              <a:schemeClr val="accent3"/>
+            </a:fillRef>
+            <a:effectRef idx="0">
+              <a:schemeClr val="accent3"/>
+            </a:effectRef>
+            <a:fontRef idx="minor">
+              <a:schemeClr val="lt1"/>
+            </a:fontRef>
+          </p:style>
+          <p:txBody>
+            <a:bodyPr rtlCol="0" anchor="ctr"/>
+            <a:lstStyle/>
+            <a:p>
+              <a:pPr algn="ctr"/>
+              <a:endParaRPr lang="de-AT" dirty="0">
+                <a:solidFill>
+                  <a:schemeClr val="tx1">
+                    <a:lumMod val="75000"/>
+                    <a:lumOff val="25000"/>
+                  </a:schemeClr>
+                </a:solidFill>
+              </a:endParaRPr>
+            </a:p>
+          </p:txBody>
+        </p:sp>
+        <p:sp>
+          <p:nvSpPr>
+            <p:cNvPr id="97" name="Textfeld 96">
+              <a:extLst>
+                <a:ext uri="{FF2B5EF4-FFF2-40B4-BE49-F238E27FC236}">
+                  <a16:creationId xmlns:a16="http://schemas.microsoft.com/office/drawing/2014/main" id="{E2FD32BF-2B58-46EE-A7C4-435289FFFE69}"/>
+                </a:ext>
+              </a:extLst>
+            </p:cNvPr>
+            <p:cNvSpPr txBox="1"/>
+            <p:nvPr/>
+          </p:nvSpPr>
+          <p:spPr>
+            <a:xfrm>
+              <a:off x="3733862" y="2524601"/>
+              <a:ext cx="1736437" cy="323165"/>
+            </a:xfrm>
+            <a:prstGeom prst="rect">
+              <a:avLst/>
+            </a:prstGeom>
+            <a:noFill/>
+          </p:spPr>
+          <p:txBody>
+            <a:bodyPr wrap="square" rtlCol="0">
+              <a:spAutoFit/>
+            </a:bodyPr>
+            <a:lstStyle/>
+            <a:p>
+              <a:pPr algn="ctr"/>
+              <a:r>
+                <a:rPr lang="de-DE" sz="1500" dirty="0"/>
+                <a:t>Requests</a:t>
+              </a:r>
+              <a:endParaRPr lang="de-AT" sz="1500" dirty="0"/>
+            </a:p>
+          </p:txBody>
+        </p:sp>
+        <p:cxnSp>
+          <p:nvCxnSpPr>
+            <p:cNvPr id="100" name="Gerader Verbinder 99">
+              <a:extLst>
+                <a:ext uri="{FF2B5EF4-FFF2-40B4-BE49-F238E27FC236}">
+                  <a16:creationId xmlns:a16="http://schemas.microsoft.com/office/drawing/2014/main" id="{074DB98C-EB19-4877-B288-B255B423D626}"/>
+                </a:ext>
+              </a:extLst>
+            </p:cNvPr>
+            <p:cNvCxnSpPr>
+              <a:cxnSpLocks/>
+            </p:cNvCxnSpPr>
+            <p:nvPr/>
+          </p:nvCxnSpPr>
+          <p:spPr>
+            <a:xfrm flipV="1">
+              <a:off x="3741715" y="2480733"/>
+              <a:ext cx="0" cy="1006120"/>
+            </a:xfrm>
+            <a:prstGeom prst="line">
+              <a:avLst/>
+            </a:prstGeom>
+            <a:ln w="12700">
+              <a:solidFill>
+                <a:schemeClr val="tx1">
+                  <a:lumMod val="50000"/>
+                  <a:lumOff val="50000"/>
+                </a:schemeClr>
+              </a:solidFill>
+            </a:ln>
+          </p:spPr>
+          <p:style>
+            <a:lnRef idx="1">
+              <a:schemeClr val="accent1"/>
+            </a:lnRef>
+            <a:fillRef idx="0">
+              <a:schemeClr val="accent1"/>
+            </a:fillRef>
+            <a:effectRef idx="0">
+              <a:schemeClr val="accent1"/>
+            </a:effectRef>
+            <a:fontRef idx="minor">
+              <a:schemeClr val="tx1"/>
+            </a:fontRef>
+          </p:style>
+        </p:cxnSp>
+      </p:grpSp>
+      <p:cxnSp>
+        <p:nvCxnSpPr>
+          <p:cNvPr id="104" name="Verbinder: gewinkelt 103">
+            <a:extLst>
+              <a:ext uri="{FF2B5EF4-FFF2-40B4-BE49-F238E27FC236}">
+                <a16:creationId xmlns:a16="http://schemas.microsoft.com/office/drawing/2014/main" id="{AEAFCCAC-C6F0-4427-84E3-1CA53E40C7DA}"/>
+              </a:ext>
+            </a:extLst>
+          </p:cNvPr>
+          <p:cNvCxnSpPr>
+            <a:cxnSpLocks/>
+            <a:stCxn id="79" idx="1"/>
+            <a:endCxn id="12" idx="1"/>
+          </p:cNvCxnSpPr>
+          <p:nvPr/>
+        </p:nvCxnSpPr>
+        <p:spPr>
+          <a:xfrm rot="10800000" flipH="1">
+            <a:off x="2862776" y="1011872"/>
+            <a:ext cx="4763" cy="1232140"/>
+          </a:xfrm>
+          <a:prstGeom prst="bentConnector3">
+            <a:avLst>
+              <a:gd name="adj1" fmla="val -4799496"/>
+            </a:avLst>
+          </a:prstGeom>
+          <a:ln w="12700">
+            <a:solidFill>
+              <a:schemeClr val="tx1">
+                <a:lumMod val="75000"/>
+                <a:lumOff val="25000"/>
+              </a:schemeClr>
+            </a:solidFill>
+            <a:tailEnd type="triangle"/>
+          </a:ln>
+        </p:spPr>
+        <p:style>
+          <a:lnRef idx="1">
+            <a:schemeClr val="dk1"/>
+          </a:lnRef>
+          <a:fillRef idx="0">
+            <a:schemeClr val="dk1"/>
+          </a:fillRef>
+          <a:effectRef idx="0">
+            <a:schemeClr val="dk1"/>
+          </a:effectRef>
+          <a:fontRef idx="minor">
+            <a:schemeClr val="tx1"/>
+          </a:fontRef>
+        </p:style>
+      </p:cxnSp>
+      <p:grpSp>
+        <p:nvGrpSpPr>
+          <p:cNvPr id="152" name="Gruppieren 151">
+            <a:extLst>
+              <a:ext uri="{FF2B5EF4-FFF2-40B4-BE49-F238E27FC236}">
+                <a16:creationId xmlns:a16="http://schemas.microsoft.com/office/drawing/2014/main" id="{1FE68527-C334-4CF6-AD0C-B7E13BF02E39}"/>
+              </a:ext>
+            </a:extLst>
+          </p:cNvPr>
+          <p:cNvGrpSpPr/>
+          <p:nvPr/>
+        </p:nvGrpSpPr>
+        <p:grpSpPr>
+          <a:xfrm>
+            <a:off x="7141884" y="2021674"/>
+            <a:ext cx="2027400" cy="1022696"/>
+            <a:chOff x="5703771" y="2467964"/>
+            <a:chExt cx="2027400" cy="1022696"/>
+          </a:xfrm>
+        </p:grpSpPr>
+        <p:sp>
+          <p:nvSpPr>
+            <p:cNvPr id="107" name="Rechteck 106">
+              <a:extLst>
+                <a:ext uri="{FF2B5EF4-FFF2-40B4-BE49-F238E27FC236}">
+                  <a16:creationId xmlns:a16="http://schemas.microsoft.com/office/drawing/2014/main" id="{A45A93BD-3ED6-4D4E-ADCF-F0D0A9C17E13}"/>
+                </a:ext>
+              </a:extLst>
+            </p:cNvPr>
+            <p:cNvSpPr/>
+            <p:nvPr/>
+          </p:nvSpPr>
+          <p:spPr>
+            <a:xfrm>
+              <a:off x="5976995" y="3174945"/>
+              <a:ext cx="1736436" cy="288000"/>
+            </a:xfrm>
+            <a:prstGeom prst="rect">
+              <a:avLst/>
+            </a:prstGeom>
+            <a:solidFill>
+              <a:schemeClr val="bg1">
+                <a:lumMod val="95000"/>
+              </a:schemeClr>
+            </a:solidFill>
+            <a:ln>
+              <a:noFill/>
+            </a:ln>
+          </p:spPr>
+          <p:style>
+            <a:lnRef idx="2">
+              <a:schemeClr val="accent3">
+                <a:shade val="50000"/>
+              </a:schemeClr>
+            </a:lnRef>
+            <a:fillRef idx="1">
+              <a:schemeClr val="accent3"/>
+            </a:fillRef>
+            <a:effectRef idx="0">
+              <a:schemeClr val="accent3"/>
+            </a:effectRef>
+            <a:fontRef idx="minor">
+              <a:schemeClr val="lt1"/>
+            </a:fontRef>
+          </p:style>
+          <p:txBody>
+            <a:bodyPr rtlCol="0" anchor="ctr"/>
+            <a:lstStyle/>
+            <a:p>
+              <a:pPr algn="ctr"/>
+              <a:r>
+                <a:rPr lang="de-AT" dirty="0">
+                  <a:solidFill>
+                    <a:schemeClr val="tx1">
+                      <a:lumMod val="75000"/>
+                      <a:lumOff val="25000"/>
+                    </a:schemeClr>
+                  </a:solidFill>
+                </a:rPr>
+                <a:t>IndexedDB</a:t>
+              </a:r>
+            </a:p>
+          </p:txBody>
+        </p:sp>
+        <p:sp>
+          <p:nvSpPr>
+            <p:cNvPr id="108" name="Rechteck 107">
+              <a:extLst>
+                <a:ext uri="{FF2B5EF4-FFF2-40B4-BE49-F238E27FC236}">
+                  <a16:creationId xmlns:a16="http://schemas.microsoft.com/office/drawing/2014/main" id="{6D0932E5-51F8-4BA4-B42A-B728753A704E}"/>
+                </a:ext>
+              </a:extLst>
+            </p:cNvPr>
+            <p:cNvSpPr/>
+            <p:nvPr/>
+          </p:nvSpPr>
+          <p:spPr>
+            <a:xfrm>
+              <a:off x="5994735" y="2883777"/>
+              <a:ext cx="1736436" cy="288000"/>
+            </a:xfrm>
+            <a:prstGeom prst="rect">
+              <a:avLst/>
+            </a:prstGeom>
+            <a:solidFill>
+              <a:schemeClr val="tx1">
+                <a:lumMod val="75000"/>
+                <a:lumOff val="25000"/>
+              </a:schemeClr>
+            </a:solidFill>
+            <a:ln>
+              <a:noFill/>
+            </a:ln>
+          </p:spPr>
+          <p:style>
+            <a:lnRef idx="2">
+              <a:schemeClr val="accent3">
+                <a:shade val="50000"/>
+              </a:schemeClr>
+            </a:lnRef>
+            <a:fillRef idx="1">
+              <a:schemeClr val="accent3"/>
+            </a:fillRef>
+            <a:effectRef idx="0">
+              <a:schemeClr val="accent3"/>
+            </a:effectRef>
+            <a:fontRef idx="minor">
+              <a:schemeClr val="lt1"/>
+            </a:fontRef>
+          </p:style>
+          <p:txBody>
+            <a:bodyPr rtlCol="0" anchor="ctr"/>
+            <a:lstStyle/>
+            <a:p>
+              <a:pPr algn="ctr"/>
+              <a:r>
+                <a:rPr lang="de-AT" sz="1600" dirty="0">
+                  <a:solidFill>
+                    <a:schemeClr val="bg1"/>
+                  </a:solidFill>
+                </a:rPr>
+                <a:t>Dexie.js Wrapper</a:t>
+              </a:r>
+            </a:p>
+          </p:txBody>
+        </p:sp>
+        <p:sp>
+          <p:nvSpPr>
+            <p:cNvPr id="109" name="Rechteck 108">
+              <a:extLst>
+                <a:ext uri="{FF2B5EF4-FFF2-40B4-BE49-F238E27FC236}">
+                  <a16:creationId xmlns:a16="http://schemas.microsoft.com/office/drawing/2014/main" id="{8D7F9BF9-7C49-40EB-8193-6EE257148DCB}"/>
+                </a:ext>
+              </a:extLst>
+            </p:cNvPr>
+            <p:cNvSpPr/>
+            <p:nvPr/>
+          </p:nvSpPr>
+          <p:spPr>
+            <a:xfrm rot="16200000">
+              <a:off x="5360368" y="2880790"/>
+              <a:ext cx="1006119" cy="213622"/>
+            </a:xfrm>
+            <a:prstGeom prst="rect">
+              <a:avLst/>
+            </a:prstGeom>
+            <a:solidFill>
+              <a:schemeClr val="bg1"/>
+            </a:solidFill>
+            <a:ln>
+              <a:noFill/>
+            </a:ln>
+          </p:spPr>
+          <p:style>
+            <a:lnRef idx="2">
+              <a:schemeClr val="accent3">
+                <a:shade val="50000"/>
+              </a:schemeClr>
+            </a:lnRef>
+            <a:fillRef idx="1">
+              <a:schemeClr val="accent3"/>
+            </a:fillRef>
+            <a:effectRef idx="0">
+              <a:schemeClr val="accent3"/>
+            </a:effectRef>
+            <a:fontRef idx="minor">
+              <a:schemeClr val="lt1"/>
+            </a:fontRef>
+          </p:style>
+          <p:txBody>
+            <a:bodyPr rtlCol="0" anchor="ctr"/>
+            <a:lstStyle/>
+            <a:p>
+              <a:pPr algn="ctr">
+                <a:lnSpc>
+                  <a:spcPct val="80000"/>
+                </a:lnSpc>
+              </a:pPr>
+              <a:r>
+                <a:rPr lang="de-AT" sz="1600" dirty="0">
+                  <a:solidFill>
+                    <a:schemeClr val="tx1">
+                      <a:lumMod val="85000"/>
+                      <a:lumOff val="15000"/>
+                    </a:schemeClr>
+                  </a:solidFill>
+                </a:rPr>
+                <a:t>Queue</a:t>
+              </a:r>
+            </a:p>
+          </p:txBody>
+        </p:sp>
+        <p:sp>
+          <p:nvSpPr>
+            <p:cNvPr id="110" name="Rechteck 109">
+              <a:extLst>
+                <a:ext uri="{FF2B5EF4-FFF2-40B4-BE49-F238E27FC236}">
+                  <a16:creationId xmlns:a16="http://schemas.microsoft.com/office/drawing/2014/main" id="{B135DFB0-56C1-4F04-AF8E-1DA9661D0ED1}"/>
+                </a:ext>
+              </a:extLst>
+            </p:cNvPr>
+            <p:cNvSpPr/>
+            <p:nvPr/>
+          </p:nvSpPr>
+          <p:spPr>
+            <a:xfrm>
+              <a:off x="5703771" y="2467964"/>
+              <a:ext cx="2025365" cy="1006120"/>
+            </a:xfrm>
+            <a:prstGeom prst="rect">
+              <a:avLst/>
+            </a:prstGeom>
+            <a:noFill/>
+          </p:spPr>
+          <p:style>
+            <a:lnRef idx="2">
+              <a:schemeClr val="accent3">
+                <a:shade val="50000"/>
+              </a:schemeClr>
+            </a:lnRef>
+            <a:fillRef idx="1">
+              <a:schemeClr val="accent3"/>
+            </a:fillRef>
+            <a:effectRef idx="0">
+              <a:schemeClr val="accent3"/>
+            </a:effectRef>
+            <a:fontRef idx="minor">
+              <a:schemeClr val="lt1"/>
+            </a:fontRef>
+          </p:style>
+          <p:txBody>
+            <a:bodyPr rtlCol="0" anchor="ctr"/>
+            <a:lstStyle/>
+            <a:p>
+              <a:pPr algn="ctr"/>
+              <a:endParaRPr lang="de-AT" dirty="0">
+                <a:solidFill>
+                  <a:schemeClr val="tx1">
+                    <a:lumMod val="75000"/>
+                    <a:lumOff val="25000"/>
+                  </a:schemeClr>
+                </a:solidFill>
+              </a:endParaRPr>
+            </a:p>
+          </p:txBody>
+        </p:sp>
+        <p:sp>
+          <p:nvSpPr>
+            <p:cNvPr id="111" name="Textfeld 110">
+              <a:extLst>
+                <a:ext uri="{FF2B5EF4-FFF2-40B4-BE49-F238E27FC236}">
+                  <a16:creationId xmlns:a16="http://schemas.microsoft.com/office/drawing/2014/main" id="{7D15EA0E-E480-4F2B-AE4C-04AA702C8211}"/>
+                </a:ext>
+              </a:extLst>
+            </p:cNvPr>
+            <p:cNvSpPr txBox="1"/>
+            <p:nvPr/>
+          </p:nvSpPr>
+          <p:spPr>
+            <a:xfrm>
+              <a:off x="5994734" y="2511832"/>
+              <a:ext cx="1736436" cy="323165"/>
+            </a:xfrm>
+            <a:prstGeom prst="rect">
+              <a:avLst/>
+            </a:prstGeom>
+            <a:noFill/>
+          </p:spPr>
+          <p:txBody>
+            <a:bodyPr wrap="square" rtlCol="0">
+              <a:spAutoFit/>
+            </a:bodyPr>
+            <a:lstStyle/>
+            <a:p>
+              <a:pPr algn="ctr"/>
+              <a:r>
+                <a:rPr lang="de-DE" sz="1500" dirty="0"/>
+                <a:t>Benachrichtigungen</a:t>
+              </a:r>
+              <a:endParaRPr lang="de-AT" sz="1500" dirty="0"/>
+            </a:p>
+          </p:txBody>
+        </p:sp>
+        <p:cxnSp>
+          <p:nvCxnSpPr>
+            <p:cNvPr id="112" name="Gerader Verbinder 111">
+              <a:extLst>
+                <a:ext uri="{FF2B5EF4-FFF2-40B4-BE49-F238E27FC236}">
+                  <a16:creationId xmlns:a16="http://schemas.microsoft.com/office/drawing/2014/main" id="{DD07A9F7-4A54-4EA7-A823-4735B5A07BFD}"/>
+                </a:ext>
+              </a:extLst>
+            </p:cNvPr>
+            <p:cNvCxnSpPr>
+              <a:cxnSpLocks/>
+            </p:cNvCxnSpPr>
+            <p:nvPr/>
+          </p:nvCxnSpPr>
+          <p:spPr>
+            <a:xfrm flipV="1">
+              <a:off x="5994735" y="2467964"/>
+              <a:ext cx="0" cy="1006120"/>
+            </a:xfrm>
+            <a:prstGeom prst="line">
+              <a:avLst/>
+            </a:prstGeom>
+            <a:ln w="12700">
+              <a:solidFill>
+                <a:schemeClr val="tx1">
+                  <a:lumMod val="50000"/>
+                  <a:lumOff val="50000"/>
+                </a:schemeClr>
+              </a:solidFill>
+            </a:ln>
+          </p:spPr>
+          <p:style>
+            <a:lnRef idx="1">
+              <a:schemeClr val="accent1"/>
+            </a:lnRef>
+            <a:fillRef idx="0">
+              <a:schemeClr val="accent1"/>
+            </a:fillRef>
+            <a:effectRef idx="0">
+              <a:schemeClr val="accent1"/>
+            </a:effectRef>
+            <a:fontRef idx="minor">
+              <a:schemeClr val="tx1"/>
+            </a:fontRef>
+          </p:style>
+        </p:cxnSp>
+      </p:grpSp>
+      <p:sp>
+        <p:nvSpPr>
+          <p:cNvPr id="136" name="Rechteck 135">
+            <a:extLst>
+              <a:ext uri="{FF2B5EF4-FFF2-40B4-BE49-F238E27FC236}">
+                <a16:creationId xmlns:a16="http://schemas.microsoft.com/office/drawing/2014/main" id="{AB04BD06-FB2F-43DA-B124-E693CCB103A3}"/>
+              </a:ext>
+            </a:extLst>
+          </p:cNvPr>
+          <p:cNvSpPr/>
+          <p:nvPr/>
+        </p:nvSpPr>
+        <p:spPr>
+          <a:xfrm>
+            <a:off x="7900945" y="1225060"/>
+            <a:ext cx="1260000" cy="432000"/>
+          </a:xfrm>
+          <a:prstGeom prst="rect">
+            <a:avLst/>
+          </a:prstGeom>
+          <a:solidFill>
+            <a:schemeClr val="bg1"/>
+          </a:solidFill>
+        </p:spPr>
+        <p:style>
+          <a:lnRef idx="2">
+            <a:schemeClr val="accent3">
+              <a:shade val="50000"/>
+            </a:schemeClr>
+          </a:lnRef>
+          <a:fillRef idx="1">
+            <a:schemeClr val="accent3"/>
+          </a:fillRef>
+          <a:effectRef idx="0">
+            <a:schemeClr val="accent3"/>
+          </a:effectRef>
+          <a:fontRef idx="minor">
+            <a:schemeClr val="lt1"/>
+          </a:fontRef>
+        </p:style>
+        <p:txBody>
+          <a:bodyPr rtlCol="0" anchor="ctr"/>
+          <a:lstStyle/>
+          <a:p>
+            <a:pPr algn="ctr"/>
+            <a:r>
+              <a:rPr lang="de-AT" dirty="0">
+                <a:solidFill>
+                  <a:schemeClr val="tx1">
+                    <a:lumMod val="75000"/>
+                    <a:lumOff val="25000"/>
+                  </a:schemeClr>
+                </a:solidFill>
+              </a:rPr>
+              <a:t>Get</a:t>
+            </a:r>
+          </a:p>
+        </p:txBody>
+      </p:sp>
+      <p:cxnSp>
+        <p:nvCxnSpPr>
+          <p:cNvPr id="155" name="Verbinder: gewinkelt 154">
+            <a:extLst>
+              <a:ext uri="{FF2B5EF4-FFF2-40B4-BE49-F238E27FC236}">
+                <a16:creationId xmlns:a16="http://schemas.microsoft.com/office/drawing/2014/main" id="{0261DD3B-FB1F-4647-B062-0C0301DC1638}"/>
+              </a:ext>
+            </a:extLst>
+          </p:cNvPr>
+          <p:cNvCxnSpPr>
+            <a:cxnSpLocks/>
+            <a:stCxn id="19" idx="3"/>
+            <a:endCxn id="19" idx="0"/>
+          </p:cNvCxnSpPr>
+          <p:nvPr/>
+        </p:nvCxnSpPr>
+        <p:spPr>
+          <a:xfrm flipH="1" flipV="1">
+            <a:off x="5956937" y="3341236"/>
+            <a:ext cx="914400" cy="350982"/>
+          </a:xfrm>
+          <a:prstGeom prst="bentConnector4">
+            <a:avLst>
+              <a:gd name="adj1" fmla="val -46688"/>
+              <a:gd name="adj2" fmla="val 139803"/>
+            </a:avLst>
+          </a:prstGeom>
+          <a:ln w="12700">
+            <a:solidFill>
+              <a:schemeClr val="tx1">
+                <a:lumMod val="75000"/>
+                <a:lumOff val="25000"/>
+              </a:schemeClr>
+            </a:solidFill>
+            <a:tailEnd type="triangle"/>
+          </a:ln>
+        </p:spPr>
+        <p:style>
+          <a:lnRef idx="1">
+            <a:schemeClr val="dk1"/>
+          </a:lnRef>
+          <a:fillRef idx="0">
+            <a:schemeClr val="dk1"/>
+          </a:fillRef>
+          <a:effectRef idx="0">
+            <a:schemeClr val="dk1"/>
+          </a:effectRef>
+          <a:fontRef idx="minor">
+            <a:schemeClr val="tx1"/>
+          </a:fontRef>
+        </p:style>
+      </p:cxnSp>
+      <p:sp>
+        <p:nvSpPr>
+          <p:cNvPr id="160" name="Rechteck 159">
+            <a:extLst>
+              <a:ext uri="{FF2B5EF4-FFF2-40B4-BE49-F238E27FC236}">
+                <a16:creationId xmlns:a16="http://schemas.microsoft.com/office/drawing/2014/main" id="{E957DC34-96EE-42F3-879E-B6D6302B7F8B}"/>
+              </a:ext>
+            </a:extLst>
+          </p:cNvPr>
+          <p:cNvSpPr/>
+          <p:nvPr/>
+        </p:nvSpPr>
+        <p:spPr>
+          <a:xfrm>
+            <a:off x="2785656" y="3542802"/>
+            <a:ext cx="1828800" cy="306159"/>
+          </a:xfrm>
+          <a:prstGeom prst="rect">
+            <a:avLst/>
+          </a:prstGeom>
+          <a:solidFill>
+            <a:schemeClr val="bg1">
+              <a:lumMod val="95000"/>
+            </a:schemeClr>
+          </a:solidFill>
+        </p:spPr>
+        <p:style>
+          <a:lnRef idx="2">
+            <a:schemeClr val="accent3">
+              <a:shade val="50000"/>
+            </a:schemeClr>
+          </a:lnRef>
+          <a:fillRef idx="1">
+            <a:schemeClr val="accent3"/>
+          </a:fillRef>
+          <a:effectRef idx="0">
+            <a:schemeClr val="accent3"/>
+          </a:effectRef>
+          <a:fontRef idx="minor">
+            <a:schemeClr val="lt1"/>
+          </a:fontRef>
+        </p:style>
+        <p:txBody>
+          <a:bodyPr rtlCol="0" anchor="ctr"/>
+          <a:lstStyle/>
+          <a:p>
+            <a:pPr algn="ctr"/>
+            <a:r>
+              <a:rPr lang="de-AT" sz="1400" dirty="0">
+                <a:solidFill>
+                  <a:schemeClr val="tx1">
+                    <a:lumMod val="75000"/>
+                    <a:lumOff val="25000"/>
+                  </a:schemeClr>
+                </a:solidFill>
+              </a:rPr>
+              <a:t>Queue abarbeiten</a:t>
+            </a:r>
+          </a:p>
+        </p:txBody>
+      </p:sp>
+      <p:sp>
+        <p:nvSpPr>
+          <p:cNvPr id="166" name="Rechteck 165">
+            <a:extLst>
+              <a:ext uri="{FF2B5EF4-FFF2-40B4-BE49-F238E27FC236}">
+                <a16:creationId xmlns:a16="http://schemas.microsoft.com/office/drawing/2014/main" id="{1D58B96C-96DA-4B1C-857B-4E427E12BFFE}"/>
+              </a:ext>
+            </a:extLst>
+          </p:cNvPr>
+          <p:cNvSpPr/>
+          <p:nvPr/>
+        </p:nvSpPr>
+        <p:spPr>
+          <a:xfrm>
+            <a:off x="5042537" y="4737305"/>
+            <a:ext cx="1828800" cy="561425"/>
+          </a:xfrm>
+          <a:prstGeom prst="rect">
+            <a:avLst/>
+          </a:prstGeom>
+          <a:solidFill>
+            <a:schemeClr val="bg1">
+              <a:lumMod val="95000"/>
+            </a:schemeClr>
+          </a:solidFill>
+        </p:spPr>
+        <p:style>
+          <a:lnRef idx="2">
+            <a:schemeClr val="accent3">
+              <a:shade val="50000"/>
+            </a:schemeClr>
+          </a:lnRef>
+          <a:fillRef idx="1">
+            <a:schemeClr val="accent3"/>
+          </a:fillRef>
+          <a:effectRef idx="0">
+            <a:schemeClr val="accent3"/>
+          </a:effectRef>
+          <a:fontRef idx="minor">
+            <a:schemeClr val="lt1"/>
+          </a:fontRef>
+        </p:style>
+        <p:txBody>
+          <a:bodyPr rtlCol="0" anchor="ctr"/>
+          <a:lstStyle/>
+          <a:p>
+            <a:pPr algn="ctr"/>
+            <a:r>
+              <a:rPr lang="de-DE" sz="1600" dirty="0">
+                <a:solidFill>
+                  <a:schemeClr val="tx1">
+                    <a:lumMod val="75000"/>
+                    <a:lumOff val="25000"/>
+                  </a:schemeClr>
+                </a:solidFill>
+              </a:rPr>
+              <a:t>Rest API</a:t>
+            </a:r>
+          </a:p>
+          <a:p>
+            <a:pPr algn="ctr"/>
+            <a:r>
+              <a:rPr lang="de-DE" sz="1600" dirty="0">
+                <a:solidFill>
+                  <a:schemeClr val="tx1">
+                    <a:lumMod val="75000"/>
+                    <a:lumOff val="25000"/>
+                  </a:schemeClr>
+                </a:solidFill>
+              </a:rPr>
+              <a:t>Socket.io</a:t>
+            </a:r>
+            <a:endParaRPr lang="de-AT" sz="1600" dirty="0">
               <a:solidFill>
                 <a:schemeClr val="tx1">
                   <a:lumMod val="75000"/>
@@ -5390,12 +6039,118 @@
           </a:p>
         </p:txBody>
       </p:sp>
+      <p:sp>
+        <p:nvSpPr>
+          <p:cNvPr id="167" name="Rechteck 166">
+            <a:extLst>
+              <a:ext uri="{FF2B5EF4-FFF2-40B4-BE49-F238E27FC236}">
+                <a16:creationId xmlns:a16="http://schemas.microsoft.com/office/drawing/2014/main" id="{4B10A02B-6615-4D1B-8394-F97A85859903}"/>
+              </a:ext>
+            </a:extLst>
+          </p:cNvPr>
+          <p:cNvSpPr/>
+          <p:nvPr/>
+        </p:nvSpPr>
+        <p:spPr>
+          <a:xfrm>
+            <a:off x="5042537" y="4399558"/>
+            <a:ext cx="1828800" cy="350983"/>
+          </a:xfrm>
+          <a:prstGeom prst="rect">
+            <a:avLst/>
+          </a:prstGeom>
+          <a:solidFill>
+            <a:schemeClr val="tx1">
+              <a:lumMod val="75000"/>
+              <a:lumOff val="25000"/>
+            </a:schemeClr>
+          </a:solidFill>
+        </p:spPr>
+        <p:style>
+          <a:lnRef idx="2">
+            <a:schemeClr val="accent3">
+              <a:shade val="50000"/>
+            </a:schemeClr>
+          </a:lnRef>
+          <a:fillRef idx="1">
+            <a:schemeClr val="accent3"/>
+          </a:fillRef>
+          <a:effectRef idx="0">
+            <a:schemeClr val="accent3"/>
+          </a:effectRef>
+          <a:fontRef idx="minor">
+            <a:schemeClr val="lt1"/>
+          </a:fontRef>
+        </p:style>
+        <p:txBody>
+          <a:bodyPr rtlCol="0" anchor="ctr"/>
+          <a:lstStyle/>
+          <a:p>
+            <a:pPr algn="ctr"/>
+            <a:r>
+              <a:rPr lang="de-AT" sz="1600" dirty="0">
+                <a:solidFill>
+                  <a:schemeClr val="bg1"/>
+                </a:solidFill>
+              </a:rPr>
+              <a:t>FeathersJS Backend</a:t>
+            </a:r>
+          </a:p>
+        </p:txBody>
+      </p:sp>
+      <p:cxnSp>
+        <p:nvCxnSpPr>
+          <p:cNvPr id="177" name="Gerade Verbindung mit Pfeil 176">
+            <a:extLst>
+              <a:ext uri="{FF2B5EF4-FFF2-40B4-BE49-F238E27FC236}">
+                <a16:creationId xmlns:a16="http://schemas.microsoft.com/office/drawing/2014/main" id="{DA42BA27-7398-4703-8DBC-98C187F01D50}"/>
+              </a:ext>
+            </a:extLst>
+          </p:cNvPr>
+          <p:cNvCxnSpPr>
+            <a:cxnSpLocks/>
+          </p:cNvCxnSpPr>
+          <p:nvPr/>
+        </p:nvCxnSpPr>
+        <p:spPr>
+          <a:xfrm>
+            <a:off x="4614456" y="4750540"/>
+            <a:ext cx="428081" cy="0"/>
+          </a:xfrm>
+          <a:prstGeom prst="straightConnector1">
+            <a:avLst/>
+          </a:prstGeom>
+          <a:ln w="12700">
+            <a:solidFill>
+              <a:schemeClr val="tx1">
+                <a:lumMod val="75000"/>
+                <a:lumOff val="25000"/>
+              </a:schemeClr>
+            </a:solidFill>
+            <a:tailEnd type="triangle"/>
+          </a:ln>
+        </p:spPr>
+        <p:style>
+          <a:lnRef idx="1">
+            <a:schemeClr val="dk1"/>
+          </a:lnRef>
+          <a:fillRef idx="0">
+            <a:schemeClr val="dk1"/>
+          </a:fillRef>
+          <a:effectRef idx="0">
+            <a:schemeClr val="dk1"/>
+          </a:effectRef>
+          <a:fontRef idx="minor">
+            <a:schemeClr val="tx1"/>
+          </a:fontRef>
+        </p:style>
+      </p:cxnSp>
       <p:grpSp>
         <p:nvGrpSpPr>
-          <p:cNvPr id="66" name="Gruppieren 65">
-            <a:extLst>
-              <a:ext uri="{FF2B5EF4-FFF2-40B4-BE49-F238E27FC236}">
-                <a16:creationId xmlns:a16="http://schemas.microsoft.com/office/drawing/2014/main" id="{EFA9E0D6-D344-4969-8FE8-273578950BFD}"/>
+          <p:cNvPr id="182" name="Gruppieren 181">
+            <a:extLst>
+              <a:ext uri="{FF2B5EF4-FFF2-40B4-BE49-F238E27FC236}">
+                <a16:creationId xmlns:a16="http://schemas.microsoft.com/office/drawing/2014/main" id="{CC5440F3-A5F4-4AD6-A84A-990B6AE9B17B}"/>
               </a:ext>
             </a:extLst>
           </p:cNvPr>
@@ -5404,18 +6159,18 @@
         </p:nvGrpSpPr>
         <p:grpSpPr>
           <a:xfrm>
-            <a:off x="8182346" y="3495197"/>
-            <a:ext cx="1828800" cy="608555"/>
+            <a:off x="7382047" y="4225202"/>
+            <a:ext cx="1828800" cy="701964"/>
             <a:chOff x="5394036" y="4659746"/>
             <a:chExt cx="1828800" cy="701964"/>
           </a:xfrm>
         </p:grpSpPr>
         <p:sp>
           <p:nvSpPr>
-            <p:cNvPr id="67" name="Raute 66">
+            <p:cNvPr id="183" name="Raute 182">
               <a:extLst>
                 <a:ext uri="{FF2B5EF4-FFF2-40B4-BE49-F238E27FC236}">
-                  <a16:creationId xmlns:a16="http://schemas.microsoft.com/office/drawing/2014/main" id="{3F4A8FCB-E715-4B36-A140-4C8CF7EEF733}"/>
+                  <a16:creationId xmlns:a16="http://schemas.microsoft.com/office/drawing/2014/main" id="{A19295ED-F1F1-411D-B9B5-E4F79DBD25D9}"/>
                 </a:ext>
               </a:extLst>
             </p:cNvPr>
@@ -5463,10 +6218,10 @@
         </p:sp>
         <p:sp>
           <p:nvSpPr>
-            <p:cNvPr id="68" name="Textfeld 67">
+            <p:cNvPr id="184" name="Textfeld 183">
               <a:extLst>
                 <a:ext uri="{FF2B5EF4-FFF2-40B4-BE49-F238E27FC236}">
-                  <a16:creationId xmlns:a16="http://schemas.microsoft.com/office/drawing/2014/main" id="{FF7FBFC9-5808-4D62-BA5F-61462298C1E9}"/>
+                  <a16:creationId xmlns:a16="http://schemas.microsoft.com/office/drawing/2014/main" id="{78B20AF4-6482-4D9C-9F46-1D74C6DED2D5}"/>
                 </a:ext>
               </a:extLst>
             </p:cNvPr>
@@ -5475,8 +6230,8 @@
           </p:nvSpPr>
           <p:spPr>
             <a:xfrm>
-              <a:off x="5394036" y="4838999"/>
-              <a:ext cx="1828800" cy="307777"/>
+              <a:off x="5394036" y="4856839"/>
+              <a:ext cx="1828800" cy="338554"/>
             </a:xfrm>
             <a:prstGeom prst="rect">
               <a:avLst/>
@@ -5491,7 +6246,7 @@
             <a:p>
               <a:pPr algn="ctr"/>
               <a:r>
-                <a:rPr lang="de-AT" sz="1400" dirty="0">
+                <a:rPr lang="de-DE" sz="1600" dirty="0">
                   <a:solidFill>
                     <a:schemeClr val="tx1">
                       <a:lumMod val="85000"/>
@@ -5499,7 +6254,18 @@
                     </a:schemeClr>
                   </a:solidFill>
                 </a:rPr>
-                <a:t>Response = OK?</a:t>
+                <a:t>Konflikte</a:t>
+              </a:r>
+              <a:r>
+                <a:rPr lang="de-AT" sz="1600" dirty="0">
+                  <a:solidFill>
+                    <a:schemeClr val="tx1">
+                      <a:lumMod val="85000"/>
+                      <a:lumOff val="15000"/>
+                    </a:schemeClr>
+                  </a:solidFill>
+                </a:rPr>
+                <a:t>?</a:t>
               </a:r>
             </a:p>
           </p:txBody>
@@ -5507,10 +6273,10 @@
       </p:grpSp>
       <p:sp>
         <p:nvSpPr>
-          <p:cNvPr id="69" name="Textfeld 68">
-            <a:extLst>
-              <a:ext uri="{FF2B5EF4-FFF2-40B4-BE49-F238E27FC236}">
-                <a16:creationId xmlns:a16="http://schemas.microsoft.com/office/drawing/2014/main" id="{3DDC7C7B-ECD2-4492-81D2-6525ACD330DE}"/>
+          <p:cNvPr id="194" name="Textfeld 193">
+            <a:extLst>
+              <a:ext uri="{FF2B5EF4-FFF2-40B4-BE49-F238E27FC236}">
+                <a16:creationId xmlns:a16="http://schemas.microsoft.com/office/drawing/2014/main" id="{BC490691-4DE1-4DC0-8E13-3DC8079CAB6E}"/>
               </a:ext>
             </a:extLst>
           </p:cNvPr>
@@ -5519,7 +6285,7 @@
         </p:nvSpPr>
         <p:spPr>
           <a:xfrm>
-            <a:off x="8849550" y="3279869"/>
+            <a:off x="8283326" y="4024888"/>
             <a:ext cx="311304" cy="261610"/>
           </a:xfrm>
           <a:prstGeom prst="rect">
@@ -5540,110 +6306,12 @@
           </a:p>
         </p:txBody>
       </p:sp>
-      <p:cxnSp>
-        <p:nvCxnSpPr>
-          <p:cNvPr id="70" name="Gerade Verbindung mit Pfeil 69">
-            <a:extLst>
-              <a:ext uri="{FF2B5EF4-FFF2-40B4-BE49-F238E27FC236}">
-                <a16:creationId xmlns:a16="http://schemas.microsoft.com/office/drawing/2014/main" id="{118EC908-AC65-4EC6-A661-103004DB6650}"/>
-              </a:ext>
-            </a:extLst>
-          </p:cNvPr>
-          <p:cNvCxnSpPr>
-            <a:cxnSpLocks/>
-            <a:stCxn id="34" idx="0"/>
-            <a:endCxn id="67" idx="2"/>
-          </p:cNvCxnSpPr>
-          <p:nvPr/>
-        </p:nvCxnSpPr>
-        <p:spPr>
-          <a:xfrm flipH="1" flipV="1">
-            <a:off x="9096746" y="4103752"/>
-            <a:ext cx="6248" cy="150975"/>
-          </a:xfrm>
-          <a:prstGeom prst="straightConnector1">
-            <a:avLst/>
-          </a:prstGeom>
-          <a:ln w="12700">
-            <a:solidFill>
-              <a:schemeClr val="tx1">
-                <a:lumMod val="75000"/>
-                <a:lumOff val="25000"/>
-              </a:schemeClr>
-            </a:solidFill>
-            <a:tailEnd type="triangle"/>
-          </a:ln>
-        </p:spPr>
-        <p:style>
-          <a:lnRef idx="1">
-            <a:schemeClr val="dk1"/>
-          </a:lnRef>
-          <a:fillRef idx="0">
-            <a:schemeClr val="dk1"/>
-          </a:fillRef>
-          <a:effectRef idx="0">
-            <a:schemeClr val="dk1"/>
-          </a:effectRef>
-          <a:fontRef idx="minor">
-            <a:schemeClr val="tx1"/>
-          </a:fontRef>
-        </p:style>
-      </p:cxnSp>
-      <p:cxnSp>
-        <p:nvCxnSpPr>
-          <p:cNvPr id="73" name="Gerade Verbindung mit Pfeil 72">
-            <a:extLst>
-              <a:ext uri="{FF2B5EF4-FFF2-40B4-BE49-F238E27FC236}">
-                <a16:creationId xmlns:a16="http://schemas.microsoft.com/office/drawing/2014/main" id="{5B77E05B-F14A-4D74-8707-28CA91A47DF1}"/>
-              </a:ext>
-            </a:extLst>
-          </p:cNvPr>
-          <p:cNvCxnSpPr>
-            <a:cxnSpLocks/>
-            <a:stCxn id="67" idx="0"/>
-            <a:endCxn id="79" idx="2"/>
-          </p:cNvCxnSpPr>
-          <p:nvPr/>
-        </p:nvCxnSpPr>
-        <p:spPr>
-          <a:xfrm flipH="1" flipV="1">
-            <a:off x="9094449" y="3275609"/>
-            <a:ext cx="2297" cy="219588"/>
-          </a:xfrm>
-          <a:prstGeom prst="straightConnector1">
-            <a:avLst/>
-          </a:prstGeom>
-          <a:ln w="12700">
-            <a:solidFill>
-              <a:schemeClr val="tx1">
-                <a:lumMod val="75000"/>
-                <a:lumOff val="25000"/>
-              </a:schemeClr>
-            </a:solidFill>
-            <a:tailEnd type="triangle"/>
-          </a:ln>
-        </p:spPr>
-        <p:style>
-          <a:lnRef idx="1">
-            <a:schemeClr val="dk1"/>
-          </a:lnRef>
-          <a:fillRef idx="0">
-            <a:schemeClr val="dk1"/>
-          </a:fillRef>
-          <a:effectRef idx="0">
-            <a:schemeClr val="dk1"/>
-          </a:effectRef>
-          <a:fontRef idx="minor">
-            <a:schemeClr val="tx1"/>
-          </a:fontRef>
-        </p:style>
-      </p:cxnSp>
-      <p:sp>
-        <p:nvSpPr>
-          <p:cNvPr id="79" name="Rechteck 78">
-            <a:extLst>
-              <a:ext uri="{FF2B5EF4-FFF2-40B4-BE49-F238E27FC236}">
-                <a16:creationId xmlns:a16="http://schemas.microsoft.com/office/drawing/2014/main" id="{6CF6BC7D-64E4-4601-8F63-823C195EA577}"/>
+      <p:sp>
+        <p:nvSpPr>
+          <p:cNvPr id="202" name="Rechteck 201">
+            <a:extLst>
+              <a:ext uri="{FF2B5EF4-FFF2-40B4-BE49-F238E27FC236}">
+                <a16:creationId xmlns:a16="http://schemas.microsoft.com/office/drawing/2014/main" id="{7F7FDAD0-1C2A-4D59-B882-9A90E2FD5B89}"/>
               </a:ext>
             </a:extLst>
           </p:cNvPr>
@@ -5652,8 +6320,8 @@
         </p:nvSpPr>
         <p:spPr>
           <a:xfrm>
-            <a:off x="8226231" y="2969450"/>
-            <a:ext cx="1736436" cy="306159"/>
+            <a:off x="7428229" y="3426652"/>
+            <a:ext cx="1736436" cy="491128"/>
           </a:xfrm>
           <a:prstGeom prst="rect">
             <a:avLst/>
@@ -5694,136 +6362,17 @@
                   </a:schemeClr>
                 </a:solidFill>
               </a:rPr>
-              <a:t>Aus Queue entfernen</a:t>
-            </a:r>
-          </a:p>
-        </p:txBody>
-      </p:sp>
-      <p:cxnSp>
-        <p:nvCxnSpPr>
-          <p:cNvPr id="82" name="Gerade Verbindung mit Pfeil 81">
-            <a:extLst>
-              <a:ext uri="{FF2B5EF4-FFF2-40B4-BE49-F238E27FC236}">
-                <a16:creationId xmlns:a16="http://schemas.microsoft.com/office/drawing/2014/main" id="{BB900E14-C16A-4AA9-A735-4C9631D8EB7D}"/>
-              </a:ext>
-            </a:extLst>
-          </p:cNvPr>
-          <p:cNvCxnSpPr>
-            <a:cxnSpLocks/>
-            <a:stCxn id="79" idx="1"/>
-          </p:cNvCxnSpPr>
-          <p:nvPr/>
-        </p:nvCxnSpPr>
-        <p:spPr>
-          <a:xfrm flipH="1" flipV="1">
-            <a:off x="7515259" y="3122529"/>
-            <a:ext cx="710972" cy="1"/>
-          </a:xfrm>
-          <a:prstGeom prst="straightConnector1">
-            <a:avLst/>
-          </a:prstGeom>
-          <a:ln w="12700">
-            <a:solidFill>
-              <a:schemeClr val="tx1">
-                <a:lumMod val="75000"/>
-                <a:lumOff val="25000"/>
-              </a:schemeClr>
-            </a:solidFill>
-            <a:tailEnd type="triangle"/>
-          </a:ln>
-        </p:spPr>
-        <p:style>
-          <a:lnRef idx="1">
-            <a:schemeClr val="dk1"/>
-          </a:lnRef>
-          <a:fillRef idx="0">
-            <a:schemeClr val="dk1"/>
-          </a:fillRef>
-          <a:effectRef idx="0">
-            <a:schemeClr val="dk1"/>
-          </a:effectRef>
-          <a:fontRef idx="minor">
-            <a:schemeClr val="tx1"/>
-          </a:fontRef>
-        </p:style>
-      </p:cxnSp>
-      <p:sp>
-        <p:nvSpPr>
-          <p:cNvPr id="85" name="Textfeld 84">
-            <a:extLst>
-              <a:ext uri="{FF2B5EF4-FFF2-40B4-BE49-F238E27FC236}">
-                <a16:creationId xmlns:a16="http://schemas.microsoft.com/office/drawing/2014/main" id="{0973AD0B-2ECB-49D0-BE80-6AF8EAA0033F}"/>
-              </a:ext>
-            </a:extLst>
-          </p:cNvPr>
-          <p:cNvSpPr txBox="1"/>
-          <p:nvPr/>
-        </p:nvSpPr>
-        <p:spPr>
-          <a:xfrm>
-            <a:off x="3584814" y="2259672"/>
-            <a:ext cx="1688283" cy="261610"/>
-          </a:xfrm>
-          <a:prstGeom prst="rect">
-            <a:avLst/>
-          </a:prstGeom>
-          <a:noFill/>
-        </p:spPr>
-        <p:txBody>
-          <a:bodyPr wrap="none" rtlCol="0">
-            <a:spAutoFit/>
-          </a:bodyPr>
-          <a:lstStyle/>
-          <a:p>
-            <a:r>
-              <a:rPr lang="de-AT" sz="1100" dirty="0"/>
-              <a:t>Request an Queue senden</a:t>
-            </a:r>
-          </a:p>
-        </p:txBody>
-      </p:sp>
-      <p:sp>
-        <p:nvSpPr>
-          <p:cNvPr id="86" name="Textfeld 85">
-            <a:extLst>
-              <a:ext uri="{FF2B5EF4-FFF2-40B4-BE49-F238E27FC236}">
-                <a16:creationId xmlns:a16="http://schemas.microsoft.com/office/drawing/2014/main" id="{8444DF5B-218F-4F92-8262-563EB176D4EF}"/>
-              </a:ext>
-            </a:extLst>
-          </p:cNvPr>
-          <p:cNvSpPr txBox="1"/>
-          <p:nvPr/>
-        </p:nvSpPr>
-        <p:spPr>
-          <a:xfrm>
-            <a:off x="2102081" y="2076678"/>
-            <a:ext cx="338554" cy="1922636"/>
-          </a:xfrm>
-          <a:prstGeom prst="rect">
-            <a:avLst/>
-          </a:prstGeom>
-          <a:noFill/>
-        </p:spPr>
-        <p:txBody>
-          <a:bodyPr vert="vert270" wrap="square" rtlCol="0">
-            <a:spAutoFit/>
-          </a:bodyPr>
-          <a:lstStyle/>
-          <a:p>
-            <a:pPr algn="ctr"/>
-            <a:r>
-              <a:rPr lang="de-AT" sz="1000" dirty="0"/>
-              <a:t>Änderungen lokal vornehmen</a:t>
+              <a:t>Benachrichtigung an Benutzer/in</a:t>
             </a:r>
           </a:p>
         </p:txBody>
       </p:sp>
       <p:grpSp>
         <p:nvGrpSpPr>
-          <p:cNvPr id="90" name="Gruppieren 89">
-            <a:extLst>
-              <a:ext uri="{FF2B5EF4-FFF2-40B4-BE49-F238E27FC236}">
-                <a16:creationId xmlns:a16="http://schemas.microsoft.com/office/drawing/2014/main" id="{D5711605-5F39-4C44-9299-A0C5B75B143F}"/>
+          <p:cNvPr id="209" name="Gruppieren 208">
+            <a:extLst>
+              <a:ext uri="{FF2B5EF4-FFF2-40B4-BE49-F238E27FC236}">
+                <a16:creationId xmlns:a16="http://schemas.microsoft.com/office/drawing/2014/main" id="{8BD14807-DDC1-4F8F-B4FE-0C4F6A3F990C}"/>
               </a:ext>
             </a:extLst>
           </p:cNvPr>
@@ -5832,7 +6381,7 @@
         </p:nvGrpSpPr>
         <p:grpSpPr>
           <a:xfrm>
-            <a:off x="3444297" y="3106746"/>
+            <a:off x="7391293" y="5503885"/>
             <a:ext cx="1828800" cy="701964"/>
             <a:chOff x="5394036" y="4659746"/>
             <a:chExt cx="1828800" cy="701964"/>
@@ -5840,10 +6389,10 @@
         </p:grpSpPr>
         <p:sp>
           <p:nvSpPr>
-            <p:cNvPr id="91" name="Raute 90">
+            <p:cNvPr id="210" name="Raute 209">
               <a:extLst>
                 <a:ext uri="{FF2B5EF4-FFF2-40B4-BE49-F238E27FC236}">
-                  <a16:creationId xmlns:a16="http://schemas.microsoft.com/office/drawing/2014/main" id="{48D32BAB-B203-4AF8-A575-B1B4356689C0}"/>
+                  <a16:creationId xmlns:a16="http://schemas.microsoft.com/office/drawing/2014/main" id="{924534C3-E603-4C22-95FD-0A902F263FC4}"/>
                 </a:ext>
               </a:extLst>
             </p:cNvPr>
@@ -5891,10 +6440,10 @@
         </p:sp>
         <p:sp>
           <p:nvSpPr>
-            <p:cNvPr id="92" name="Textfeld 91">
+            <p:cNvPr id="211" name="Textfeld 210">
               <a:extLst>
                 <a:ext uri="{FF2B5EF4-FFF2-40B4-BE49-F238E27FC236}">
-                  <a16:creationId xmlns:a16="http://schemas.microsoft.com/office/drawing/2014/main" id="{868F19EB-8518-4252-A0EA-5239AE361D6A}"/>
+                  <a16:creationId xmlns:a16="http://schemas.microsoft.com/office/drawing/2014/main" id="{88744A68-901E-4673-B4D4-65B27A32841B}"/>
                 </a:ext>
               </a:extLst>
             </p:cNvPr>
@@ -5903,8 +6452,8 @@
           </p:nvSpPr>
           <p:spPr>
             <a:xfrm>
-              <a:off x="5394036" y="4874809"/>
-              <a:ext cx="1828800" cy="276999"/>
+              <a:off x="5394036" y="4841451"/>
+              <a:ext cx="1828800" cy="338554"/>
             </a:xfrm>
             <a:prstGeom prst="rect">
               <a:avLst/>
@@ -5919,7 +6468,7 @@
             <a:p>
               <a:pPr algn="ctr"/>
               <a:r>
-                <a:rPr lang="de-AT" sz="1200" dirty="0">
+                <a:rPr lang="de-AT" sz="1600" dirty="0">
                   <a:solidFill>
                     <a:schemeClr val="tx1">
                       <a:lumMod val="85000"/>
@@ -5927,7 +6476,7 @@
                     </a:schemeClr>
                   </a:solidFill>
                 </a:rPr>
-                <a:t>Queue durchlaufen?</a:t>
+                <a:t>Queue leer?</a:t>
               </a:r>
             </a:p>
           </p:txBody>
@@ -5935,24 +6484,23 @@
       </p:grpSp>
       <p:cxnSp>
         <p:nvCxnSpPr>
-          <p:cNvPr id="93" name="Gerade Verbindung mit Pfeil 92">
-            <a:extLst>
-              <a:ext uri="{FF2B5EF4-FFF2-40B4-BE49-F238E27FC236}">
-                <a16:creationId xmlns:a16="http://schemas.microsoft.com/office/drawing/2014/main" id="{F103C7A4-E3C6-4F24-AB3D-406819236FA5}"/>
+          <p:cNvPr id="221" name="Gerade Verbindung mit Pfeil 220">
+            <a:extLst>
+              <a:ext uri="{FF2B5EF4-FFF2-40B4-BE49-F238E27FC236}">
+                <a16:creationId xmlns:a16="http://schemas.microsoft.com/office/drawing/2014/main" id="{93B43803-BC49-4E5E-AA29-D27ED32F9D13}"/>
               </a:ext>
             </a:extLst>
           </p:cNvPr>
           <p:cNvCxnSpPr>
             <a:cxnSpLocks/>
-            <a:stCxn id="65" idx="1"/>
-            <a:endCxn id="92" idx="3"/>
+            <a:stCxn id="202" idx="0"/>
           </p:cNvCxnSpPr>
           <p:nvPr/>
         </p:nvCxnSpPr>
         <p:spPr>
-          <a:xfrm flipH="1">
-            <a:off x="5273097" y="3453300"/>
-            <a:ext cx="293993" cy="7009"/>
+          <a:xfrm flipV="1">
+            <a:off x="8296447" y="3043916"/>
+            <a:ext cx="0" cy="382736"/>
           </a:xfrm>
           <a:prstGeom prst="straightConnector1">
             <a:avLst/>
@@ -5984,26 +6532,25 @@
       </p:cxnSp>
       <p:cxnSp>
         <p:nvCxnSpPr>
-          <p:cNvPr id="96" name="Gerade Verbindung mit Pfeil 95">
-            <a:extLst>
-              <a:ext uri="{FF2B5EF4-FFF2-40B4-BE49-F238E27FC236}">
-                <a16:creationId xmlns:a16="http://schemas.microsoft.com/office/drawing/2014/main" id="{B8E2F173-DDFF-44E1-9F26-9A4E7E4485E7}"/>
+          <p:cNvPr id="232" name="Verbinder: gewinkelt 231">
+            <a:extLst>
+              <a:ext uri="{FF2B5EF4-FFF2-40B4-BE49-F238E27FC236}">
+                <a16:creationId xmlns:a16="http://schemas.microsoft.com/office/drawing/2014/main" id="{4C81661C-9681-4555-90E3-8A5F215E70FD}"/>
               </a:ext>
             </a:extLst>
           </p:cNvPr>
           <p:cNvCxnSpPr>
             <a:cxnSpLocks/>
-            <a:stCxn id="91" idx="2"/>
-            <a:endCxn id="97" idx="0"/>
+            <a:endCxn id="210" idx="0"/>
           </p:cNvCxnSpPr>
           <p:nvPr/>
         </p:nvCxnSpPr>
         <p:spPr>
           <a:xfrm>
-            <a:off x="4358697" y="3808710"/>
-            <a:ext cx="0" cy="404701"/>
+            <a:off x="6871337" y="5164588"/>
+            <a:ext cx="1434356" cy="339297"/>
           </a:xfrm>
-          <a:prstGeom prst="straightConnector1">
+          <a:prstGeom prst="bentConnector2">
             <a:avLst/>
           </a:prstGeom>
           <a:ln w="12700">
@@ -6031,122 +6578,26 @@
           </a:fontRef>
         </p:style>
       </p:cxnSp>
-      <p:sp>
-        <p:nvSpPr>
-          <p:cNvPr id="97" name="Rechteck 96">
-            <a:extLst>
-              <a:ext uri="{FF2B5EF4-FFF2-40B4-BE49-F238E27FC236}">
-                <a16:creationId xmlns:a16="http://schemas.microsoft.com/office/drawing/2014/main" id="{70F6774D-8853-47D9-AB8E-6454BCB078EA}"/>
-              </a:ext>
-            </a:extLst>
-          </p:cNvPr>
-          <p:cNvSpPr/>
-          <p:nvPr/>
-        </p:nvSpPr>
-        <p:spPr>
-          <a:xfrm>
-            <a:off x="3490479" y="4213411"/>
-            <a:ext cx="1736436" cy="306159"/>
-          </a:xfrm>
-          <a:prstGeom prst="rect">
-            <a:avLst/>
-          </a:prstGeom>
-          <a:solidFill>
-            <a:schemeClr val="bg1">
-              <a:lumMod val="95000"/>
-            </a:schemeClr>
-          </a:solidFill>
-        </p:spPr>
-        <p:style>
-          <a:lnRef idx="2">
-            <a:schemeClr val="accent3">
-              <a:shade val="50000"/>
-            </a:schemeClr>
-          </a:lnRef>
-          <a:fillRef idx="1">
-            <a:schemeClr val="accent3"/>
-          </a:fillRef>
-          <a:effectRef idx="0">
-            <a:schemeClr val="accent3"/>
-          </a:effectRef>
-          <a:fontRef idx="minor">
-            <a:schemeClr val="lt1"/>
-          </a:fontRef>
-        </p:style>
-        <p:txBody>
-          <a:bodyPr rtlCol="0" anchor="ctr"/>
-          <a:lstStyle/>
-          <a:p>
-            <a:pPr algn="ctr"/>
-            <a:r>
-              <a:rPr lang="de-AT" sz="1400" dirty="0">
-                <a:solidFill>
-                  <a:schemeClr val="tx1">
-                    <a:lumMod val="75000"/>
-                    <a:lumOff val="25000"/>
-                  </a:schemeClr>
-                </a:solidFill>
-              </a:rPr>
-              <a:t>Daten neu laden</a:t>
-            </a:r>
-          </a:p>
-        </p:txBody>
-      </p:sp>
-      <p:sp>
-        <p:nvSpPr>
-          <p:cNvPr id="100" name="Textfeld 99">
-            <a:extLst>
-              <a:ext uri="{FF2B5EF4-FFF2-40B4-BE49-F238E27FC236}">
-                <a16:creationId xmlns:a16="http://schemas.microsoft.com/office/drawing/2014/main" id="{BF500119-9303-419A-B987-E6BA9084E3CB}"/>
-              </a:ext>
-            </a:extLst>
-          </p:cNvPr>
-          <p:cNvSpPr txBox="1"/>
-          <p:nvPr/>
-        </p:nvSpPr>
-        <p:spPr>
-          <a:xfrm>
-            <a:off x="4070234" y="3870036"/>
-            <a:ext cx="311304" cy="261610"/>
-          </a:xfrm>
-          <a:prstGeom prst="rect">
-            <a:avLst/>
-          </a:prstGeom>
-          <a:noFill/>
-        </p:spPr>
-        <p:txBody>
-          <a:bodyPr wrap="none" rtlCol="0">
-            <a:spAutoFit/>
-          </a:bodyPr>
-          <a:lstStyle/>
-          <a:p>
-            <a:r>
-              <a:rPr lang="de-AT" sz="1100" dirty="0"/>
-              <a:t>JA</a:t>
-            </a:r>
-          </a:p>
-        </p:txBody>
-      </p:sp>
       <p:cxnSp>
         <p:nvCxnSpPr>
-          <p:cNvPr id="101" name="Gerade Verbindung mit Pfeil 100">
-            <a:extLst>
-              <a:ext uri="{FF2B5EF4-FFF2-40B4-BE49-F238E27FC236}">
-                <a16:creationId xmlns:a16="http://schemas.microsoft.com/office/drawing/2014/main" id="{77724A73-DACA-461C-8F89-AC1AEBEED6F3}"/>
+          <p:cNvPr id="238" name="Gerade Verbindung mit Pfeil 237">
+            <a:extLst>
+              <a:ext uri="{FF2B5EF4-FFF2-40B4-BE49-F238E27FC236}">
+                <a16:creationId xmlns:a16="http://schemas.microsoft.com/office/drawing/2014/main" id="{1289F43C-29A7-4882-9E2A-0CEB8D962741}"/>
               </a:ext>
             </a:extLst>
           </p:cNvPr>
           <p:cNvCxnSpPr>
             <a:cxnSpLocks/>
-            <a:stCxn id="97" idx="1"/>
-            <a:endCxn id="6" idx="3"/>
+            <a:stCxn id="211" idx="1"/>
+            <a:endCxn id="50" idx="3"/>
           </p:cNvCxnSpPr>
           <p:nvPr/>
         </p:nvCxnSpPr>
         <p:spPr>
           <a:xfrm flipH="1">
-            <a:off x="3269680" y="4366491"/>
-            <a:ext cx="220799" cy="0"/>
+            <a:off x="4607609" y="5854867"/>
+            <a:ext cx="2783684" cy="1237"/>
           </a:xfrm>
           <a:prstGeom prst="straightConnector1">
             <a:avLst/>
@@ -6178,28 +6629,28 @@
       </p:cxnSp>
       <p:cxnSp>
         <p:nvCxnSpPr>
-          <p:cNvPr id="104" name="Verbinder: gewinkelt 103">
-            <a:extLst>
-              <a:ext uri="{FF2B5EF4-FFF2-40B4-BE49-F238E27FC236}">
-                <a16:creationId xmlns:a16="http://schemas.microsoft.com/office/drawing/2014/main" id="{C7CF0A19-D0A7-454E-9CF7-34CBA2F14EB6}"/>
+          <p:cNvPr id="241" name="Verbinder: gewinkelt 240">
+            <a:extLst>
+              <a:ext uri="{FF2B5EF4-FFF2-40B4-BE49-F238E27FC236}">
+                <a16:creationId xmlns:a16="http://schemas.microsoft.com/office/drawing/2014/main" id="{834A1CFA-35F8-4C05-AC90-56180EDA16F0}"/>
               </a:ext>
             </a:extLst>
           </p:cNvPr>
           <p:cNvCxnSpPr>
             <a:cxnSpLocks/>
-            <a:stCxn id="47" idx="2"/>
-            <a:endCxn id="97" idx="2"/>
+            <a:stCxn id="50" idx="1"/>
+            <a:endCxn id="65" idx="1"/>
           </p:cNvCxnSpPr>
           <p:nvPr/>
         </p:nvCxnSpPr>
         <p:spPr>
-          <a:xfrm rot="5400000" flipH="1">
-            <a:off x="7662764" y="1215504"/>
-            <a:ext cx="496290" cy="7104423"/>
+          <a:xfrm rot="10800000" flipH="1">
+            <a:off x="2778810" y="2890390"/>
+            <a:ext cx="83968" cy="2965715"/>
           </a:xfrm>
           <a:prstGeom prst="bentConnector3">
             <a:avLst>
-              <a:gd name="adj1" fmla="val -124228"/>
+              <a:gd name="adj1" fmla="val -272247"/>
             </a:avLst>
           </a:prstGeom>
           <a:ln w="12700">
@@ -6229,77 +6680,45 @@
       </p:cxnSp>
       <p:sp>
         <p:nvSpPr>
-          <p:cNvPr id="109" name="Textfeld 108">
-            <a:extLst>
-              <a:ext uri="{FF2B5EF4-FFF2-40B4-BE49-F238E27FC236}">
-                <a16:creationId xmlns:a16="http://schemas.microsoft.com/office/drawing/2014/main" id="{7976F027-A059-4309-948B-2428545A5E35}"/>
-              </a:ext>
-            </a:extLst>
-          </p:cNvPr>
-          <p:cNvSpPr txBox="1"/>
+          <p:cNvPr id="256" name="Rechteck 255">
+            <a:extLst>
+              <a:ext uri="{FF2B5EF4-FFF2-40B4-BE49-F238E27FC236}">
+                <a16:creationId xmlns:a16="http://schemas.microsoft.com/office/drawing/2014/main" id="{D2AC81C5-BF1C-47E4-9428-0FB15892F9D3}"/>
+              </a:ext>
+            </a:extLst>
+          </p:cNvPr>
+          <p:cNvSpPr/>
           <p:nvPr/>
         </p:nvSpPr>
         <p:spPr>
           <a:xfrm>
-            <a:off x="1992407" y="5048713"/>
-            <a:ext cx="758541" cy="261610"/>
+            <a:off x="2871882" y="1225060"/>
+            <a:ext cx="5024476" cy="430909"/>
           </a:xfrm>
           <a:prstGeom prst="rect">
             <a:avLst/>
           </a:prstGeom>
           <a:noFill/>
-        </p:spPr>
-        <p:txBody>
-          <a:bodyPr wrap="none" rtlCol="0">
-            <a:spAutoFit/>
-          </a:bodyPr>
-          <a:lstStyle/>
-          <a:p>
-            <a:r>
-              <a:rPr lang="de-AT" sz="1100" dirty="0" err="1"/>
-              <a:t>onChange</a:t>
-            </a:r>
-            <a:endParaRPr lang="de-AT" sz="1100" dirty="0"/>
-          </a:p>
-        </p:txBody>
-      </p:sp>
-      <p:sp>
-        <p:nvSpPr>
-          <p:cNvPr id="110" name="Rechteck 109">
-            <a:extLst>
-              <a:ext uri="{FF2B5EF4-FFF2-40B4-BE49-F238E27FC236}">
-                <a16:creationId xmlns:a16="http://schemas.microsoft.com/office/drawing/2014/main" id="{078F7039-BD07-4E8C-990C-047C8E07C4A6}"/>
-              </a:ext>
-            </a:extLst>
-          </p:cNvPr>
-          <p:cNvSpPr/>
-          <p:nvPr/>
-        </p:nvSpPr>
-        <p:spPr>
-          <a:xfrm>
-            <a:off x="3269680" y="1345045"/>
-            <a:ext cx="1736436" cy="701964"/>
-          </a:xfrm>
-          <a:prstGeom prst="rect">
-            <a:avLst/>
-          </a:prstGeom>
-          <a:solidFill>
-            <a:schemeClr val="bg1">
-              <a:lumMod val="95000"/>
-            </a:schemeClr>
-          </a:solidFill>
+          <a:ln w="19050">
+            <a:solidFill>
+              <a:schemeClr val="tx1">
+                <a:lumMod val="75000"/>
+                <a:lumOff val="25000"/>
+              </a:schemeClr>
+            </a:solidFill>
+          </a:ln>
         </p:spPr>
         <p:style>
           <a:lnRef idx="2">
-            <a:schemeClr val="accent3">
+            <a:schemeClr val="accent1">
               <a:shade val="50000"/>
             </a:schemeClr>
           </a:lnRef>
           <a:fillRef idx="1">
-            <a:schemeClr val="accent3"/>
+            <a:schemeClr val="accent1"/>
           </a:fillRef>
           <a:effectRef idx="0">
-            <a:schemeClr val="accent3"/>
+            <a:schemeClr val="accent1"/>
           </a:effectRef>
           <a:fontRef idx="minor">
             <a:schemeClr val="lt1"/>
@@ -6310,489 +6729,132 @@
           <a:lstStyle/>
           <a:p>
             <a:pPr algn="ctr"/>
-            <a:r>
-              <a:rPr lang="de-AT" dirty="0">
-                <a:solidFill>
-                  <a:schemeClr val="tx1">
-                    <a:lumMod val="75000"/>
-                    <a:lumOff val="25000"/>
-                  </a:schemeClr>
-                </a:solidFill>
-              </a:rPr>
-              <a:t>Delete</a:t>
-            </a:r>
-          </a:p>
-        </p:txBody>
-      </p:sp>
-      <p:sp>
-        <p:nvSpPr>
-          <p:cNvPr id="111" name="Rechteck 110">
-            <a:extLst>
-              <a:ext uri="{FF2B5EF4-FFF2-40B4-BE49-F238E27FC236}">
-                <a16:creationId xmlns:a16="http://schemas.microsoft.com/office/drawing/2014/main" id="{744BBAAB-5F03-4E14-9DE4-59E87913734E}"/>
-              </a:ext>
-            </a:extLst>
-          </p:cNvPr>
-          <p:cNvSpPr/>
-          <p:nvPr/>
-        </p:nvSpPr>
-        <p:spPr>
-          <a:xfrm>
-            <a:off x="5006116" y="1345045"/>
-            <a:ext cx="1736436" cy="701964"/>
-          </a:xfrm>
-          <a:prstGeom prst="rect">
-            <a:avLst/>
-          </a:prstGeom>
-          <a:solidFill>
-            <a:schemeClr val="bg1">
-              <a:lumMod val="95000"/>
-            </a:schemeClr>
-          </a:solidFill>
-        </p:spPr>
-        <p:style>
-          <a:lnRef idx="2">
-            <a:schemeClr val="accent3">
-              <a:shade val="50000"/>
-            </a:schemeClr>
-          </a:lnRef>
-          <a:fillRef idx="1">
-            <a:schemeClr val="accent3"/>
-          </a:fillRef>
-          <a:effectRef idx="0">
-            <a:schemeClr val="accent3"/>
-          </a:effectRef>
-          <a:fontRef idx="minor">
-            <a:schemeClr val="lt1"/>
-          </a:fontRef>
-        </p:style>
-        <p:txBody>
-          <a:bodyPr rtlCol="0" anchor="ctr"/>
-          <a:lstStyle/>
-          <a:p>
-            <a:pPr algn="ctr"/>
-            <a:r>
-              <a:rPr lang="de-AT" dirty="0">
-                <a:solidFill>
-                  <a:schemeClr val="tx1">
-                    <a:lumMod val="75000"/>
-                    <a:lumOff val="25000"/>
-                  </a:schemeClr>
-                </a:solidFill>
-              </a:rPr>
-              <a:t>Patch</a:t>
-            </a:r>
-          </a:p>
-        </p:txBody>
-      </p:sp>
-      <p:sp>
-        <p:nvSpPr>
-          <p:cNvPr id="112" name="Rechteck 111">
-            <a:extLst>
-              <a:ext uri="{FF2B5EF4-FFF2-40B4-BE49-F238E27FC236}">
-                <a16:creationId xmlns:a16="http://schemas.microsoft.com/office/drawing/2014/main" id="{BA0A4EE2-B57B-48D1-8A6C-5F0BEACB5C71}"/>
-              </a:ext>
-            </a:extLst>
-          </p:cNvPr>
-          <p:cNvSpPr/>
-          <p:nvPr/>
-        </p:nvSpPr>
-        <p:spPr>
-          <a:xfrm>
-            <a:off x="6742552" y="1345045"/>
-            <a:ext cx="1736436" cy="701964"/>
-          </a:xfrm>
-          <a:prstGeom prst="rect">
-            <a:avLst/>
-          </a:prstGeom>
-          <a:solidFill>
-            <a:schemeClr val="bg1">
-              <a:lumMod val="95000"/>
-            </a:schemeClr>
-          </a:solidFill>
-        </p:spPr>
-        <p:style>
-          <a:lnRef idx="2">
-            <a:schemeClr val="accent3">
-              <a:shade val="50000"/>
-            </a:schemeClr>
-          </a:lnRef>
-          <a:fillRef idx="1">
-            <a:schemeClr val="accent3"/>
-          </a:fillRef>
-          <a:effectRef idx="0">
-            <a:schemeClr val="accent3"/>
-          </a:effectRef>
-          <a:fontRef idx="minor">
-            <a:schemeClr val="lt1"/>
-          </a:fontRef>
-        </p:style>
-        <p:txBody>
-          <a:bodyPr rtlCol="0" anchor="ctr"/>
-          <a:lstStyle/>
-          <a:p>
-            <a:pPr algn="ctr"/>
-            <a:r>
-              <a:rPr lang="de-AT" dirty="0">
-                <a:solidFill>
-                  <a:schemeClr val="tx1">
-                    <a:lumMod val="75000"/>
-                    <a:lumOff val="25000"/>
-                  </a:schemeClr>
-                </a:solidFill>
-              </a:rPr>
-              <a:t>Put</a:t>
-            </a:r>
-          </a:p>
-        </p:txBody>
-      </p:sp>
-      <p:sp>
-        <p:nvSpPr>
-          <p:cNvPr id="115" name="Textfeld 114">
-            <a:extLst>
-              <a:ext uri="{FF2B5EF4-FFF2-40B4-BE49-F238E27FC236}">
-                <a16:creationId xmlns:a16="http://schemas.microsoft.com/office/drawing/2014/main" id="{BA81E4E8-B3D6-4529-9072-B8AF8E152504}"/>
-              </a:ext>
-            </a:extLst>
-          </p:cNvPr>
-          <p:cNvSpPr txBox="1"/>
-          <p:nvPr/>
-        </p:nvSpPr>
-        <p:spPr>
-          <a:xfrm>
-            <a:off x="10796110" y="2257194"/>
-            <a:ext cx="1334020" cy="261610"/>
-          </a:xfrm>
-          <a:prstGeom prst="rect">
-            <a:avLst/>
-          </a:prstGeom>
-          <a:noFill/>
-        </p:spPr>
-        <p:txBody>
-          <a:bodyPr wrap="none" rtlCol="0">
-            <a:spAutoFit/>
-          </a:bodyPr>
-          <a:lstStyle/>
-          <a:p>
-            <a:r>
-              <a:rPr lang="de-AT" sz="1100" dirty="0"/>
-              <a:t>Server löst Konflikte</a:t>
-            </a:r>
-          </a:p>
-        </p:txBody>
-      </p:sp>
-      <p:sp>
-        <p:nvSpPr>
-          <p:cNvPr id="121" name="Rechteck 120">
-            <a:extLst>
-              <a:ext uri="{FF2B5EF4-FFF2-40B4-BE49-F238E27FC236}">
-                <a16:creationId xmlns:a16="http://schemas.microsoft.com/office/drawing/2014/main" id="{749FF765-C2B7-4E2E-A91F-4A6C9E01EDF9}"/>
-              </a:ext>
-            </a:extLst>
-          </p:cNvPr>
-          <p:cNvSpPr/>
-          <p:nvPr/>
-        </p:nvSpPr>
-        <p:spPr>
-          <a:xfrm>
-            <a:off x="9347206" y="1343038"/>
-            <a:ext cx="1736436" cy="504000"/>
-          </a:xfrm>
-          <a:prstGeom prst="rect">
-            <a:avLst/>
-          </a:prstGeom>
-          <a:solidFill>
-            <a:schemeClr val="bg1">
-              <a:lumMod val="95000"/>
-            </a:schemeClr>
-          </a:solidFill>
-          <a:ln>
-            <a:noFill/>
-          </a:ln>
-        </p:spPr>
-        <p:style>
-          <a:lnRef idx="2">
-            <a:schemeClr val="accent3">
-              <a:shade val="50000"/>
-            </a:schemeClr>
-          </a:lnRef>
-          <a:fillRef idx="1">
-            <a:schemeClr val="accent3"/>
-          </a:fillRef>
-          <a:effectRef idx="0">
-            <a:schemeClr val="accent3"/>
-          </a:effectRef>
-          <a:fontRef idx="minor">
-            <a:schemeClr val="lt1"/>
-          </a:fontRef>
-        </p:style>
-        <p:txBody>
-          <a:bodyPr rtlCol="0" anchor="ctr"/>
-          <a:lstStyle/>
-          <a:p>
-            <a:pPr algn="ctr"/>
-            <a:r>
-              <a:rPr lang="de-AT" dirty="0">
-                <a:solidFill>
-                  <a:schemeClr val="tx1">
-                    <a:lumMod val="75000"/>
-                    <a:lumOff val="25000"/>
-                  </a:schemeClr>
-                </a:solidFill>
-              </a:rPr>
-              <a:t>IndexedDB</a:t>
-            </a:r>
-          </a:p>
-        </p:txBody>
-      </p:sp>
-      <p:sp>
-        <p:nvSpPr>
-          <p:cNvPr id="122" name="Rechteck 121">
-            <a:extLst>
-              <a:ext uri="{FF2B5EF4-FFF2-40B4-BE49-F238E27FC236}">
-                <a16:creationId xmlns:a16="http://schemas.microsoft.com/office/drawing/2014/main" id="{2434DAA5-E449-425F-BD28-B04FD0F12D11}"/>
-              </a:ext>
-            </a:extLst>
-          </p:cNvPr>
-          <p:cNvSpPr/>
-          <p:nvPr/>
-        </p:nvSpPr>
-        <p:spPr>
-          <a:xfrm>
-            <a:off x="9347206" y="839038"/>
-            <a:ext cx="1736436" cy="504000"/>
-          </a:xfrm>
-          <a:prstGeom prst="rect">
-            <a:avLst/>
-          </a:prstGeom>
-          <a:solidFill>
-            <a:schemeClr val="tx1">
-              <a:lumMod val="75000"/>
-              <a:lumOff val="25000"/>
-            </a:schemeClr>
-          </a:solidFill>
-          <a:ln>
-            <a:noFill/>
-          </a:ln>
-        </p:spPr>
-        <p:style>
-          <a:lnRef idx="2">
-            <a:schemeClr val="accent3">
-              <a:shade val="50000"/>
-            </a:schemeClr>
-          </a:lnRef>
-          <a:fillRef idx="1">
-            <a:schemeClr val="accent3"/>
-          </a:fillRef>
-          <a:effectRef idx="0">
-            <a:schemeClr val="accent3"/>
-          </a:effectRef>
-          <a:fontRef idx="minor">
-            <a:schemeClr val="lt1"/>
-          </a:fontRef>
-        </p:style>
-        <p:txBody>
-          <a:bodyPr rtlCol="0" anchor="ctr"/>
-          <a:lstStyle/>
-          <a:p>
-            <a:pPr algn="ctr"/>
-            <a:r>
-              <a:rPr lang="de-AT" sz="1600" dirty="0">
-                <a:solidFill>
-                  <a:schemeClr val="bg1"/>
-                </a:solidFill>
-              </a:rPr>
-              <a:t>Dexie.js</a:t>
-            </a:r>
-          </a:p>
-          <a:p>
-            <a:pPr algn="ctr"/>
-            <a:r>
-              <a:rPr lang="de-AT" sz="1600" dirty="0">
-                <a:solidFill>
-                  <a:schemeClr val="bg1"/>
-                </a:solidFill>
-              </a:rPr>
-              <a:t>Wrapper</a:t>
-            </a:r>
-          </a:p>
-        </p:txBody>
-      </p:sp>
-      <p:sp>
-        <p:nvSpPr>
-          <p:cNvPr id="123" name="Rechteck 122">
-            <a:extLst>
-              <a:ext uri="{FF2B5EF4-FFF2-40B4-BE49-F238E27FC236}">
-                <a16:creationId xmlns:a16="http://schemas.microsoft.com/office/drawing/2014/main" id="{D59E9469-2454-4FD1-A16B-5E8FE1B6CDE6}"/>
-              </a:ext>
-            </a:extLst>
-          </p:cNvPr>
-          <p:cNvSpPr/>
-          <p:nvPr/>
-        </p:nvSpPr>
-        <p:spPr>
-          <a:xfrm rot="16200000">
-            <a:off x="8741405" y="1237167"/>
-            <a:ext cx="1006119" cy="213622"/>
-          </a:xfrm>
-          <a:prstGeom prst="rect">
-            <a:avLst/>
-          </a:prstGeom>
-          <a:solidFill>
-            <a:schemeClr val="bg1"/>
-          </a:solidFill>
-          <a:ln>
-            <a:noFill/>
-          </a:ln>
-        </p:spPr>
-        <p:style>
-          <a:lnRef idx="2">
-            <a:schemeClr val="accent3">
-              <a:shade val="50000"/>
-            </a:schemeClr>
-          </a:lnRef>
-          <a:fillRef idx="1">
-            <a:schemeClr val="accent3"/>
-          </a:fillRef>
-          <a:effectRef idx="0">
-            <a:schemeClr val="accent3"/>
-          </a:effectRef>
-          <a:fontRef idx="minor">
-            <a:schemeClr val="lt1"/>
-          </a:fontRef>
-        </p:style>
-        <p:txBody>
-          <a:bodyPr rtlCol="0" anchor="ctr"/>
-          <a:lstStyle/>
-          <a:p>
-            <a:pPr algn="ctr">
-              <a:lnSpc>
-                <a:spcPct val="80000"/>
-              </a:lnSpc>
-            </a:pPr>
-            <a:r>
-              <a:rPr lang="de-AT" sz="1600" dirty="0">
-                <a:solidFill>
-                  <a:schemeClr val="tx1">
-                    <a:lumMod val="85000"/>
-                    <a:lumOff val="15000"/>
-                  </a:schemeClr>
-                </a:solidFill>
-              </a:rPr>
-              <a:t>Queue</a:t>
-            </a:r>
-          </a:p>
-        </p:txBody>
-      </p:sp>
-      <p:sp>
-        <p:nvSpPr>
-          <p:cNvPr id="124" name="Rechteck 123">
-            <a:extLst>
-              <a:ext uri="{FF2B5EF4-FFF2-40B4-BE49-F238E27FC236}">
-                <a16:creationId xmlns:a16="http://schemas.microsoft.com/office/drawing/2014/main" id="{04110C55-FA03-4CD8-ACA2-E3F5094E72D8}"/>
-              </a:ext>
-            </a:extLst>
-          </p:cNvPr>
-          <p:cNvSpPr/>
-          <p:nvPr/>
-        </p:nvSpPr>
-        <p:spPr>
-          <a:xfrm>
-            <a:off x="9131776" y="834568"/>
-            <a:ext cx="1951866" cy="1006120"/>
-          </a:xfrm>
-          <a:prstGeom prst="rect">
-            <a:avLst/>
-          </a:prstGeom>
-          <a:noFill/>
-        </p:spPr>
-        <p:style>
-          <a:lnRef idx="2">
-            <a:schemeClr val="accent3">
-              <a:shade val="50000"/>
-            </a:schemeClr>
-          </a:lnRef>
-          <a:fillRef idx="1">
-            <a:schemeClr val="accent3"/>
-          </a:fillRef>
-          <a:effectRef idx="0">
-            <a:schemeClr val="accent3"/>
-          </a:effectRef>
-          <a:fontRef idx="minor">
-            <a:schemeClr val="lt1"/>
-          </a:fontRef>
-        </p:style>
-        <p:txBody>
-          <a:bodyPr rtlCol="0" anchor="ctr"/>
-          <a:lstStyle/>
-          <a:p>
-            <a:pPr algn="ctr"/>
-            <a:endParaRPr lang="de-AT" dirty="0">
-              <a:solidFill>
-                <a:schemeClr val="tx1">
-                  <a:lumMod val="75000"/>
-                  <a:lumOff val="25000"/>
-                </a:schemeClr>
-              </a:solidFill>
-            </a:endParaRPr>
-          </a:p>
-        </p:txBody>
-      </p:sp>
-      <p:sp>
-        <p:nvSpPr>
-          <p:cNvPr id="125" name="Textfeld 124">
-            <a:extLst>
-              <a:ext uri="{FF2B5EF4-FFF2-40B4-BE49-F238E27FC236}">
-                <a16:creationId xmlns:a16="http://schemas.microsoft.com/office/drawing/2014/main" id="{C6FDF359-60FE-44D2-A7C0-7885E77B0DD7}"/>
-              </a:ext>
-            </a:extLst>
-          </p:cNvPr>
-          <p:cNvSpPr txBox="1"/>
-          <p:nvPr/>
-        </p:nvSpPr>
-        <p:spPr>
-          <a:xfrm>
-            <a:off x="9102994" y="557482"/>
-            <a:ext cx="1598515" cy="261610"/>
-          </a:xfrm>
-          <a:prstGeom prst="rect">
-            <a:avLst/>
-          </a:prstGeom>
-          <a:noFill/>
-        </p:spPr>
-        <p:txBody>
-          <a:bodyPr wrap="none" rtlCol="0">
-            <a:spAutoFit/>
-          </a:bodyPr>
-          <a:lstStyle/>
-          <a:p>
-            <a:r>
-              <a:rPr lang="de-AT" sz="1100" dirty="0"/>
-              <a:t>Message Queue für User</a:t>
-            </a:r>
+            <a:endParaRPr lang="de-AT" dirty="0"/>
           </a:p>
         </p:txBody>
       </p:sp>
       <p:cxnSp>
         <p:nvCxnSpPr>
-          <p:cNvPr id="126" name="Gerade Verbindung mit Pfeil 125">
-            <a:extLst>
-              <a:ext uri="{FF2B5EF4-FFF2-40B4-BE49-F238E27FC236}">
-                <a16:creationId xmlns:a16="http://schemas.microsoft.com/office/drawing/2014/main" id="{3C77B208-1276-4238-AF7E-15262EE002F0}"/>
+          <p:cNvPr id="257" name="Verbinder: gewinkelt 256">
+            <a:extLst>
+              <a:ext uri="{FF2B5EF4-FFF2-40B4-BE49-F238E27FC236}">
+                <a16:creationId xmlns:a16="http://schemas.microsoft.com/office/drawing/2014/main" id="{C2E049B0-6D23-44CC-B7D7-53A4EEA47D71}"/>
               </a:ext>
             </a:extLst>
           </p:cNvPr>
           <p:cNvCxnSpPr>
             <a:cxnSpLocks/>
-            <a:stCxn id="79" idx="0"/>
-            <a:endCxn id="124" idx="2"/>
+            <a:stCxn id="256" idx="2"/>
+            <a:endCxn id="68" idx="0"/>
           </p:cNvCxnSpPr>
           <p:nvPr/>
         </p:nvCxnSpPr>
         <p:spPr>
-          <a:xfrm flipV="1">
-            <a:off x="9094449" y="1840688"/>
-            <a:ext cx="1013260" cy="1128762"/>
+          <a:xfrm rot="5400000">
+            <a:off x="4371181" y="1015786"/>
+            <a:ext cx="372756" cy="1653123"/>
+          </a:xfrm>
+          <a:prstGeom prst="bentConnector3">
+            <a:avLst>
+              <a:gd name="adj1" fmla="val 50000"/>
+            </a:avLst>
+          </a:prstGeom>
+          <a:ln w="12700">
+            <a:solidFill>
+              <a:schemeClr val="tx1">
+                <a:lumMod val="75000"/>
+                <a:lumOff val="25000"/>
+              </a:schemeClr>
+            </a:solidFill>
+            <a:tailEnd type="triangle"/>
+          </a:ln>
+        </p:spPr>
+        <p:style>
+          <a:lnRef idx="1">
+            <a:schemeClr val="dk1"/>
+          </a:lnRef>
+          <a:fillRef idx="0">
+            <a:schemeClr val="dk1"/>
+          </a:fillRef>
+          <a:effectRef idx="0">
+            <a:schemeClr val="dk1"/>
+          </a:effectRef>
+          <a:fontRef idx="minor">
+            <a:schemeClr val="tx1"/>
+          </a:fontRef>
+        </p:style>
+      </p:cxnSp>
+      <p:cxnSp>
+        <p:nvCxnSpPr>
+          <p:cNvPr id="260" name="Verbinder: gewinkelt 259">
+            <a:extLst>
+              <a:ext uri="{FF2B5EF4-FFF2-40B4-BE49-F238E27FC236}">
+                <a16:creationId xmlns:a16="http://schemas.microsoft.com/office/drawing/2014/main" id="{F540B6FA-5872-4737-BB34-87774A247B6F}"/>
+              </a:ext>
+            </a:extLst>
+          </p:cNvPr>
+          <p:cNvCxnSpPr>
+            <a:cxnSpLocks/>
+            <a:stCxn id="256" idx="2"/>
+            <a:endCxn id="34" idx="0"/>
+          </p:cNvCxnSpPr>
+          <p:nvPr/>
+        </p:nvCxnSpPr>
+        <p:spPr>
+          <a:xfrm rot="16200000" flipH="1">
+            <a:off x="5437979" y="1602109"/>
+            <a:ext cx="365705" cy="473423"/>
+          </a:xfrm>
+          <a:prstGeom prst="bentConnector3">
+            <a:avLst>
+              <a:gd name="adj1" fmla="val 51953"/>
+            </a:avLst>
+          </a:prstGeom>
+          <a:ln w="12700">
+            <a:solidFill>
+              <a:schemeClr val="tx1">
+                <a:lumMod val="75000"/>
+                <a:lumOff val="25000"/>
+              </a:schemeClr>
+            </a:solidFill>
+            <a:tailEnd type="triangle"/>
+          </a:ln>
+        </p:spPr>
+        <p:style>
+          <a:lnRef idx="1">
+            <a:schemeClr val="dk1"/>
+          </a:lnRef>
+          <a:fillRef idx="0">
+            <a:schemeClr val="dk1"/>
+          </a:fillRef>
+          <a:effectRef idx="0">
+            <a:schemeClr val="dk1"/>
+          </a:effectRef>
+          <a:fontRef idx="minor">
+            <a:schemeClr val="tx1"/>
+          </a:fontRef>
+        </p:style>
+      </p:cxnSp>
+      <p:cxnSp>
+        <p:nvCxnSpPr>
+          <p:cNvPr id="289" name="Gerade Verbindung mit Pfeil 288">
+            <a:extLst>
+              <a:ext uri="{FF2B5EF4-FFF2-40B4-BE49-F238E27FC236}">
+                <a16:creationId xmlns:a16="http://schemas.microsoft.com/office/drawing/2014/main" id="{5CC8DBE7-2CB3-48B6-81F2-19F296B4441F}"/>
+              </a:ext>
+            </a:extLst>
+          </p:cNvPr>
+          <p:cNvCxnSpPr>
+            <a:cxnSpLocks/>
+            <a:stCxn id="19" idx="1"/>
+            <a:endCxn id="160" idx="3"/>
+          </p:cNvCxnSpPr>
+          <p:nvPr/>
+        </p:nvCxnSpPr>
+        <p:spPr>
+          <a:xfrm flipH="1">
+            <a:off x="4614456" y="3692218"/>
+            <a:ext cx="428081" cy="3664"/>
           </a:xfrm>
           <a:prstGeom prst="straightConnector1">
             <a:avLst/>
@@ -6822,10 +6884,47 @@
           </a:fontRef>
         </p:style>
       </p:cxnSp>
+      <p:sp>
+        <p:nvSpPr>
+          <p:cNvPr id="63" name="Titel 1">
+            <a:extLst>
+              <a:ext uri="{FF2B5EF4-FFF2-40B4-BE49-F238E27FC236}">
+                <a16:creationId xmlns:a16="http://schemas.microsoft.com/office/drawing/2014/main" id="{0731E20A-A1EF-4D3B-B647-434574375790}"/>
+              </a:ext>
+            </a:extLst>
+          </p:cNvPr>
+          <p:cNvSpPr>
+            <a:spLocks noGrp="1"/>
+          </p:cNvSpPr>
+          <p:nvPr>
+            <p:ph type="title"/>
+          </p:nvPr>
+        </p:nvSpPr>
+        <p:spPr>
+          <a:xfrm>
+            <a:off x="145473" y="0"/>
+            <a:ext cx="10515600" cy="748145"/>
+          </a:xfrm>
+        </p:spPr>
+        <p:txBody>
+          <a:bodyPr/>
+          <a:lstStyle/>
+          <a:p>
+            <a:r>
+              <a:rPr lang="de-DE" dirty="0"/>
+              <a:t>Client</a:t>
+            </a:r>
+            <a:r>
+              <a:rPr lang="de-AT" dirty="0"/>
+              <a:t>-Logik</a:t>
+            </a:r>
+          </a:p>
+        </p:txBody>
+      </p:sp>
     </p:spTree>
     <p:extLst>
       <p:ext uri="{BB962C8B-B14F-4D97-AF65-F5344CB8AC3E}">
-        <p14:creationId xmlns:p14="http://schemas.microsoft.com/office/powerpoint/2010/main" val="1036366500"/>
+        <p14:creationId xmlns:p14="http://schemas.microsoft.com/office/powerpoint/2010/main" val="1218138753"/>
       </p:ext>
     </p:extLst>
   </p:cSld>
@@ -8761,15 +8860,6 @@
 </file>
 
 <file path=customXml/item2.xml><?xml version="1.0" encoding="utf-8"?>
-<?mso-contentType ?>
-<FormTemplates xmlns="http://schemas.microsoft.com/sharepoint/v3/contenttype/forms">
-  <Display>DocumentLibraryForm</Display>
-  <Edit>DocumentLibraryForm</Edit>
-  <New>DocumentLibraryForm</New>
-</FormTemplates>
-</file>
-
-<file path=customXml/item3.xml><?xml version="1.0" encoding="utf-8"?>
 <ct:contentTypeSchema xmlns:ct="http://schemas.microsoft.com/office/2006/metadata/contentType" xmlns:ma="http://schemas.microsoft.com/office/2006/metadata/properties/metaAttributes" ct:_="" ma:_="" ma:contentTypeName="Dokument" ma:contentTypeID="0x010100D233769BFF2BD24EA4C619E0CCB82881" ma:contentTypeVersion="0" ma:contentTypeDescription="Ein neues Dokument erstellen." ma:contentTypeScope="" ma:versionID="230ca389d1a9e48fed4e5cad00463a98">
   <xsd:schema xmlns:xsd="http://www.w3.org/2001/XMLSchema" xmlns:xs="http://www.w3.org/2001/XMLSchema" xmlns:p="http://schemas.microsoft.com/office/2006/metadata/properties" targetNamespace="http://schemas.microsoft.com/office/2006/metadata/properties" ma:root="true" ma:fieldsID="8c96a1500b55a331f0d0926ba64a978c">
     <xsd:element name="properties">
@@ -8883,6 +8973,15 @@
 </ct:contentTypeSchema>
 </file>
 
+<file path=customXml/item3.xml><?xml version="1.0" encoding="utf-8"?>
+<?mso-contentType ?>
+<FormTemplates xmlns="http://schemas.microsoft.com/sharepoint/v3/contenttype/forms">
+  <Display>DocumentLibraryForm</Display>
+  <Edit>DocumentLibraryForm</Edit>
+  <New>DocumentLibraryForm</New>
+</FormTemplates>
+</file>
+
 <file path=customXml/itemProps1.xml><?xml version="1.0" encoding="utf-8"?>
 <ds:datastoreItem xmlns:ds="http://schemas.openxmlformats.org/officeDocument/2006/customXml" ds:itemID="{7EA4CB87-C672-4204-A1A2-DE4EEA6A2C9E}">
   <ds:schemaRefs>
@@ -8893,14 +8992,6 @@
 </file>
 
 <file path=customXml/itemProps2.xml><?xml version="1.0" encoding="utf-8"?>
-<ds:datastoreItem xmlns:ds="http://schemas.openxmlformats.org/officeDocument/2006/customXml" ds:itemID="{07E465A7-1341-4317-9BAA-751AC4AA1050}">
-  <ds:schemaRefs>
-    <ds:schemaRef ds:uri="http://schemas.microsoft.com/sharepoint/v3/contenttype/forms"/>
-  </ds:schemaRefs>
-</ds:datastoreItem>
-</file>
-
-<file path=customXml/itemProps3.xml><?xml version="1.0" encoding="utf-8"?>
 <ds:datastoreItem xmlns:ds="http://schemas.openxmlformats.org/officeDocument/2006/customXml" ds:itemID="{5DC538A5-F84D-4379-B65C-D168E2066EDF}">
   <ds:schemaRefs>
     <ds:schemaRef ds:uri="http://schemas.microsoft.com/office/2006/metadata/contentType"/>
@@ -8914,4 +9005,12 @@
     <ds:schemaRef ds:uri="http://schemas.microsoft.com/office/infopath/2007/PartnerControls"/>
   </ds:schemaRefs>
 </ds:datastoreItem>
+</file>
+
+<file path=customXml/itemProps3.xml><?xml version="1.0" encoding="utf-8"?>
+<ds:datastoreItem xmlns:ds="http://schemas.openxmlformats.org/officeDocument/2006/customXml" ds:itemID="{07E465A7-1341-4317-9BAA-751AC4AA1050}">
+  <ds:schemaRefs>
+    <ds:schemaRef ds:uri="http://schemas.microsoft.com/sharepoint/v3/contenttype/forms"/>
+  </ds:schemaRefs>
+</ds:datastoreItem>
 </file>
</xml_diff>